<commit_message>
doc: added notes.pptx (update)
</commit_message>
<xml_diff>
--- a/Notes.pptx
+++ b/Notes.pptx
@@ -12,6 +12,11 @@
     <p:sldId id="259" r:id="rId6"/>
     <p:sldId id="260" r:id="rId7"/>
     <p:sldId id="261" r:id="rId8"/>
+    <p:sldId id="263" r:id="rId9"/>
+    <p:sldId id="264" r:id="rId10"/>
+    <p:sldId id="265" r:id="rId11"/>
+    <p:sldId id="266" r:id="rId12"/>
+    <p:sldId id="267" r:id="rId13"/>
   </p:sldIdLst>
   <p:sldSz cx="12192000" cy="6858000"/>
   <p:notesSz cx="6858000" cy="9144000"/>
@@ -110,6 +115,11 @@
       </a:defRPr>
     </a:lvl9pPr>
   </p:defaultTextStyle>
+  <p:extLst>
+    <p:ext uri="{EFAFB233-063F-42B5-8137-9DF3F51BA10A}">
+      <p15:sldGuideLst xmlns:p15="http://schemas.microsoft.com/office/powerpoint/2012/main"/>
+    </p:ext>
+  </p:extLst>
 </p:presentation>
 </file>
 
@@ -262,7 +272,7 @@
           <a:p>
             <a:fld id="{3739B8E8-455D-4214-9E9D-08E1C3D8EDD2}" type="datetimeFigureOut">
               <a:rPr lang="fr-FR" smtClean="0"/>
-              <a:t>05/10/2021</a:t>
+              <a:t>06/10/2021</a:t>
             </a:fld>
             <a:endParaRPr lang="fr-FR"/>
           </a:p>
@@ -462,7 +472,7 @@
           <a:p>
             <a:fld id="{3739B8E8-455D-4214-9E9D-08E1C3D8EDD2}" type="datetimeFigureOut">
               <a:rPr lang="fr-FR" smtClean="0"/>
-              <a:t>05/10/2021</a:t>
+              <a:t>06/10/2021</a:t>
             </a:fld>
             <a:endParaRPr lang="fr-FR"/>
           </a:p>
@@ -672,7 +682,7 @@
           <a:p>
             <a:fld id="{3739B8E8-455D-4214-9E9D-08E1C3D8EDD2}" type="datetimeFigureOut">
               <a:rPr lang="fr-FR" smtClean="0"/>
-              <a:t>05/10/2021</a:t>
+              <a:t>06/10/2021</a:t>
             </a:fld>
             <a:endParaRPr lang="fr-FR"/>
           </a:p>
@@ -872,7 +882,7 @@
           <a:p>
             <a:fld id="{3739B8E8-455D-4214-9E9D-08E1C3D8EDD2}" type="datetimeFigureOut">
               <a:rPr lang="fr-FR" smtClean="0"/>
-              <a:t>05/10/2021</a:t>
+              <a:t>06/10/2021</a:t>
             </a:fld>
             <a:endParaRPr lang="fr-FR"/>
           </a:p>
@@ -1148,7 +1158,7 @@
           <a:p>
             <a:fld id="{3739B8E8-455D-4214-9E9D-08E1C3D8EDD2}" type="datetimeFigureOut">
               <a:rPr lang="fr-FR" smtClean="0"/>
-              <a:t>05/10/2021</a:t>
+              <a:t>06/10/2021</a:t>
             </a:fld>
             <a:endParaRPr lang="fr-FR"/>
           </a:p>
@@ -1416,7 +1426,7 @@
           <a:p>
             <a:fld id="{3739B8E8-455D-4214-9E9D-08E1C3D8EDD2}" type="datetimeFigureOut">
               <a:rPr lang="fr-FR" smtClean="0"/>
-              <a:t>05/10/2021</a:t>
+              <a:t>06/10/2021</a:t>
             </a:fld>
             <a:endParaRPr lang="fr-FR"/>
           </a:p>
@@ -1831,7 +1841,7 @@
           <a:p>
             <a:fld id="{3739B8E8-455D-4214-9E9D-08E1C3D8EDD2}" type="datetimeFigureOut">
               <a:rPr lang="fr-FR" smtClean="0"/>
-              <a:t>05/10/2021</a:t>
+              <a:t>06/10/2021</a:t>
             </a:fld>
             <a:endParaRPr lang="fr-FR"/>
           </a:p>
@@ -1973,7 +1983,7 @@
           <a:p>
             <a:fld id="{3739B8E8-455D-4214-9E9D-08E1C3D8EDD2}" type="datetimeFigureOut">
               <a:rPr lang="fr-FR" smtClean="0"/>
-              <a:t>05/10/2021</a:t>
+              <a:t>06/10/2021</a:t>
             </a:fld>
             <a:endParaRPr lang="fr-FR"/>
           </a:p>
@@ -2086,7 +2096,7 @@
           <a:p>
             <a:fld id="{3739B8E8-455D-4214-9E9D-08E1C3D8EDD2}" type="datetimeFigureOut">
               <a:rPr lang="fr-FR" smtClean="0"/>
-              <a:t>05/10/2021</a:t>
+              <a:t>06/10/2021</a:t>
             </a:fld>
             <a:endParaRPr lang="fr-FR"/>
           </a:p>
@@ -2399,7 +2409,7 @@
           <a:p>
             <a:fld id="{3739B8E8-455D-4214-9E9D-08E1C3D8EDD2}" type="datetimeFigureOut">
               <a:rPr lang="fr-FR" smtClean="0"/>
-              <a:t>05/10/2021</a:t>
+              <a:t>06/10/2021</a:t>
             </a:fld>
             <a:endParaRPr lang="fr-FR"/>
           </a:p>
@@ -2688,7 +2698,7 @@
           <a:p>
             <a:fld id="{3739B8E8-455D-4214-9E9D-08E1C3D8EDD2}" type="datetimeFigureOut">
               <a:rPr lang="fr-FR" smtClean="0"/>
-              <a:t>05/10/2021</a:t>
+              <a:t>06/10/2021</a:t>
             </a:fld>
             <a:endParaRPr lang="fr-FR"/>
           </a:p>
@@ -2931,7 +2941,7 @@
           <a:p>
             <a:fld id="{3739B8E8-455D-4214-9E9D-08E1C3D8EDD2}" type="datetimeFigureOut">
               <a:rPr lang="fr-FR" smtClean="0"/>
-              <a:t>05/10/2021</a:t>
+              <a:t>06/10/2021</a:t>
             </a:fld>
             <a:endParaRPr lang="fr-FR"/>
           </a:p>
@@ -3414,6 +3424,929 @@
 </p:sld>
 </file>
 
+<file path=ppt/slides/slide10.xml><?xml version="1.0" encoding="utf-8"?>
+<p:sld xmlns:a="http://schemas.openxmlformats.org/drawingml/2006/main" xmlns:r="http://schemas.openxmlformats.org/officeDocument/2006/relationships" xmlns:p="http://schemas.openxmlformats.org/presentationml/2006/main">
+  <p:cSld>
+    <p:spTree>
+      <p:nvGrpSpPr>
+        <p:cNvPr id="1" name=""/>
+        <p:cNvGrpSpPr/>
+        <p:nvPr/>
+      </p:nvGrpSpPr>
+      <p:grpSpPr>
+        <a:xfrm>
+          <a:off x="0" y="0"/>
+          <a:ext cx="0" cy="0"/>
+          <a:chOff x="0" y="0"/>
+          <a:chExt cx="0" cy="0"/>
+        </a:xfrm>
+      </p:grpSpPr>
+      <p:sp>
+        <p:nvSpPr>
+          <p:cNvPr id="2" name="Title 1">
+            <a:extLst>
+              <a:ext uri="{FF2B5EF4-FFF2-40B4-BE49-F238E27FC236}">
+                <a16:creationId xmlns:a16="http://schemas.microsoft.com/office/drawing/2014/main" id="{5B449FB6-0B8D-42B1-ADBE-FB9DD70DC7F0}"/>
+              </a:ext>
+            </a:extLst>
+          </p:cNvPr>
+          <p:cNvSpPr>
+            <a:spLocks noGrp="1"/>
+          </p:cNvSpPr>
+          <p:nvPr>
+            <p:ph type="title"/>
+          </p:nvPr>
+        </p:nvSpPr>
+        <p:spPr/>
+        <p:txBody>
+          <a:bodyPr/>
+          <a:lstStyle/>
+          <a:p>
+            <a:r>
+              <a:rPr lang="fr-FR" dirty="0"/>
+              <a:t>asynchrone</a:t>
+            </a:r>
+          </a:p>
+        </p:txBody>
+      </p:sp>
+      <p:cxnSp>
+        <p:nvCxnSpPr>
+          <p:cNvPr id="4" name="Straight Arrow Connector 3">
+            <a:extLst>
+              <a:ext uri="{FF2B5EF4-FFF2-40B4-BE49-F238E27FC236}">
+                <a16:creationId xmlns:a16="http://schemas.microsoft.com/office/drawing/2014/main" id="{B405045E-93A9-44E2-86C5-C0C1BB8DB5A0}"/>
+              </a:ext>
+            </a:extLst>
+          </p:cNvPr>
+          <p:cNvCxnSpPr/>
+          <p:nvPr/>
+        </p:nvCxnSpPr>
+        <p:spPr>
+          <a:xfrm>
+            <a:off x="300318" y="2465294"/>
+            <a:ext cx="11613776" cy="0"/>
+          </a:xfrm>
+          <a:prstGeom prst="straightConnector1">
+            <a:avLst/>
+          </a:prstGeom>
+          <a:ln w="76200">
+            <a:tailEnd type="triangle"/>
+          </a:ln>
+        </p:spPr>
+        <p:style>
+          <a:lnRef idx="1">
+            <a:schemeClr val="accent1"/>
+          </a:lnRef>
+          <a:fillRef idx="0">
+            <a:schemeClr val="accent1"/>
+          </a:fillRef>
+          <a:effectRef idx="0">
+            <a:schemeClr val="accent1"/>
+          </a:effectRef>
+          <a:fontRef idx="minor">
+            <a:schemeClr val="tx1"/>
+          </a:fontRef>
+        </p:style>
+      </p:cxnSp>
+      <p:cxnSp>
+        <p:nvCxnSpPr>
+          <p:cNvPr id="5" name="Straight Connector 4">
+            <a:extLst>
+              <a:ext uri="{FF2B5EF4-FFF2-40B4-BE49-F238E27FC236}">
+                <a16:creationId xmlns:a16="http://schemas.microsoft.com/office/drawing/2014/main" id="{E6D3873B-22AB-4A47-866B-4014769BD56E}"/>
+              </a:ext>
+            </a:extLst>
+          </p:cNvPr>
+          <p:cNvCxnSpPr/>
+          <p:nvPr/>
+        </p:nvCxnSpPr>
+        <p:spPr>
+          <a:xfrm>
+            <a:off x="690282" y="2075329"/>
+            <a:ext cx="0" cy="829236"/>
+          </a:xfrm>
+          <a:prstGeom prst="line">
+            <a:avLst/>
+          </a:prstGeom>
+          <a:ln w="76200"/>
+        </p:spPr>
+        <p:style>
+          <a:lnRef idx="1">
+            <a:schemeClr val="accent1"/>
+          </a:lnRef>
+          <a:fillRef idx="0">
+            <a:schemeClr val="accent1"/>
+          </a:fillRef>
+          <a:effectRef idx="0">
+            <a:schemeClr val="accent1"/>
+          </a:effectRef>
+          <a:fontRef idx="minor">
+            <a:schemeClr val="tx1"/>
+          </a:fontRef>
+        </p:style>
+      </p:cxnSp>
+      <p:sp>
+        <p:nvSpPr>
+          <p:cNvPr id="6" name="Rectangle 5">
+            <a:extLst>
+              <a:ext uri="{FF2B5EF4-FFF2-40B4-BE49-F238E27FC236}">
+                <a16:creationId xmlns:a16="http://schemas.microsoft.com/office/drawing/2014/main" id="{9EAF9BEE-F181-4E21-930A-B39DB9B64DAF}"/>
+              </a:ext>
+            </a:extLst>
+          </p:cNvPr>
+          <p:cNvSpPr/>
+          <p:nvPr/>
+        </p:nvSpPr>
+        <p:spPr>
+          <a:xfrm>
+            <a:off x="714936" y="2218726"/>
+            <a:ext cx="172570" cy="475090"/>
+          </a:xfrm>
+          <a:prstGeom prst="rect">
+            <a:avLst/>
+          </a:prstGeom>
+        </p:spPr>
+        <p:style>
+          <a:lnRef idx="2">
+            <a:schemeClr val="accent6">
+              <a:shade val="50000"/>
+            </a:schemeClr>
+          </a:lnRef>
+          <a:fillRef idx="1">
+            <a:schemeClr val="accent6"/>
+          </a:fillRef>
+          <a:effectRef idx="0">
+            <a:schemeClr val="accent6"/>
+          </a:effectRef>
+          <a:fontRef idx="minor">
+            <a:schemeClr val="lt1"/>
+          </a:fontRef>
+        </p:style>
+        <p:txBody>
+          <a:bodyPr rtlCol="0" anchor="ctr"/>
+          <a:lstStyle/>
+          <a:p>
+            <a:pPr algn="ctr"/>
+            <a:endParaRPr lang="fr-FR"/>
+          </a:p>
+        </p:txBody>
+      </p:sp>
+      <p:cxnSp>
+        <p:nvCxnSpPr>
+          <p:cNvPr id="7" name="Straight Arrow Connector 6">
+            <a:extLst>
+              <a:ext uri="{FF2B5EF4-FFF2-40B4-BE49-F238E27FC236}">
+                <a16:creationId xmlns:a16="http://schemas.microsoft.com/office/drawing/2014/main" id="{54FBD8D5-AC33-4545-83E2-898EFE639254}"/>
+              </a:ext>
+            </a:extLst>
+          </p:cNvPr>
+          <p:cNvCxnSpPr/>
+          <p:nvPr/>
+        </p:nvCxnSpPr>
+        <p:spPr>
+          <a:xfrm>
+            <a:off x="277906" y="4231341"/>
+            <a:ext cx="11681012" cy="0"/>
+          </a:xfrm>
+          <a:prstGeom prst="straightConnector1">
+            <a:avLst/>
+          </a:prstGeom>
+          <a:ln w="76200">
+            <a:tailEnd type="triangle"/>
+          </a:ln>
+        </p:spPr>
+        <p:style>
+          <a:lnRef idx="1">
+            <a:schemeClr val="accent1"/>
+          </a:lnRef>
+          <a:fillRef idx="0">
+            <a:schemeClr val="accent1"/>
+          </a:fillRef>
+          <a:effectRef idx="0">
+            <a:schemeClr val="accent1"/>
+          </a:effectRef>
+          <a:fontRef idx="minor">
+            <a:schemeClr val="tx1"/>
+          </a:fontRef>
+        </p:style>
+      </p:cxnSp>
+      <p:cxnSp>
+        <p:nvCxnSpPr>
+          <p:cNvPr id="8" name="Straight Arrow Connector 7">
+            <a:extLst>
+              <a:ext uri="{FF2B5EF4-FFF2-40B4-BE49-F238E27FC236}">
+                <a16:creationId xmlns:a16="http://schemas.microsoft.com/office/drawing/2014/main" id="{7786D9C1-4EEB-4AD3-B7C0-2B93B44B9423}"/>
+              </a:ext>
+            </a:extLst>
+          </p:cNvPr>
+          <p:cNvCxnSpPr/>
+          <p:nvPr/>
+        </p:nvCxnSpPr>
+        <p:spPr>
+          <a:xfrm>
+            <a:off x="779929" y="2832847"/>
+            <a:ext cx="107577" cy="1290918"/>
+          </a:xfrm>
+          <a:prstGeom prst="straightConnector1">
+            <a:avLst/>
+          </a:prstGeom>
+          <a:ln w="76200">
+            <a:tailEnd type="triangle"/>
+          </a:ln>
+        </p:spPr>
+        <p:style>
+          <a:lnRef idx="1">
+            <a:schemeClr val="accent1"/>
+          </a:lnRef>
+          <a:fillRef idx="0">
+            <a:schemeClr val="accent1"/>
+          </a:fillRef>
+          <a:effectRef idx="0">
+            <a:schemeClr val="accent1"/>
+          </a:effectRef>
+          <a:fontRef idx="minor">
+            <a:schemeClr val="tx1"/>
+          </a:fontRef>
+        </p:style>
+      </p:cxnSp>
+      <p:sp>
+        <p:nvSpPr>
+          <p:cNvPr id="9" name="Rectangle 8">
+            <a:extLst>
+              <a:ext uri="{FF2B5EF4-FFF2-40B4-BE49-F238E27FC236}">
+                <a16:creationId xmlns:a16="http://schemas.microsoft.com/office/drawing/2014/main" id="{8C9700C6-D06A-4BD1-A5F2-834BD9FCF9CD}"/>
+              </a:ext>
+            </a:extLst>
+          </p:cNvPr>
+          <p:cNvSpPr/>
+          <p:nvPr/>
+        </p:nvSpPr>
+        <p:spPr>
+          <a:xfrm>
+            <a:off x="1004047" y="4016188"/>
+            <a:ext cx="4818529" cy="475089"/>
+          </a:xfrm>
+          <a:prstGeom prst="rect">
+            <a:avLst/>
+          </a:prstGeom>
+        </p:spPr>
+        <p:style>
+          <a:lnRef idx="2">
+            <a:schemeClr val="accent1">
+              <a:shade val="50000"/>
+            </a:schemeClr>
+          </a:lnRef>
+          <a:fillRef idx="1">
+            <a:schemeClr val="accent1"/>
+          </a:fillRef>
+          <a:effectRef idx="0">
+            <a:schemeClr val="accent1"/>
+          </a:effectRef>
+          <a:fontRef idx="minor">
+            <a:schemeClr val="lt1"/>
+          </a:fontRef>
+        </p:style>
+        <p:txBody>
+          <a:bodyPr rtlCol="0" anchor="ctr"/>
+          <a:lstStyle/>
+          <a:p>
+            <a:pPr algn="ctr"/>
+            <a:endParaRPr lang="fr-FR"/>
+          </a:p>
+        </p:txBody>
+      </p:sp>
+      <p:cxnSp>
+        <p:nvCxnSpPr>
+          <p:cNvPr id="10" name="Straight Arrow Connector 9">
+            <a:extLst>
+              <a:ext uri="{FF2B5EF4-FFF2-40B4-BE49-F238E27FC236}">
+                <a16:creationId xmlns:a16="http://schemas.microsoft.com/office/drawing/2014/main" id="{5C74A92C-D608-4B11-AA96-B0F52E9ECDD4}"/>
+              </a:ext>
+            </a:extLst>
+          </p:cNvPr>
+          <p:cNvCxnSpPr/>
+          <p:nvPr/>
+        </p:nvCxnSpPr>
+        <p:spPr>
+          <a:xfrm flipV="1">
+            <a:off x="5714999" y="2765612"/>
+            <a:ext cx="255495" cy="1053353"/>
+          </a:xfrm>
+          <a:prstGeom prst="straightConnector1">
+            <a:avLst/>
+          </a:prstGeom>
+          <a:ln w="76200">
+            <a:tailEnd type="triangle"/>
+          </a:ln>
+        </p:spPr>
+        <p:style>
+          <a:lnRef idx="1">
+            <a:schemeClr val="accent1"/>
+          </a:lnRef>
+          <a:fillRef idx="0">
+            <a:schemeClr val="accent1"/>
+          </a:fillRef>
+          <a:effectRef idx="0">
+            <a:schemeClr val="accent1"/>
+          </a:effectRef>
+          <a:fontRef idx="minor">
+            <a:schemeClr val="tx1"/>
+          </a:fontRef>
+        </p:style>
+      </p:cxnSp>
+      <p:sp>
+        <p:nvSpPr>
+          <p:cNvPr id="11" name="Rectangle 10">
+            <a:extLst>
+              <a:ext uri="{FF2B5EF4-FFF2-40B4-BE49-F238E27FC236}">
+                <a16:creationId xmlns:a16="http://schemas.microsoft.com/office/drawing/2014/main" id="{709F98AE-184D-49FE-8ECF-6BB1111D2F87}"/>
+              </a:ext>
+            </a:extLst>
+          </p:cNvPr>
+          <p:cNvSpPr/>
+          <p:nvPr/>
+        </p:nvSpPr>
+        <p:spPr>
+          <a:xfrm>
+            <a:off x="6031007" y="2218726"/>
+            <a:ext cx="172570" cy="475090"/>
+          </a:xfrm>
+          <a:prstGeom prst="rect">
+            <a:avLst/>
+          </a:prstGeom>
+        </p:spPr>
+        <p:style>
+          <a:lnRef idx="2">
+            <a:schemeClr val="accent6">
+              <a:shade val="50000"/>
+            </a:schemeClr>
+          </a:lnRef>
+          <a:fillRef idx="1">
+            <a:schemeClr val="accent6"/>
+          </a:fillRef>
+          <a:effectRef idx="0">
+            <a:schemeClr val="accent6"/>
+          </a:effectRef>
+          <a:fontRef idx="minor">
+            <a:schemeClr val="lt1"/>
+          </a:fontRef>
+        </p:style>
+        <p:txBody>
+          <a:bodyPr rtlCol="0" anchor="ctr"/>
+          <a:lstStyle/>
+          <a:p>
+            <a:pPr algn="ctr"/>
+            <a:endParaRPr lang="fr-FR"/>
+          </a:p>
+        </p:txBody>
+      </p:sp>
+      <p:cxnSp>
+        <p:nvCxnSpPr>
+          <p:cNvPr id="13" name="Straight Connector 12">
+            <a:extLst>
+              <a:ext uri="{FF2B5EF4-FFF2-40B4-BE49-F238E27FC236}">
+                <a16:creationId xmlns:a16="http://schemas.microsoft.com/office/drawing/2014/main" id="{BA5590BF-FDCC-44A1-8268-91816E16228C}"/>
+              </a:ext>
+            </a:extLst>
+          </p:cNvPr>
+          <p:cNvCxnSpPr/>
+          <p:nvPr/>
+        </p:nvCxnSpPr>
+        <p:spPr>
+          <a:xfrm>
+            <a:off x="6031007" y="1981200"/>
+            <a:ext cx="0" cy="1017494"/>
+          </a:xfrm>
+          <a:prstGeom prst="line">
+            <a:avLst/>
+          </a:prstGeom>
+          <a:ln w="76200"/>
+        </p:spPr>
+        <p:style>
+          <a:lnRef idx="1">
+            <a:schemeClr val="accent1"/>
+          </a:lnRef>
+          <a:fillRef idx="0">
+            <a:schemeClr val="accent1"/>
+          </a:fillRef>
+          <a:effectRef idx="0">
+            <a:schemeClr val="accent1"/>
+          </a:effectRef>
+          <a:fontRef idx="minor">
+            <a:schemeClr val="tx1"/>
+          </a:fontRef>
+        </p:style>
+      </p:cxnSp>
+      <p:cxnSp>
+        <p:nvCxnSpPr>
+          <p:cNvPr id="14" name="Straight Connector 13">
+            <a:extLst>
+              <a:ext uri="{FF2B5EF4-FFF2-40B4-BE49-F238E27FC236}">
+                <a16:creationId xmlns:a16="http://schemas.microsoft.com/office/drawing/2014/main" id="{CED9C1FB-DCA6-43F5-AA9D-8C2B0399B20E}"/>
+              </a:ext>
+            </a:extLst>
+          </p:cNvPr>
+          <p:cNvCxnSpPr/>
+          <p:nvPr/>
+        </p:nvCxnSpPr>
+        <p:spPr>
+          <a:xfrm>
+            <a:off x="3133165" y="1873624"/>
+            <a:ext cx="0" cy="1402976"/>
+          </a:xfrm>
+          <a:prstGeom prst="line">
+            <a:avLst/>
+          </a:prstGeom>
+          <a:ln w="76200"/>
+        </p:spPr>
+        <p:style>
+          <a:lnRef idx="1">
+            <a:schemeClr val="accent1"/>
+          </a:lnRef>
+          <a:fillRef idx="0">
+            <a:schemeClr val="accent1"/>
+          </a:fillRef>
+          <a:effectRef idx="0">
+            <a:schemeClr val="accent1"/>
+          </a:effectRef>
+          <a:fontRef idx="minor">
+            <a:schemeClr val="tx1"/>
+          </a:fontRef>
+        </p:style>
+      </p:cxnSp>
+      <p:sp>
+        <p:nvSpPr>
+          <p:cNvPr id="15" name="Rectangle 14">
+            <a:extLst>
+              <a:ext uri="{FF2B5EF4-FFF2-40B4-BE49-F238E27FC236}">
+                <a16:creationId xmlns:a16="http://schemas.microsoft.com/office/drawing/2014/main" id="{CE9A7EA6-A470-433A-8929-B7CF5128002D}"/>
+              </a:ext>
+            </a:extLst>
+          </p:cNvPr>
+          <p:cNvSpPr/>
+          <p:nvPr/>
+        </p:nvSpPr>
+        <p:spPr>
+          <a:xfrm>
+            <a:off x="3171264" y="2227750"/>
+            <a:ext cx="318247" cy="475087"/>
+          </a:xfrm>
+          <a:prstGeom prst="rect">
+            <a:avLst/>
+          </a:prstGeom>
+        </p:spPr>
+        <p:style>
+          <a:lnRef idx="2">
+            <a:schemeClr val="accent1">
+              <a:shade val="50000"/>
+            </a:schemeClr>
+          </a:lnRef>
+          <a:fillRef idx="1">
+            <a:schemeClr val="accent1"/>
+          </a:fillRef>
+          <a:effectRef idx="0">
+            <a:schemeClr val="accent1"/>
+          </a:effectRef>
+          <a:fontRef idx="minor">
+            <a:schemeClr val="lt1"/>
+          </a:fontRef>
+        </p:style>
+        <p:txBody>
+          <a:bodyPr rtlCol="0" anchor="ctr"/>
+          <a:lstStyle/>
+          <a:p>
+            <a:pPr algn="ctr"/>
+            <a:endParaRPr lang="fr-FR"/>
+          </a:p>
+        </p:txBody>
+      </p:sp>
+    </p:spTree>
+    <p:extLst>
+      <p:ext uri="{BB962C8B-B14F-4D97-AF65-F5344CB8AC3E}">
+        <p14:creationId xmlns:p14="http://schemas.microsoft.com/office/powerpoint/2010/main" val="1588825694"/>
+      </p:ext>
+    </p:extLst>
+  </p:cSld>
+  <p:clrMapOvr>
+    <a:masterClrMapping/>
+  </p:clrMapOvr>
+</p:sld>
+</file>
+
+<file path=ppt/slides/slide11.xml><?xml version="1.0" encoding="utf-8"?>
+<p:sld xmlns:a="http://schemas.openxmlformats.org/drawingml/2006/main" xmlns:r="http://schemas.openxmlformats.org/officeDocument/2006/relationships" xmlns:p="http://schemas.openxmlformats.org/presentationml/2006/main">
+  <p:cSld>
+    <p:spTree>
+      <p:nvGrpSpPr>
+        <p:cNvPr id="1" name=""/>
+        <p:cNvGrpSpPr/>
+        <p:nvPr/>
+      </p:nvGrpSpPr>
+      <p:grpSpPr>
+        <a:xfrm>
+          <a:off x="0" y="0"/>
+          <a:ext cx="0" cy="0"/>
+          <a:chOff x="0" y="0"/>
+          <a:chExt cx="0" cy="0"/>
+        </a:xfrm>
+      </p:grpSpPr>
+      <p:sp>
+        <p:nvSpPr>
+          <p:cNvPr id="2" name="Title 1">
+            <a:extLst>
+              <a:ext uri="{FF2B5EF4-FFF2-40B4-BE49-F238E27FC236}">
+                <a16:creationId xmlns:a16="http://schemas.microsoft.com/office/drawing/2014/main" id="{22EB992D-5422-46F3-8EAD-64E5D460CC6B}"/>
+              </a:ext>
+            </a:extLst>
+          </p:cNvPr>
+          <p:cNvSpPr>
+            <a:spLocks noGrp="1"/>
+          </p:cNvSpPr>
+          <p:nvPr>
+            <p:ph type="title"/>
+          </p:nvPr>
+        </p:nvSpPr>
+        <p:spPr/>
+        <p:txBody>
+          <a:bodyPr/>
+          <a:lstStyle/>
+          <a:p>
+            <a:r>
+              <a:rPr lang="fr-FR" dirty="0"/>
+              <a:t>TTFAC</a:t>
+            </a:r>
+          </a:p>
+        </p:txBody>
+      </p:sp>
+      <p:sp>
+        <p:nvSpPr>
+          <p:cNvPr id="3" name="Content Placeholder 2">
+            <a:extLst>
+              <a:ext uri="{FF2B5EF4-FFF2-40B4-BE49-F238E27FC236}">
+                <a16:creationId xmlns:a16="http://schemas.microsoft.com/office/drawing/2014/main" id="{55501F2A-EA53-4FB8-9108-671FC0EF8EF5}"/>
+              </a:ext>
+            </a:extLst>
+          </p:cNvPr>
+          <p:cNvSpPr>
+            <a:spLocks noGrp="1"/>
+          </p:cNvSpPr>
+          <p:nvPr>
+            <p:ph idx="1"/>
+          </p:nvPr>
+        </p:nvSpPr>
+        <p:spPr>
+          <a:xfrm>
+            <a:off x="838200" y="1825625"/>
+            <a:ext cx="10515600" cy="505199"/>
+          </a:xfrm>
+        </p:spPr>
+        <p:txBody>
+          <a:bodyPr/>
+          <a:lstStyle/>
+          <a:p>
+            <a:r>
+              <a:rPr lang="fr-FR" dirty="0"/>
+              <a:t>Time To First Api Call</a:t>
+            </a:r>
+          </a:p>
+        </p:txBody>
+      </p:sp>
+      <p:cxnSp>
+        <p:nvCxnSpPr>
+          <p:cNvPr id="5" name="Straight Arrow Connector 4">
+            <a:extLst>
+              <a:ext uri="{FF2B5EF4-FFF2-40B4-BE49-F238E27FC236}">
+                <a16:creationId xmlns:a16="http://schemas.microsoft.com/office/drawing/2014/main" id="{77E55FE5-C275-4785-93E5-4E7BDC338582}"/>
+              </a:ext>
+            </a:extLst>
+          </p:cNvPr>
+          <p:cNvCxnSpPr/>
+          <p:nvPr/>
+        </p:nvCxnSpPr>
+        <p:spPr>
+          <a:xfrm flipV="1">
+            <a:off x="448235" y="3299012"/>
+            <a:ext cx="11447930" cy="40341"/>
+          </a:xfrm>
+          <a:prstGeom prst="straightConnector1">
+            <a:avLst/>
+          </a:prstGeom>
+          <a:ln w="76200">
+            <a:tailEnd type="triangle"/>
+          </a:ln>
+        </p:spPr>
+        <p:style>
+          <a:lnRef idx="1">
+            <a:schemeClr val="accent1"/>
+          </a:lnRef>
+          <a:fillRef idx="0">
+            <a:schemeClr val="accent1"/>
+          </a:fillRef>
+          <a:effectRef idx="0">
+            <a:schemeClr val="accent1"/>
+          </a:effectRef>
+          <a:fontRef idx="minor">
+            <a:schemeClr val="tx1"/>
+          </a:fontRef>
+        </p:style>
+      </p:cxnSp>
+      <p:cxnSp>
+        <p:nvCxnSpPr>
+          <p:cNvPr id="7" name="Straight Connector 6">
+            <a:extLst>
+              <a:ext uri="{FF2B5EF4-FFF2-40B4-BE49-F238E27FC236}">
+                <a16:creationId xmlns:a16="http://schemas.microsoft.com/office/drawing/2014/main" id="{1F4DC2A2-D096-4CE1-8734-386420825BBA}"/>
+              </a:ext>
+            </a:extLst>
+          </p:cNvPr>
+          <p:cNvCxnSpPr/>
+          <p:nvPr/>
+        </p:nvCxnSpPr>
+        <p:spPr>
+          <a:xfrm>
+            <a:off x="945776" y="2962835"/>
+            <a:ext cx="0" cy="757518"/>
+          </a:xfrm>
+          <a:prstGeom prst="line">
+            <a:avLst/>
+          </a:prstGeom>
+          <a:ln w="76200"/>
+        </p:spPr>
+        <p:style>
+          <a:lnRef idx="1">
+            <a:schemeClr val="accent1"/>
+          </a:lnRef>
+          <a:fillRef idx="0">
+            <a:schemeClr val="accent1"/>
+          </a:fillRef>
+          <a:effectRef idx="0">
+            <a:schemeClr val="accent1"/>
+          </a:effectRef>
+          <a:fontRef idx="minor">
+            <a:schemeClr val="tx1"/>
+          </a:fontRef>
+        </p:style>
+      </p:cxnSp>
+      <p:cxnSp>
+        <p:nvCxnSpPr>
+          <p:cNvPr id="9" name="Straight Connector 8">
+            <a:extLst>
+              <a:ext uri="{FF2B5EF4-FFF2-40B4-BE49-F238E27FC236}">
+                <a16:creationId xmlns:a16="http://schemas.microsoft.com/office/drawing/2014/main" id="{6173ABFB-3BC1-4567-9460-0D7DD3FEE543}"/>
+              </a:ext>
+            </a:extLst>
+          </p:cNvPr>
+          <p:cNvCxnSpPr/>
+          <p:nvPr/>
+        </p:nvCxnSpPr>
+        <p:spPr>
+          <a:xfrm>
+            <a:off x="5616388" y="2962835"/>
+            <a:ext cx="0" cy="757518"/>
+          </a:xfrm>
+          <a:prstGeom prst="line">
+            <a:avLst/>
+          </a:prstGeom>
+          <a:ln w="76200"/>
+        </p:spPr>
+        <p:style>
+          <a:lnRef idx="1">
+            <a:schemeClr val="accent1"/>
+          </a:lnRef>
+          <a:fillRef idx="0">
+            <a:schemeClr val="accent1"/>
+          </a:fillRef>
+          <a:effectRef idx="0">
+            <a:schemeClr val="accent1"/>
+          </a:effectRef>
+          <a:fontRef idx="minor">
+            <a:schemeClr val="tx1"/>
+          </a:fontRef>
+        </p:style>
+      </p:cxnSp>
+      <p:sp>
+        <p:nvSpPr>
+          <p:cNvPr id="10" name="Smiley Face 9">
+            <a:extLst>
+              <a:ext uri="{FF2B5EF4-FFF2-40B4-BE49-F238E27FC236}">
+                <a16:creationId xmlns:a16="http://schemas.microsoft.com/office/drawing/2014/main" id="{A703B60B-791D-4F54-8B07-D8CF6C46B737}"/>
+              </a:ext>
+            </a:extLst>
+          </p:cNvPr>
+          <p:cNvSpPr/>
+          <p:nvPr/>
+        </p:nvSpPr>
+        <p:spPr>
+          <a:xfrm>
+            <a:off x="5204012" y="4119282"/>
+            <a:ext cx="851637" cy="757518"/>
+          </a:xfrm>
+          <a:prstGeom prst="smileyFace">
+            <a:avLst/>
+          </a:prstGeom>
+        </p:spPr>
+        <p:style>
+          <a:lnRef idx="2">
+            <a:schemeClr val="accent1">
+              <a:shade val="50000"/>
+            </a:schemeClr>
+          </a:lnRef>
+          <a:fillRef idx="1">
+            <a:schemeClr val="accent1"/>
+          </a:fillRef>
+          <a:effectRef idx="0">
+            <a:schemeClr val="accent1"/>
+          </a:effectRef>
+          <a:fontRef idx="minor">
+            <a:schemeClr val="lt1"/>
+          </a:fontRef>
+        </p:style>
+        <p:txBody>
+          <a:bodyPr rtlCol="0" anchor="ctr"/>
+          <a:lstStyle/>
+          <a:p>
+            <a:pPr algn="ctr"/>
+            <a:endParaRPr lang="fr-FR"/>
+          </a:p>
+        </p:txBody>
+      </p:sp>
+      <p:sp>
+        <p:nvSpPr>
+          <p:cNvPr id="11" name="TextBox 10">
+            <a:extLst>
+              <a:ext uri="{FF2B5EF4-FFF2-40B4-BE49-F238E27FC236}">
+                <a16:creationId xmlns:a16="http://schemas.microsoft.com/office/drawing/2014/main" id="{AB4A950E-CB7F-46C4-84BB-ECCB6AE4E07B}"/>
+              </a:ext>
+            </a:extLst>
+          </p:cNvPr>
+          <p:cNvSpPr txBox="1"/>
+          <p:nvPr/>
+        </p:nvSpPr>
+        <p:spPr>
+          <a:xfrm>
+            <a:off x="5008762" y="4947677"/>
+            <a:ext cx="1242135" cy="369332"/>
+          </a:xfrm>
+          <a:prstGeom prst="rect">
+            <a:avLst/>
+          </a:prstGeom>
+          <a:noFill/>
+        </p:spPr>
+        <p:txBody>
+          <a:bodyPr wrap="none" rtlCol="0">
+            <a:spAutoFit/>
+          </a:bodyPr>
+          <a:lstStyle/>
+          <a:p>
+            <a:r>
+              <a:rPr lang="fr-FR" dirty="0"/>
+              <a:t>hello world</a:t>
+            </a:r>
+          </a:p>
+        </p:txBody>
+      </p:sp>
+      <p:sp>
+        <p:nvSpPr>
+          <p:cNvPr id="12" name="TextBox 11">
+            <a:extLst>
+              <a:ext uri="{FF2B5EF4-FFF2-40B4-BE49-F238E27FC236}">
+                <a16:creationId xmlns:a16="http://schemas.microsoft.com/office/drawing/2014/main" id="{F6D88214-B6AD-471B-98A0-FE5DD2003FD0}"/>
+              </a:ext>
+            </a:extLst>
+          </p:cNvPr>
+          <p:cNvSpPr txBox="1"/>
+          <p:nvPr/>
+        </p:nvSpPr>
+        <p:spPr>
+          <a:xfrm>
+            <a:off x="219635" y="3774183"/>
+            <a:ext cx="3935436" cy="369332"/>
+          </a:xfrm>
+          <a:prstGeom prst="rect">
+            <a:avLst/>
+          </a:prstGeom>
+          <a:noFill/>
+        </p:spPr>
+        <p:txBody>
+          <a:bodyPr wrap="none" rtlCol="0">
+            <a:spAutoFit/>
+          </a:bodyPr>
+          <a:lstStyle/>
+          <a:p>
+            <a:r>
+              <a:rPr lang="fr-FR" dirty="0"/>
+              <a:t>1</a:t>
+            </a:r>
+            <a:r>
+              <a:rPr lang="fr-FR" baseline="30000" dirty="0"/>
+              <a:t>er</a:t>
+            </a:r>
+            <a:r>
+              <a:rPr lang="fr-FR" dirty="0"/>
+              <a:t> fois que on arrive sur le site d’une lib</a:t>
+            </a:r>
+          </a:p>
+        </p:txBody>
+      </p:sp>
+    </p:spTree>
+    <p:extLst>
+      <p:ext uri="{BB962C8B-B14F-4D97-AF65-F5344CB8AC3E}">
+        <p14:creationId xmlns:p14="http://schemas.microsoft.com/office/powerpoint/2010/main" val="1901436749"/>
+      </p:ext>
+    </p:extLst>
+  </p:cSld>
+  <p:clrMapOvr>
+    <a:masterClrMapping/>
+  </p:clrMapOvr>
+</p:sld>
+</file>
+
+<file path=ppt/slides/slide12.xml><?xml version="1.0" encoding="utf-8"?>
+<p:sld xmlns:a="http://schemas.openxmlformats.org/drawingml/2006/main" xmlns:r="http://schemas.openxmlformats.org/officeDocument/2006/relationships" xmlns:p="http://schemas.openxmlformats.org/presentationml/2006/main">
+  <p:cSld>
+    <p:spTree>
+      <p:nvGrpSpPr>
+        <p:cNvPr id="1" name=""/>
+        <p:cNvGrpSpPr/>
+        <p:nvPr/>
+      </p:nvGrpSpPr>
+      <p:grpSpPr>
+        <a:xfrm>
+          <a:off x="0" y="0"/>
+          <a:ext cx="0" cy="0"/>
+          <a:chOff x="0" y="0"/>
+          <a:chExt cx="0" cy="0"/>
+        </a:xfrm>
+      </p:grpSpPr>
+      <p:sp>
+        <p:nvSpPr>
+          <p:cNvPr id="2" name="Title 1">
+            <a:extLst>
+              <a:ext uri="{FF2B5EF4-FFF2-40B4-BE49-F238E27FC236}">
+                <a16:creationId xmlns:a16="http://schemas.microsoft.com/office/drawing/2014/main" id="{D5722810-EDEB-4B60-A2FE-B66982AC35B9}"/>
+              </a:ext>
+            </a:extLst>
+          </p:cNvPr>
+          <p:cNvSpPr>
+            <a:spLocks noGrp="1"/>
+          </p:cNvSpPr>
+          <p:nvPr>
+            <p:ph type="title"/>
+          </p:nvPr>
+        </p:nvSpPr>
+        <p:spPr/>
+        <p:txBody>
+          <a:bodyPr/>
+          <a:lstStyle/>
+          <a:p>
+            <a:r>
+              <a:rPr lang="fr-FR" dirty="0"/>
+              <a:t>Webographie</a:t>
+            </a:r>
+          </a:p>
+        </p:txBody>
+      </p:sp>
+      <p:sp>
+        <p:nvSpPr>
+          <p:cNvPr id="3" name="Content Placeholder 2">
+            <a:extLst>
+              <a:ext uri="{FF2B5EF4-FFF2-40B4-BE49-F238E27FC236}">
+                <a16:creationId xmlns:a16="http://schemas.microsoft.com/office/drawing/2014/main" id="{A6B059E0-1AD8-4064-BE39-D9ADAC9B97FA}"/>
+              </a:ext>
+            </a:extLst>
+          </p:cNvPr>
+          <p:cNvSpPr>
+            <a:spLocks noGrp="1"/>
+          </p:cNvSpPr>
+          <p:nvPr>
+            <p:ph idx="1"/>
+          </p:nvPr>
+        </p:nvSpPr>
+        <p:spPr/>
+        <p:txBody>
+          <a:bodyPr/>
+          <a:lstStyle/>
+          <a:p>
+            <a:r>
+              <a:rPr lang="fr-FR"/>
+              <a:t>https://refactoring.guru/</a:t>
+            </a:r>
+          </a:p>
+        </p:txBody>
+      </p:sp>
+    </p:spTree>
+    <p:extLst>
+      <p:ext uri="{BB962C8B-B14F-4D97-AF65-F5344CB8AC3E}">
+        <p14:creationId xmlns:p14="http://schemas.microsoft.com/office/powerpoint/2010/main" val="3640366517"/>
+      </p:ext>
+    </p:extLst>
+  </p:cSld>
+  <p:clrMapOvr>
+    <a:masterClrMapping/>
+  </p:clrMapOvr>
+</p:sld>
+</file>
+
 <file path=ppt/slides/slide2.xml><?xml version="1.0" encoding="utf-8"?>
 <p:sld xmlns:a="http://schemas.openxmlformats.org/drawingml/2006/main" xmlns:r="http://schemas.openxmlformats.org/officeDocument/2006/relationships" xmlns:p="http://schemas.openxmlformats.org/presentationml/2006/main">
   <p:cSld>
@@ -3514,9 +4447,40 @@
               <a:t>whtouche</a:t>
             </a:r>
             <a:r>
-              <a:rPr lang="fr-FR"/>
+              <a:rPr lang="fr-FR" dirty="0"/>
               <a:t>)</a:t>
             </a:r>
+          </a:p>
+          <a:p>
+            <a:r>
+              <a:rPr lang="fr-FR" dirty="0"/>
+              <a:t>Javascript (ES6) code </a:t>
+            </a:r>
+            <a:r>
+              <a:rPr lang="fr-FR" dirty="0" err="1"/>
+              <a:t>snippets</a:t>
+            </a:r>
+            <a:endParaRPr lang="fr-FR" dirty="0"/>
+          </a:p>
+          <a:p>
+            <a:r>
+              <a:rPr lang="fr-FR" dirty="0" err="1"/>
+              <a:t>Surround</a:t>
+            </a:r>
+            <a:endParaRPr lang="fr-FR" dirty="0"/>
+          </a:p>
+          <a:p>
+            <a:r>
+              <a:rPr lang="fr-FR" dirty="0"/>
+              <a:t>TypeScript Class </a:t>
+            </a:r>
+            <a:r>
+              <a:rPr lang="fr-FR" dirty="0" err="1"/>
+              <a:t>Organizer</a:t>
+            </a:r>
+            <a:endParaRPr lang="fr-FR" dirty="0"/>
+          </a:p>
+          <a:p>
             <a:endParaRPr lang="fr-FR" dirty="0"/>
           </a:p>
         </p:txBody>
@@ -5905,6 +6869,1796 @@
     <p:extLst>
       <p:ext uri="{BB962C8B-B14F-4D97-AF65-F5344CB8AC3E}">
         <p14:creationId xmlns:p14="http://schemas.microsoft.com/office/powerpoint/2010/main" val="1965025289"/>
+      </p:ext>
+    </p:extLst>
+  </p:cSld>
+  <p:clrMapOvr>
+    <a:masterClrMapping/>
+  </p:clrMapOvr>
+</p:sld>
+</file>
+
+<file path=ppt/slides/slide8.xml><?xml version="1.0" encoding="utf-8"?>
+<p:sld xmlns:a="http://schemas.openxmlformats.org/drawingml/2006/main" xmlns:r="http://schemas.openxmlformats.org/officeDocument/2006/relationships" xmlns:p="http://schemas.openxmlformats.org/presentationml/2006/main">
+  <p:cSld>
+    <p:spTree>
+      <p:nvGrpSpPr>
+        <p:cNvPr id="1" name=""/>
+        <p:cNvGrpSpPr/>
+        <p:nvPr/>
+      </p:nvGrpSpPr>
+      <p:grpSpPr>
+        <a:xfrm>
+          <a:off x="0" y="0"/>
+          <a:ext cx="0" cy="0"/>
+          <a:chOff x="0" y="0"/>
+          <a:chExt cx="0" cy="0"/>
+        </a:xfrm>
+      </p:grpSpPr>
+      <p:sp>
+        <p:nvSpPr>
+          <p:cNvPr id="2" name="Title 1">
+            <a:extLst>
+              <a:ext uri="{FF2B5EF4-FFF2-40B4-BE49-F238E27FC236}">
+                <a16:creationId xmlns:a16="http://schemas.microsoft.com/office/drawing/2014/main" id="{D8E8E3E1-BFAB-4CF0-B16A-9B8EF5D16052}"/>
+              </a:ext>
+            </a:extLst>
+          </p:cNvPr>
+          <p:cNvSpPr>
+            <a:spLocks noGrp="1"/>
+          </p:cNvSpPr>
+          <p:nvPr>
+            <p:ph type="title"/>
+          </p:nvPr>
+        </p:nvSpPr>
+        <p:spPr/>
+        <p:txBody>
+          <a:bodyPr/>
+          <a:lstStyle/>
+          <a:p>
+            <a:r>
+              <a:rPr lang="fr-FR" dirty="0"/>
+              <a:t>Programmation asynchrone</a:t>
+            </a:r>
+          </a:p>
+        </p:txBody>
+      </p:sp>
+      <p:cxnSp>
+        <p:nvCxnSpPr>
+          <p:cNvPr id="5" name="Straight Arrow Connector 4">
+            <a:extLst>
+              <a:ext uri="{FF2B5EF4-FFF2-40B4-BE49-F238E27FC236}">
+                <a16:creationId xmlns:a16="http://schemas.microsoft.com/office/drawing/2014/main" id="{CFFF0F3C-D08C-448C-B374-000ABA9A28BE}"/>
+              </a:ext>
+            </a:extLst>
+          </p:cNvPr>
+          <p:cNvCxnSpPr/>
+          <p:nvPr/>
+        </p:nvCxnSpPr>
+        <p:spPr>
+          <a:xfrm>
+            <a:off x="372035" y="1905006"/>
+            <a:ext cx="11416553" cy="0"/>
+          </a:xfrm>
+          <a:prstGeom prst="straightConnector1">
+            <a:avLst/>
+          </a:prstGeom>
+          <a:ln w="76200">
+            <a:tailEnd type="triangle"/>
+          </a:ln>
+        </p:spPr>
+        <p:style>
+          <a:lnRef idx="1">
+            <a:schemeClr val="accent1"/>
+          </a:lnRef>
+          <a:fillRef idx="0">
+            <a:schemeClr val="accent1"/>
+          </a:fillRef>
+          <a:effectRef idx="0">
+            <a:schemeClr val="accent1"/>
+          </a:effectRef>
+          <a:fontRef idx="minor">
+            <a:schemeClr val="tx1"/>
+          </a:fontRef>
+        </p:style>
+      </p:cxnSp>
+      <p:cxnSp>
+        <p:nvCxnSpPr>
+          <p:cNvPr id="7" name="Straight Connector 6">
+            <a:extLst>
+              <a:ext uri="{FF2B5EF4-FFF2-40B4-BE49-F238E27FC236}">
+                <a16:creationId xmlns:a16="http://schemas.microsoft.com/office/drawing/2014/main" id="{1B80ED1C-F5EC-41CD-BA5A-89DB5D250B94}"/>
+              </a:ext>
+            </a:extLst>
+          </p:cNvPr>
+          <p:cNvCxnSpPr/>
+          <p:nvPr/>
+        </p:nvCxnSpPr>
+        <p:spPr>
+          <a:xfrm>
+            <a:off x="753035" y="1519523"/>
+            <a:ext cx="0" cy="833718"/>
+          </a:xfrm>
+          <a:prstGeom prst="line">
+            <a:avLst/>
+          </a:prstGeom>
+          <a:ln w="76200"/>
+        </p:spPr>
+        <p:style>
+          <a:lnRef idx="1">
+            <a:schemeClr val="accent1"/>
+          </a:lnRef>
+          <a:fillRef idx="0">
+            <a:schemeClr val="accent1"/>
+          </a:fillRef>
+          <a:effectRef idx="0">
+            <a:schemeClr val="accent1"/>
+          </a:effectRef>
+          <a:fontRef idx="minor">
+            <a:schemeClr val="tx1"/>
+          </a:fontRef>
+        </p:style>
+      </p:cxnSp>
+      <p:cxnSp>
+        <p:nvCxnSpPr>
+          <p:cNvPr id="9" name="Straight Connector 8">
+            <a:extLst>
+              <a:ext uri="{FF2B5EF4-FFF2-40B4-BE49-F238E27FC236}">
+                <a16:creationId xmlns:a16="http://schemas.microsoft.com/office/drawing/2014/main" id="{4E180ECF-CC61-4663-BA62-EEC0B691F430}"/>
+              </a:ext>
+            </a:extLst>
+          </p:cNvPr>
+          <p:cNvCxnSpPr/>
+          <p:nvPr/>
+        </p:nvCxnSpPr>
+        <p:spPr>
+          <a:xfrm>
+            <a:off x="1317811" y="1573312"/>
+            <a:ext cx="0" cy="730623"/>
+          </a:xfrm>
+          <a:prstGeom prst="line">
+            <a:avLst/>
+          </a:prstGeom>
+          <a:ln w="76200"/>
+        </p:spPr>
+        <p:style>
+          <a:lnRef idx="1">
+            <a:schemeClr val="accent1"/>
+          </a:lnRef>
+          <a:fillRef idx="0">
+            <a:schemeClr val="accent1"/>
+          </a:fillRef>
+          <a:effectRef idx="0">
+            <a:schemeClr val="accent1"/>
+          </a:effectRef>
+          <a:fontRef idx="minor">
+            <a:schemeClr val="tx1"/>
+          </a:fontRef>
+        </p:style>
+      </p:cxnSp>
+      <p:cxnSp>
+        <p:nvCxnSpPr>
+          <p:cNvPr id="11" name="Straight Connector 10">
+            <a:extLst>
+              <a:ext uri="{FF2B5EF4-FFF2-40B4-BE49-F238E27FC236}">
+                <a16:creationId xmlns:a16="http://schemas.microsoft.com/office/drawing/2014/main" id="{50A75286-D0F4-47F6-9562-98C2902EA566}"/>
+              </a:ext>
+            </a:extLst>
+          </p:cNvPr>
+          <p:cNvCxnSpPr/>
+          <p:nvPr/>
+        </p:nvCxnSpPr>
+        <p:spPr>
+          <a:xfrm>
+            <a:off x="7808259" y="1519523"/>
+            <a:ext cx="0" cy="833718"/>
+          </a:xfrm>
+          <a:prstGeom prst="line">
+            <a:avLst/>
+          </a:prstGeom>
+          <a:ln w="76200"/>
+        </p:spPr>
+        <p:style>
+          <a:lnRef idx="1">
+            <a:schemeClr val="accent1"/>
+          </a:lnRef>
+          <a:fillRef idx="0">
+            <a:schemeClr val="accent1"/>
+          </a:fillRef>
+          <a:effectRef idx="0">
+            <a:schemeClr val="accent1"/>
+          </a:effectRef>
+          <a:fontRef idx="minor">
+            <a:schemeClr val="tx1"/>
+          </a:fontRef>
+        </p:style>
+      </p:cxnSp>
+      <p:cxnSp>
+        <p:nvCxnSpPr>
+          <p:cNvPr id="13" name="Straight Connector 12">
+            <a:extLst>
+              <a:ext uri="{FF2B5EF4-FFF2-40B4-BE49-F238E27FC236}">
+                <a16:creationId xmlns:a16="http://schemas.microsoft.com/office/drawing/2014/main" id="{51EF5384-09E3-48FE-8CC3-D73E88CB7260}"/>
+              </a:ext>
+            </a:extLst>
+          </p:cNvPr>
+          <p:cNvCxnSpPr/>
+          <p:nvPr/>
+        </p:nvCxnSpPr>
+        <p:spPr>
+          <a:xfrm>
+            <a:off x="9282953" y="1488147"/>
+            <a:ext cx="0" cy="865094"/>
+          </a:xfrm>
+          <a:prstGeom prst="line">
+            <a:avLst/>
+          </a:prstGeom>
+          <a:ln w="76200"/>
+        </p:spPr>
+        <p:style>
+          <a:lnRef idx="1">
+            <a:schemeClr val="accent1"/>
+          </a:lnRef>
+          <a:fillRef idx="0">
+            <a:schemeClr val="accent1"/>
+          </a:fillRef>
+          <a:effectRef idx="0">
+            <a:schemeClr val="accent1"/>
+          </a:effectRef>
+          <a:fontRef idx="minor">
+            <a:schemeClr val="tx1"/>
+          </a:fontRef>
+        </p:style>
+      </p:cxnSp>
+      <p:sp>
+        <p:nvSpPr>
+          <p:cNvPr id="14" name="Rectangle 13">
+            <a:extLst>
+              <a:ext uri="{FF2B5EF4-FFF2-40B4-BE49-F238E27FC236}">
+                <a16:creationId xmlns:a16="http://schemas.microsoft.com/office/drawing/2014/main" id="{3697FDA8-58C9-4336-9022-708927279FA6}"/>
+              </a:ext>
+            </a:extLst>
+          </p:cNvPr>
+          <p:cNvSpPr/>
+          <p:nvPr/>
+        </p:nvSpPr>
+        <p:spPr>
+          <a:xfrm>
+            <a:off x="802341" y="1685370"/>
+            <a:ext cx="98611" cy="439271"/>
+          </a:xfrm>
+          <a:prstGeom prst="rect">
+            <a:avLst/>
+          </a:prstGeom>
+        </p:spPr>
+        <p:style>
+          <a:lnRef idx="2">
+            <a:schemeClr val="accent6">
+              <a:shade val="50000"/>
+            </a:schemeClr>
+          </a:lnRef>
+          <a:fillRef idx="1">
+            <a:schemeClr val="accent6"/>
+          </a:fillRef>
+          <a:effectRef idx="0">
+            <a:schemeClr val="accent6"/>
+          </a:effectRef>
+          <a:fontRef idx="minor">
+            <a:schemeClr val="lt1"/>
+          </a:fontRef>
+        </p:style>
+        <p:txBody>
+          <a:bodyPr rtlCol="0" anchor="ctr"/>
+          <a:lstStyle/>
+          <a:p>
+            <a:pPr algn="ctr"/>
+            <a:endParaRPr lang="fr-FR"/>
+          </a:p>
+        </p:txBody>
+      </p:sp>
+      <p:sp>
+        <p:nvSpPr>
+          <p:cNvPr id="15" name="Rectangle 14">
+            <a:extLst>
+              <a:ext uri="{FF2B5EF4-FFF2-40B4-BE49-F238E27FC236}">
+                <a16:creationId xmlns:a16="http://schemas.microsoft.com/office/drawing/2014/main" id="{45F42A84-AC5F-4369-A104-469F3C9AD41E}"/>
+              </a:ext>
+            </a:extLst>
+          </p:cNvPr>
+          <p:cNvSpPr/>
+          <p:nvPr/>
+        </p:nvSpPr>
+        <p:spPr>
+          <a:xfrm>
+            <a:off x="1362642" y="1685367"/>
+            <a:ext cx="103078" cy="439271"/>
+          </a:xfrm>
+          <a:prstGeom prst="rect">
+            <a:avLst/>
+          </a:prstGeom>
+        </p:spPr>
+        <p:style>
+          <a:lnRef idx="2">
+            <a:schemeClr val="accent6">
+              <a:shade val="50000"/>
+            </a:schemeClr>
+          </a:lnRef>
+          <a:fillRef idx="1">
+            <a:schemeClr val="accent6"/>
+          </a:fillRef>
+          <a:effectRef idx="0">
+            <a:schemeClr val="accent6"/>
+          </a:effectRef>
+          <a:fontRef idx="minor">
+            <a:schemeClr val="lt1"/>
+          </a:fontRef>
+        </p:style>
+        <p:txBody>
+          <a:bodyPr rtlCol="0" anchor="ctr"/>
+          <a:lstStyle/>
+          <a:p>
+            <a:pPr algn="ctr"/>
+            <a:endParaRPr lang="fr-FR"/>
+          </a:p>
+        </p:txBody>
+      </p:sp>
+      <p:sp>
+        <p:nvSpPr>
+          <p:cNvPr id="16" name="Rectangle 15">
+            <a:extLst>
+              <a:ext uri="{FF2B5EF4-FFF2-40B4-BE49-F238E27FC236}">
+                <a16:creationId xmlns:a16="http://schemas.microsoft.com/office/drawing/2014/main" id="{BF59235C-C290-4566-B2D0-1210397109BE}"/>
+              </a:ext>
+            </a:extLst>
+          </p:cNvPr>
+          <p:cNvSpPr/>
+          <p:nvPr/>
+        </p:nvSpPr>
+        <p:spPr>
+          <a:xfrm>
+            <a:off x="7832914" y="1685369"/>
+            <a:ext cx="123254" cy="439271"/>
+          </a:xfrm>
+          <a:prstGeom prst="rect">
+            <a:avLst/>
+          </a:prstGeom>
+        </p:spPr>
+        <p:style>
+          <a:lnRef idx="2">
+            <a:schemeClr val="accent6">
+              <a:shade val="50000"/>
+            </a:schemeClr>
+          </a:lnRef>
+          <a:fillRef idx="1">
+            <a:schemeClr val="accent6"/>
+          </a:fillRef>
+          <a:effectRef idx="0">
+            <a:schemeClr val="accent6"/>
+          </a:effectRef>
+          <a:fontRef idx="minor">
+            <a:schemeClr val="lt1"/>
+          </a:fontRef>
+        </p:style>
+        <p:txBody>
+          <a:bodyPr rtlCol="0" anchor="ctr"/>
+          <a:lstStyle/>
+          <a:p>
+            <a:pPr algn="ctr"/>
+            <a:endParaRPr lang="fr-FR"/>
+          </a:p>
+        </p:txBody>
+      </p:sp>
+      <p:sp>
+        <p:nvSpPr>
+          <p:cNvPr id="17" name="Rectangle 16">
+            <a:extLst>
+              <a:ext uri="{FF2B5EF4-FFF2-40B4-BE49-F238E27FC236}">
+                <a16:creationId xmlns:a16="http://schemas.microsoft.com/office/drawing/2014/main" id="{BE87D092-411A-4D11-B9DB-E7DD2EFDB20E}"/>
+              </a:ext>
+            </a:extLst>
+          </p:cNvPr>
+          <p:cNvSpPr/>
+          <p:nvPr/>
+        </p:nvSpPr>
+        <p:spPr>
+          <a:xfrm>
+            <a:off x="9312095" y="1685366"/>
+            <a:ext cx="82917" cy="439271"/>
+          </a:xfrm>
+          <a:prstGeom prst="rect">
+            <a:avLst/>
+          </a:prstGeom>
+        </p:spPr>
+        <p:style>
+          <a:lnRef idx="2">
+            <a:schemeClr val="accent6">
+              <a:shade val="50000"/>
+            </a:schemeClr>
+          </a:lnRef>
+          <a:fillRef idx="1">
+            <a:schemeClr val="accent6"/>
+          </a:fillRef>
+          <a:effectRef idx="0">
+            <a:schemeClr val="accent6"/>
+          </a:effectRef>
+          <a:fontRef idx="minor">
+            <a:schemeClr val="lt1"/>
+          </a:fontRef>
+        </p:style>
+        <p:txBody>
+          <a:bodyPr rtlCol="0" anchor="ctr"/>
+          <a:lstStyle/>
+          <a:p>
+            <a:pPr algn="ctr"/>
+            <a:endParaRPr lang="fr-FR"/>
+          </a:p>
+        </p:txBody>
+      </p:sp>
+      <p:sp>
+        <p:nvSpPr>
+          <p:cNvPr id="18" name="Rectangle 17">
+            <a:extLst>
+              <a:ext uri="{FF2B5EF4-FFF2-40B4-BE49-F238E27FC236}">
+                <a16:creationId xmlns:a16="http://schemas.microsoft.com/office/drawing/2014/main" id="{CF378ECD-7A9A-4010-A4A2-353371F917FE}"/>
+              </a:ext>
+            </a:extLst>
+          </p:cNvPr>
+          <p:cNvSpPr/>
+          <p:nvPr/>
+        </p:nvSpPr>
+        <p:spPr>
+          <a:xfrm>
+            <a:off x="1783976" y="5060572"/>
+            <a:ext cx="3285565" cy="1667429"/>
+          </a:xfrm>
+          <a:prstGeom prst="rect">
+            <a:avLst/>
+          </a:prstGeom>
+        </p:spPr>
+        <p:style>
+          <a:lnRef idx="2">
+            <a:schemeClr val="accent1"/>
+          </a:lnRef>
+          <a:fillRef idx="1">
+            <a:schemeClr val="lt1"/>
+          </a:fillRef>
+          <a:effectRef idx="0">
+            <a:schemeClr val="accent1"/>
+          </a:effectRef>
+          <a:fontRef idx="minor">
+            <a:schemeClr val="dk1"/>
+          </a:fontRef>
+        </p:style>
+        <p:txBody>
+          <a:bodyPr rtlCol="0" anchor="ctr"/>
+          <a:lstStyle/>
+          <a:p>
+            <a:pPr algn="ctr"/>
+            <a:endParaRPr lang="fr-FR"/>
+          </a:p>
+        </p:txBody>
+      </p:sp>
+      <p:sp>
+        <p:nvSpPr>
+          <p:cNvPr id="19" name="Rectangle 18">
+            <a:extLst>
+              <a:ext uri="{FF2B5EF4-FFF2-40B4-BE49-F238E27FC236}">
+                <a16:creationId xmlns:a16="http://schemas.microsoft.com/office/drawing/2014/main" id="{F9FBEE94-2A66-4E4B-8DB0-72549200C942}"/>
+              </a:ext>
+            </a:extLst>
+          </p:cNvPr>
+          <p:cNvSpPr/>
+          <p:nvPr/>
+        </p:nvSpPr>
+        <p:spPr>
+          <a:xfrm>
+            <a:off x="2048435" y="5347443"/>
+            <a:ext cx="1098177" cy="905435"/>
+          </a:xfrm>
+          <a:prstGeom prst="rect">
+            <a:avLst/>
+          </a:prstGeom>
+        </p:spPr>
+        <p:style>
+          <a:lnRef idx="2">
+            <a:schemeClr val="accent1">
+              <a:shade val="50000"/>
+            </a:schemeClr>
+          </a:lnRef>
+          <a:fillRef idx="1">
+            <a:schemeClr val="accent1"/>
+          </a:fillRef>
+          <a:effectRef idx="0">
+            <a:schemeClr val="accent1"/>
+          </a:effectRef>
+          <a:fontRef idx="minor">
+            <a:schemeClr val="lt1"/>
+          </a:fontRef>
+        </p:style>
+        <p:txBody>
+          <a:bodyPr rtlCol="0" anchor="ctr"/>
+          <a:lstStyle/>
+          <a:p>
+            <a:pPr algn="ctr"/>
+            <a:r>
+              <a:rPr lang="fr-FR" dirty="0"/>
+              <a:t>CPU</a:t>
+            </a:r>
+          </a:p>
+        </p:txBody>
+      </p:sp>
+      <p:sp>
+        <p:nvSpPr>
+          <p:cNvPr id="20" name="Rectangle 19">
+            <a:extLst>
+              <a:ext uri="{FF2B5EF4-FFF2-40B4-BE49-F238E27FC236}">
+                <a16:creationId xmlns:a16="http://schemas.microsoft.com/office/drawing/2014/main" id="{88AB314F-F544-4694-B963-232B5A4A6017}"/>
+              </a:ext>
+            </a:extLst>
+          </p:cNvPr>
+          <p:cNvSpPr/>
+          <p:nvPr/>
+        </p:nvSpPr>
+        <p:spPr>
+          <a:xfrm>
+            <a:off x="3751729" y="5347443"/>
+            <a:ext cx="1048871" cy="905435"/>
+          </a:xfrm>
+          <a:prstGeom prst="rect">
+            <a:avLst/>
+          </a:prstGeom>
+        </p:spPr>
+        <p:style>
+          <a:lnRef idx="2">
+            <a:schemeClr val="accent1">
+              <a:shade val="50000"/>
+            </a:schemeClr>
+          </a:lnRef>
+          <a:fillRef idx="1">
+            <a:schemeClr val="accent1"/>
+          </a:fillRef>
+          <a:effectRef idx="0">
+            <a:schemeClr val="accent1"/>
+          </a:effectRef>
+          <a:fontRef idx="minor">
+            <a:schemeClr val="lt1"/>
+          </a:fontRef>
+        </p:style>
+        <p:txBody>
+          <a:bodyPr rtlCol="0" anchor="ctr"/>
+          <a:lstStyle/>
+          <a:p>
+            <a:pPr algn="ctr"/>
+            <a:r>
+              <a:rPr lang="fr-FR" dirty="0"/>
+              <a:t>RAM</a:t>
+            </a:r>
+          </a:p>
+        </p:txBody>
+      </p:sp>
+      <p:cxnSp>
+        <p:nvCxnSpPr>
+          <p:cNvPr id="22" name="Straight Arrow Connector 21">
+            <a:extLst>
+              <a:ext uri="{FF2B5EF4-FFF2-40B4-BE49-F238E27FC236}">
+                <a16:creationId xmlns:a16="http://schemas.microsoft.com/office/drawing/2014/main" id="{E27E22AF-E622-47C5-85CF-D5339C333DC8}"/>
+              </a:ext>
+            </a:extLst>
+          </p:cNvPr>
+          <p:cNvCxnSpPr>
+            <a:cxnSpLocks/>
+          </p:cNvCxnSpPr>
+          <p:nvPr/>
+        </p:nvCxnSpPr>
+        <p:spPr>
+          <a:xfrm>
+            <a:off x="3166782" y="5629832"/>
+            <a:ext cx="605117" cy="0"/>
+          </a:xfrm>
+          <a:prstGeom prst="straightConnector1">
+            <a:avLst/>
+          </a:prstGeom>
+          <a:ln w="76200">
+            <a:tailEnd type="triangle"/>
+          </a:ln>
+        </p:spPr>
+        <p:style>
+          <a:lnRef idx="1">
+            <a:schemeClr val="accent1"/>
+          </a:lnRef>
+          <a:fillRef idx="0">
+            <a:schemeClr val="accent1"/>
+          </a:fillRef>
+          <a:effectRef idx="0">
+            <a:schemeClr val="accent1"/>
+          </a:effectRef>
+          <a:fontRef idx="minor">
+            <a:schemeClr val="tx1"/>
+          </a:fontRef>
+        </p:style>
+      </p:cxnSp>
+      <p:cxnSp>
+        <p:nvCxnSpPr>
+          <p:cNvPr id="24" name="Straight Arrow Connector 23">
+            <a:extLst>
+              <a:ext uri="{FF2B5EF4-FFF2-40B4-BE49-F238E27FC236}">
+                <a16:creationId xmlns:a16="http://schemas.microsoft.com/office/drawing/2014/main" id="{77AC0152-60FB-4972-B251-E404D4D74B2A}"/>
+              </a:ext>
+            </a:extLst>
+          </p:cNvPr>
+          <p:cNvCxnSpPr/>
+          <p:nvPr/>
+        </p:nvCxnSpPr>
+        <p:spPr>
+          <a:xfrm flipH="1">
+            <a:off x="3097306" y="5943596"/>
+            <a:ext cx="654423" cy="0"/>
+          </a:xfrm>
+          <a:prstGeom prst="straightConnector1">
+            <a:avLst/>
+          </a:prstGeom>
+          <a:ln w="76200">
+            <a:tailEnd type="triangle"/>
+          </a:ln>
+        </p:spPr>
+        <p:style>
+          <a:lnRef idx="1">
+            <a:schemeClr val="accent1"/>
+          </a:lnRef>
+          <a:fillRef idx="0">
+            <a:schemeClr val="accent1"/>
+          </a:fillRef>
+          <a:effectRef idx="0">
+            <a:schemeClr val="accent1"/>
+          </a:effectRef>
+          <a:fontRef idx="minor">
+            <a:schemeClr val="tx1"/>
+          </a:fontRef>
+        </p:style>
+      </p:cxnSp>
+      <p:cxnSp>
+        <p:nvCxnSpPr>
+          <p:cNvPr id="26" name="Straight Connector 25">
+            <a:extLst>
+              <a:ext uri="{FF2B5EF4-FFF2-40B4-BE49-F238E27FC236}">
+                <a16:creationId xmlns:a16="http://schemas.microsoft.com/office/drawing/2014/main" id="{906F8B6A-96A7-4552-88D4-1FD51725DC37}"/>
+              </a:ext>
+            </a:extLst>
+          </p:cNvPr>
+          <p:cNvCxnSpPr>
+            <a:cxnSpLocks/>
+          </p:cNvCxnSpPr>
+          <p:nvPr/>
+        </p:nvCxnSpPr>
+        <p:spPr>
+          <a:xfrm flipV="1">
+            <a:off x="2375647" y="4670608"/>
+            <a:ext cx="0" cy="676835"/>
+          </a:xfrm>
+          <a:prstGeom prst="line">
+            <a:avLst/>
+          </a:prstGeom>
+          <a:ln w="76200"/>
+        </p:spPr>
+        <p:style>
+          <a:lnRef idx="1">
+            <a:schemeClr val="accent1"/>
+          </a:lnRef>
+          <a:fillRef idx="0">
+            <a:schemeClr val="accent1"/>
+          </a:fillRef>
+          <a:effectRef idx="0">
+            <a:schemeClr val="accent1"/>
+          </a:effectRef>
+          <a:fontRef idx="minor">
+            <a:schemeClr val="tx1"/>
+          </a:fontRef>
+        </p:style>
+      </p:cxnSp>
+      <p:sp>
+        <p:nvSpPr>
+          <p:cNvPr id="28" name="Rectangle 27">
+            <a:extLst>
+              <a:ext uri="{FF2B5EF4-FFF2-40B4-BE49-F238E27FC236}">
+                <a16:creationId xmlns:a16="http://schemas.microsoft.com/office/drawing/2014/main" id="{F9B7D75A-6FF3-4FB5-845E-B35604C36C43}"/>
+              </a:ext>
+            </a:extLst>
+          </p:cNvPr>
+          <p:cNvSpPr/>
+          <p:nvPr/>
+        </p:nvSpPr>
+        <p:spPr>
+          <a:xfrm>
+            <a:off x="2026023" y="4146172"/>
+            <a:ext cx="712694" cy="524435"/>
+          </a:xfrm>
+          <a:prstGeom prst="rect">
+            <a:avLst/>
+          </a:prstGeom>
+        </p:spPr>
+        <p:style>
+          <a:lnRef idx="2">
+            <a:schemeClr val="accent1">
+              <a:shade val="50000"/>
+            </a:schemeClr>
+          </a:lnRef>
+          <a:fillRef idx="1">
+            <a:schemeClr val="accent1"/>
+          </a:fillRef>
+          <a:effectRef idx="0">
+            <a:schemeClr val="accent1"/>
+          </a:effectRef>
+          <a:fontRef idx="minor">
+            <a:schemeClr val="lt1"/>
+          </a:fontRef>
+        </p:style>
+        <p:txBody>
+          <a:bodyPr rtlCol="0" anchor="ctr"/>
+          <a:lstStyle/>
+          <a:p>
+            <a:pPr algn="ctr"/>
+            <a:r>
+              <a:rPr lang="fr-FR" dirty="0"/>
+              <a:t>ctrl</a:t>
+            </a:r>
+          </a:p>
+        </p:txBody>
+      </p:sp>
+      <p:cxnSp>
+        <p:nvCxnSpPr>
+          <p:cNvPr id="30" name="Straight Connector 29">
+            <a:extLst>
+              <a:ext uri="{FF2B5EF4-FFF2-40B4-BE49-F238E27FC236}">
+                <a16:creationId xmlns:a16="http://schemas.microsoft.com/office/drawing/2014/main" id="{2ED8E9B6-28EC-4400-9F0E-59C2625C6DC7}"/>
+              </a:ext>
+            </a:extLst>
+          </p:cNvPr>
+          <p:cNvCxnSpPr>
+            <a:cxnSpLocks/>
+            <a:stCxn id="28" idx="3"/>
+            <a:endCxn id="32" idx="2"/>
+          </p:cNvCxnSpPr>
+          <p:nvPr/>
+        </p:nvCxnSpPr>
+        <p:spPr>
+          <a:xfrm>
+            <a:off x="2738717" y="4408390"/>
+            <a:ext cx="4222377" cy="250987"/>
+          </a:xfrm>
+          <a:prstGeom prst="line">
+            <a:avLst/>
+          </a:prstGeom>
+          <a:ln w="76200"/>
+        </p:spPr>
+        <p:style>
+          <a:lnRef idx="1">
+            <a:schemeClr val="accent1"/>
+          </a:lnRef>
+          <a:fillRef idx="0">
+            <a:schemeClr val="accent1"/>
+          </a:fillRef>
+          <a:effectRef idx="0">
+            <a:schemeClr val="accent1"/>
+          </a:effectRef>
+          <a:fontRef idx="minor">
+            <a:schemeClr val="tx1"/>
+          </a:fontRef>
+        </p:style>
+      </p:cxnSp>
+      <p:sp>
+        <p:nvSpPr>
+          <p:cNvPr id="32" name="Flowchart: Magnetic Disk 31">
+            <a:extLst>
+              <a:ext uri="{FF2B5EF4-FFF2-40B4-BE49-F238E27FC236}">
+                <a16:creationId xmlns:a16="http://schemas.microsoft.com/office/drawing/2014/main" id="{B802C15B-539D-4E5D-9BEB-37FAA2FADA22}"/>
+              </a:ext>
+            </a:extLst>
+          </p:cNvPr>
+          <p:cNvSpPr/>
+          <p:nvPr/>
+        </p:nvSpPr>
+        <p:spPr>
+          <a:xfrm>
+            <a:off x="6961094" y="4468902"/>
+            <a:ext cx="3536575" cy="380949"/>
+          </a:xfrm>
+          <a:prstGeom prst="flowChartMagneticDisk">
+            <a:avLst/>
+          </a:prstGeom>
+        </p:spPr>
+        <p:style>
+          <a:lnRef idx="2">
+            <a:schemeClr val="accent1">
+              <a:shade val="50000"/>
+            </a:schemeClr>
+          </a:lnRef>
+          <a:fillRef idx="1">
+            <a:schemeClr val="accent1"/>
+          </a:fillRef>
+          <a:effectRef idx="0">
+            <a:schemeClr val="accent1"/>
+          </a:effectRef>
+          <a:fontRef idx="minor">
+            <a:schemeClr val="lt1"/>
+          </a:fontRef>
+        </p:style>
+        <p:txBody>
+          <a:bodyPr rtlCol="0" anchor="ctr"/>
+          <a:lstStyle/>
+          <a:p>
+            <a:pPr algn="ctr"/>
+            <a:endParaRPr lang="fr-FR"/>
+          </a:p>
+        </p:txBody>
+      </p:sp>
+      <p:cxnSp>
+        <p:nvCxnSpPr>
+          <p:cNvPr id="35" name="Straight Connector 34">
+            <a:extLst>
+              <a:ext uri="{FF2B5EF4-FFF2-40B4-BE49-F238E27FC236}">
+                <a16:creationId xmlns:a16="http://schemas.microsoft.com/office/drawing/2014/main" id="{D495E5B4-8455-4EC3-A7AA-78B231F7F27E}"/>
+              </a:ext>
+            </a:extLst>
+          </p:cNvPr>
+          <p:cNvCxnSpPr>
+            <a:stCxn id="19" idx="1"/>
+          </p:cNvCxnSpPr>
+          <p:nvPr/>
+        </p:nvCxnSpPr>
+        <p:spPr>
+          <a:xfrm flipH="1">
+            <a:off x="1080247" y="5800161"/>
+            <a:ext cx="968188" cy="0"/>
+          </a:xfrm>
+          <a:prstGeom prst="line">
+            <a:avLst/>
+          </a:prstGeom>
+          <a:ln w="76200"/>
+        </p:spPr>
+        <p:style>
+          <a:lnRef idx="1">
+            <a:schemeClr val="accent1"/>
+          </a:lnRef>
+          <a:fillRef idx="0">
+            <a:schemeClr val="accent1"/>
+          </a:fillRef>
+          <a:effectRef idx="0">
+            <a:schemeClr val="accent1"/>
+          </a:effectRef>
+          <a:fontRef idx="minor">
+            <a:schemeClr val="tx1"/>
+          </a:fontRef>
+        </p:style>
+      </p:cxnSp>
+      <p:sp>
+        <p:nvSpPr>
+          <p:cNvPr id="36" name="Rectangle 35">
+            <a:extLst>
+              <a:ext uri="{FF2B5EF4-FFF2-40B4-BE49-F238E27FC236}">
+                <a16:creationId xmlns:a16="http://schemas.microsoft.com/office/drawing/2014/main" id="{E6B4C7AE-2210-4BAA-9263-25AD7677C0A9}"/>
+              </a:ext>
+            </a:extLst>
+          </p:cNvPr>
+          <p:cNvSpPr/>
+          <p:nvPr/>
+        </p:nvSpPr>
+        <p:spPr>
+          <a:xfrm>
+            <a:off x="493059" y="5544667"/>
+            <a:ext cx="578223" cy="506503"/>
+          </a:xfrm>
+          <a:prstGeom prst="rect">
+            <a:avLst/>
+          </a:prstGeom>
+        </p:spPr>
+        <p:style>
+          <a:lnRef idx="2">
+            <a:schemeClr val="accent1">
+              <a:shade val="50000"/>
+            </a:schemeClr>
+          </a:lnRef>
+          <a:fillRef idx="1">
+            <a:schemeClr val="accent1"/>
+          </a:fillRef>
+          <a:effectRef idx="0">
+            <a:schemeClr val="accent1"/>
+          </a:effectRef>
+          <a:fontRef idx="minor">
+            <a:schemeClr val="lt1"/>
+          </a:fontRef>
+        </p:style>
+        <p:txBody>
+          <a:bodyPr rtlCol="0" anchor="ctr"/>
+          <a:lstStyle/>
+          <a:p>
+            <a:pPr algn="ctr"/>
+            <a:endParaRPr lang="fr-FR"/>
+          </a:p>
+        </p:txBody>
+      </p:sp>
+      <p:cxnSp>
+        <p:nvCxnSpPr>
+          <p:cNvPr id="37" name="Straight Arrow Connector 36">
+            <a:extLst>
+              <a:ext uri="{FF2B5EF4-FFF2-40B4-BE49-F238E27FC236}">
+                <a16:creationId xmlns:a16="http://schemas.microsoft.com/office/drawing/2014/main" id="{C177FCC0-F083-4327-8A00-BDA3953DD69C}"/>
+              </a:ext>
+            </a:extLst>
+          </p:cNvPr>
+          <p:cNvCxnSpPr/>
+          <p:nvPr/>
+        </p:nvCxnSpPr>
+        <p:spPr>
+          <a:xfrm>
+            <a:off x="372034" y="3240746"/>
+            <a:ext cx="11416553" cy="0"/>
+          </a:xfrm>
+          <a:prstGeom prst="straightConnector1">
+            <a:avLst/>
+          </a:prstGeom>
+          <a:ln w="76200">
+            <a:tailEnd type="triangle"/>
+          </a:ln>
+        </p:spPr>
+        <p:style>
+          <a:lnRef idx="1">
+            <a:schemeClr val="accent1"/>
+          </a:lnRef>
+          <a:fillRef idx="0">
+            <a:schemeClr val="accent1"/>
+          </a:fillRef>
+          <a:effectRef idx="0">
+            <a:schemeClr val="accent1"/>
+          </a:effectRef>
+          <a:fontRef idx="minor">
+            <a:schemeClr val="tx1"/>
+          </a:fontRef>
+        </p:style>
+      </p:cxnSp>
+      <p:cxnSp>
+        <p:nvCxnSpPr>
+          <p:cNvPr id="39" name="Straight Arrow Connector 38">
+            <a:extLst>
+              <a:ext uri="{FF2B5EF4-FFF2-40B4-BE49-F238E27FC236}">
+                <a16:creationId xmlns:a16="http://schemas.microsoft.com/office/drawing/2014/main" id="{71145647-1BBB-4111-B1E1-6790878BF0E7}"/>
+              </a:ext>
+            </a:extLst>
+          </p:cNvPr>
+          <p:cNvCxnSpPr/>
+          <p:nvPr/>
+        </p:nvCxnSpPr>
+        <p:spPr>
+          <a:xfrm>
+            <a:off x="900953" y="2263588"/>
+            <a:ext cx="0" cy="927847"/>
+          </a:xfrm>
+          <a:prstGeom prst="straightConnector1">
+            <a:avLst/>
+          </a:prstGeom>
+          <a:ln w="76200">
+            <a:tailEnd type="triangle"/>
+          </a:ln>
+        </p:spPr>
+        <p:style>
+          <a:lnRef idx="1">
+            <a:schemeClr val="accent1"/>
+          </a:lnRef>
+          <a:fillRef idx="0">
+            <a:schemeClr val="accent1"/>
+          </a:fillRef>
+          <a:effectRef idx="0">
+            <a:schemeClr val="accent1"/>
+          </a:effectRef>
+          <a:fontRef idx="minor">
+            <a:schemeClr val="tx1"/>
+          </a:fontRef>
+        </p:style>
+      </p:cxnSp>
+      <p:sp>
+        <p:nvSpPr>
+          <p:cNvPr id="40" name="Rectangle 39">
+            <a:extLst>
+              <a:ext uri="{FF2B5EF4-FFF2-40B4-BE49-F238E27FC236}">
+                <a16:creationId xmlns:a16="http://schemas.microsoft.com/office/drawing/2014/main" id="{42E2CD19-1898-4A46-99C9-767CB4A7278E}"/>
+              </a:ext>
+            </a:extLst>
+          </p:cNvPr>
+          <p:cNvSpPr/>
+          <p:nvPr/>
+        </p:nvSpPr>
+        <p:spPr>
+          <a:xfrm>
+            <a:off x="1017494" y="3088341"/>
+            <a:ext cx="4468903" cy="340655"/>
+          </a:xfrm>
+          <a:prstGeom prst="rect">
+            <a:avLst/>
+          </a:prstGeom>
+        </p:spPr>
+        <p:style>
+          <a:lnRef idx="2">
+            <a:schemeClr val="accent1">
+              <a:shade val="50000"/>
+            </a:schemeClr>
+          </a:lnRef>
+          <a:fillRef idx="1">
+            <a:schemeClr val="accent1"/>
+          </a:fillRef>
+          <a:effectRef idx="0">
+            <a:schemeClr val="accent1"/>
+          </a:effectRef>
+          <a:fontRef idx="minor">
+            <a:schemeClr val="lt1"/>
+          </a:fontRef>
+        </p:style>
+        <p:txBody>
+          <a:bodyPr rtlCol="0" anchor="ctr"/>
+          <a:lstStyle/>
+          <a:p>
+            <a:pPr algn="ctr"/>
+            <a:endParaRPr lang="fr-FR"/>
+          </a:p>
+        </p:txBody>
+      </p:sp>
+      <p:cxnSp>
+        <p:nvCxnSpPr>
+          <p:cNvPr id="42" name="Straight Arrow Connector 41">
+            <a:extLst>
+              <a:ext uri="{FF2B5EF4-FFF2-40B4-BE49-F238E27FC236}">
+                <a16:creationId xmlns:a16="http://schemas.microsoft.com/office/drawing/2014/main" id="{FC565652-B747-4E75-B252-B233D0269A3E}"/>
+              </a:ext>
+            </a:extLst>
+          </p:cNvPr>
+          <p:cNvCxnSpPr/>
+          <p:nvPr/>
+        </p:nvCxnSpPr>
+        <p:spPr>
+          <a:xfrm flipV="1">
+            <a:off x="5486397" y="1981200"/>
+            <a:ext cx="67238" cy="981635"/>
+          </a:xfrm>
+          <a:prstGeom prst="straightConnector1">
+            <a:avLst/>
+          </a:prstGeom>
+          <a:ln w="76200">
+            <a:tailEnd type="triangle"/>
+          </a:ln>
+        </p:spPr>
+        <p:style>
+          <a:lnRef idx="1">
+            <a:schemeClr val="accent1"/>
+          </a:lnRef>
+          <a:fillRef idx="0">
+            <a:schemeClr val="accent1"/>
+          </a:fillRef>
+          <a:effectRef idx="0">
+            <a:schemeClr val="accent1"/>
+          </a:effectRef>
+          <a:fontRef idx="minor">
+            <a:schemeClr val="tx1"/>
+          </a:fontRef>
+        </p:style>
+      </p:cxnSp>
+      <p:cxnSp>
+        <p:nvCxnSpPr>
+          <p:cNvPr id="44" name="Straight Connector 43">
+            <a:extLst>
+              <a:ext uri="{FF2B5EF4-FFF2-40B4-BE49-F238E27FC236}">
+                <a16:creationId xmlns:a16="http://schemas.microsoft.com/office/drawing/2014/main" id="{A2405BB9-EFB5-4B92-AE8A-F17D6467A558}"/>
+              </a:ext>
+            </a:extLst>
+          </p:cNvPr>
+          <p:cNvCxnSpPr/>
+          <p:nvPr/>
+        </p:nvCxnSpPr>
+        <p:spPr>
+          <a:xfrm>
+            <a:off x="5634318" y="1609165"/>
+            <a:ext cx="0" cy="614082"/>
+          </a:xfrm>
+          <a:prstGeom prst="line">
+            <a:avLst/>
+          </a:prstGeom>
+          <a:ln w="76200"/>
+        </p:spPr>
+        <p:style>
+          <a:lnRef idx="1">
+            <a:schemeClr val="accent1"/>
+          </a:lnRef>
+          <a:fillRef idx="0">
+            <a:schemeClr val="accent1"/>
+          </a:fillRef>
+          <a:effectRef idx="0">
+            <a:schemeClr val="accent1"/>
+          </a:effectRef>
+          <a:fontRef idx="minor">
+            <a:schemeClr val="tx1"/>
+          </a:fontRef>
+        </p:style>
+      </p:cxnSp>
+      <p:sp>
+        <p:nvSpPr>
+          <p:cNvPr id="45" name="Rectangle 44">
+            <a:extLst>
+              <a:ext uri="{FF2B5EF4-FFF2-40B4-BE49-F238E27FC236}">
+                <a16:creationId xmlns:a16="http://schemas.microsoft.com/office/drawing/2014/main" id="{2423A141-1A94-4153-87EB-CF1D64B9DFF9}"/>
+              </a:ext>
+            </a:extLst>
+          </p:cNvPr>
+          <p:cNvSpPr/>
+          <p:nvPr/>
+        </p:nvSpPr>
+        <p:spPr>
+          <a:xfrm>
+            <a:off x="5650008" y="1689581"/>
+            <a:ext cx="98611" cy="439271"/>
+          </a:xfrm>
+          <a:prstGeom prst="rect">
+            <a:avLst/>
+          </a:prstGeom>
+        </p:spPr>
+        <p:style>
+          <a:lnRef idx="2">
+            <a:schemeClr val="accent6">
+              <a:shade val="50000"/>
+            </a:schemeClr>
+          </a:lnRef>
+          <a:fillRef idx="1">
+            <a:schemeClr val="accent6"/>
+          </a:fillRef>
+          <a:effectRef idx="0">
+            <a:schemeClr val="accent6"/>
+          </a:effectRef>
+          <a:fontRef idx="minor">
+            <a:schemeClr val="lt1"/>
+          </a:fontRef>
+        </p:style>
+        <p:txBody>
+          <a:bodyPr rtlCol="0" anchor="ctr"/>
+          <a:lstStyle/>
+          <a:p>
+            <a:pPr algn="ctr"/>
+            <a:endParaRPr lang="fr-FR"/>
+          </a:p>
+        </p:txBody>
+      </p:sp>
+      <p:cxnSp>
+        <p:nvCxnSpPr>
+          <p:cNvPr id="47" name="Straight Arrow Connector 46">
+            <a:extLst>
+              <a:ext uri="{FF2B5EF4-FFF2-40B4-BE49-F238E27FC236}">
+                <a16:creationId xmlns:a16="http://schemas.microsoft.com/office/drawing/2014/main" id="{31F08059-B8CB-430E-BD11-11D44C954887}"/>
+              </a:ext>
+            </a:extLst>
+          </p:cNvPr>
+          <p:cNvCxnSpPr/>
+          <p:nvPr/>
+        </p:nvCxnSpPr>
+        <p:spPr>
+          <a:xfrm>
+            <a:off x="5748619" y="2228845"/>
+            <a:ext cx="168087" cy="758645"/>
+          </a:xfrm>
+          <a:prstGeom prst="straightConnector1">
+            <a:avLst/>
+          </a:prstGeom>
+          <a:ln w="76200">
+            <a:tailEnd type="triangle"/>
+          </a:ln>
+        </p:spPr>
+        <p:style>
+          <a:lnRef idx="1">
+            <a:schemeClr val="accent1"/>
+          </a:lnRef>
+          <a:fillRef idx="0">
+            <a:schemeClr val="accent1"/>
+          </a:fillRef>
+          <a:effectRef idx="0">
+            <a:schemeClr val="accent1"/>
+          </a:effectRef>
+          <a:fontRef idx="minor">
+            <a:schemeClr val="tx1"/>
+          </a:fontRef>
+        </p:style>
+      </p:cxnSp>
+      <p:sp>
+        <p:nvSpPr>
+          <p:cNvPr id="48" name="Rectangle 47">
+            <a:extLst>
+              <a:ext uri="{FF2B5EF4-FFF2-40B4-BE49-F238E27FC236}">
+                <a16:creationId xmlns:a16="http://schemas.microsoft.com/office/drawing/2014/main" id="{DC83EDF1-4D53-4FC8-AC42-F03ACC7EF83A}"/>
+              </a:ext>
+            </a:extLst>
+          </p:cNvPr>
+          <p:cNvSpPr/>
+          <p:nvPr/>
+        </p:nvSpPr>
+        <p:spPr>
+          <a:xfrm>
+            <a:off x="5867400" y="3085232"/>
+            <a:ext cx="4468903" cy="340655"/>
+          </a:xfrm>
+          <a:prstGeom prst="rect">
+            <a:avLst/>
+          </a:prstGeom>
+        </p:spPr>
+        <p:style>
+          <a:lnRef idx="2">
+            <a:schemeClr val="accent1">
+              <a:shade val="50000"/>
+            </a:schemeClr>
+          </a:lnRef>
+          <a:fillRef idx="1">
+            <a:schemeClr val="accent1"/>
+          </a:fillRef>
+          <a:effectRef idx="0">
+            <a:schemeClr val="accent1"/>
+          </a:effectRef>
+          <a:fontRef idx="minor">
+            <a:schemeClr val="lt1"/>
+          </a:fontRef>
+        </p:style>
+        <p:txBody>
+          <a:bodyPr rtlCol="0" anchor="ctr"/>
+          <a:lstStyle/>
+          <a:p>
+            <a:pPr algn="ctr"/>
+            <a:endParaRPr lang="fr-FR"/>
+          </a:p>
+        </p:txBody>
+      </p:sp>
+      <p:cxnSp>
+        <p:nvCxnSpPr>
+          <p:cNvPr id="50" name="Straight Arrow Connector 49">
+            <a:extLst>
+              <a:ext uri="{FF2B5EF4-FFF2-40B4-BE49-F238E27FC236}">
+                <a16:creationId xmlns:a16="http://schemas.microsoft.com/office/drawing/2014/main" id="{36143E20-4620-4899-A636-7DE60CE58421}"/>
+              </a:ext>
+            </a:extLst>
+          </p:cNvPr>
+          <p:cNvCxnSpPr/>
+          <p:nvPr/>
+        </p:nvCxnSpPr>
+        <p:spPr>
+          <a:xfrm flipV="1">
+            <a:off x="10282518" y="2030506"/>
+            <a:ext cx="165847" cy="891988"/>
+          </a:xfrm>
+          <a:prstGeom prst="straightConnector1">
+            <a:avLst/>
+          </a:prstGeom>
+          <a:ln w="76200">
+            <a:tailEnd type="triangle"/>
+          </a:ln>
+        </p:spPr>
+        <p:style>
+          <a:lnRef idx="1">
+            <a:schemeClr val="accent1"/>
+          </a:lnRef>
+          <a:fillRef idx="0">
+            <a:schemeClr val="accent1"/>
+          </a:fillRef>
+          <a:effectRef idx="0">
+            <a:schemeClr val="accent1"/>
+          </a:effectRef>
+          <a:fontRef idx="minor">
+            <a:schemeClr val="tx1"/>
+          </a:fontRef>
+        </p:style>
+      </p:cxnSp>
+      <p:cxnSp>
+        <p:nvCxnSpPr>
+          <p:cNvPr id="52" name="Straight Connector 51">
+            <a:extLst>
+              <a:ext uri="{FF2B5EF4-FFF2-40B4-BE49-F238E27FC236}">
+                <a16:creationId xmlns:a16="http://schemas.microsoft.com/office/drawing/2014/main" id="{2929349A-BF63-4B39-9D17-DB012F3411C8}"/>
+              </a:ext>
+            </a:extLst>
+          </p:cNvPr>
+          <p:cNvCxnSpPr/>
+          <p:nvPr/>
+        </p:nvCxnSpPr>
+        <p:spPr>
+          <a:xfrm>
+            <a:off x="10540253" y="1546425"/>
+            <a:ext cx="0" cy="757510"/>
+          </a:xfrm>
+          <a:prstGeom prst="line">
+            <a:avLst/>
+          </a:prstGeom>
+          <a:ln w="76200"/>
+        </p:spPr>
+        <p:style>
+          <a:lnRef idx="1">
+            <a:schemeClr val="accent1"/>
+          </a:lnRef>
+          <a:fillRef idx="0">
+            <a:schemeClr val="accent1"/>
+          </a:fillRef>
+          <a:effectRef idx="0">
+            <a:schemeClr val="accent1"/>
+          </a:effectRef>
+          <a:fontRef idx="minor">
+            <a:schemeClr val="tx1"/>
+          </a:fontRef>
+        </p:style>
+      </p:cxnSp>
+      <p:sp>
+        <p:nvSpPr>
+          <p:cNvPr id="53" name="Rectangle 52">
+            <a:extLst>
+              <a:ext uri="{FF2B5EF4-FFF2-40B4-BE49-F238E27FC236}">
+                <a16:creationId xmlns:a16="http://schemas.microsoft.com/office/drawing/2014/main" id="{4D7C4DA4-A336-438F-9F55-8057212B0ECF}"/>
+              </a:ext>
+            </a:extLst>
+          </p:cNvPr>
+          <p:cNvSpPr/>
+          <p:nvPr/>
+        </p:nvSpPr>
+        <p:spPr>
+          <a:xfrm flipH="1">
+            <a:off x="10559304" y="1658472"/>
+            <a:ext cx="135589" cy="439271"/>
+          </a:xfrm>
+          <a:prstGeom prst="rect">
+            <a:avLst/>
+          </a:prstGeom>
+        </p:spPr>
+        <p:style>
+          <a:lnRef idx="2">
+            <a:schemeClr val="accent6">
+              <a:shade val="50000"/>
+            </a:schemeClr>
+          </a:lnRef>
+          <a:fillRef idx="1">
+            <a:schemeClr val="accent6"/>
+          </a:fillRef>
+          <a:effectRef idx="0">
+            <a:schemeClr val="accent6"/>
+          </a:effectRef>
+          <a:fontRef idx="minor">
+            <a:schemeClr val="lt1"/>
+          </a:fontRef>
+        </p:style>
+        <p:txBody>
+          <a:bodyPr rtlCol="0" anchor="ctr"/>
+          <a:lstStyle/>
+          <a:p>
+            <a:pPr algn="ctr"/>
+            <a:endParaRPr lang="fr-FR"/>
+          </a:p>
+        </p:txBody>
+      </p:sp>
+    </p:spTree>
+    <p:extLst>
+      <p:ext uri="{BB962C8B-B14F-4D97-AF65-F5344CB8AC3E}">
+        <p14:creationId xmlns:p14="http://schemas.microsoft.com/office/powerpoint/2010/main" val="2763817189"/>
+      </p:ext>
+    </p:extLst>
+  </p:cSld>
+  <p:clrMapOvr>
+    <a:masterClrMapping/>
+  </p:clrMapOvr>
+</p:sld>
+</file>
+
+<file path=ppt/slides/slide9.xml><?xml version="1.0" encoding="utf-8"?>
+<p:sld xmlns:a="http://schemas.openxmlformats.org/drawingml/2006/main" xmlns:r="http://schemas.openxmlformats.org/officeDocument/2006/relationships" xmlns:p="http://schemas.openxmlformats.org/presentationml/2006/main">
+  <p:cSld>
+    <p:spTree>
+      <p:nvGrpSpPr>
+        <p:cNvPr id="1" name=""/>
+        <p:cNvGrpSpPr/>
+        <p:nvPr/>
+      </p:nvGrpSpPr>
+      <p:grpSpPr>
+        <a:xfrm>
+          <a:off x="0" y="0"/>
+          <a:ext cx="0" cy="0"/>
+          <a:chOff x="0" y="0"/>
+          <a:chExt cx="0" cy="0"/>
+        </a:xfrm>
+      </p:grpSpPr>
+      <p:sp>
+        <p:nvSpPr>
+          <p:cNvPr id="2" name="Title 1">
+            <a:extLst>
+              <a:ext uri="{FF2B5EF4-FFF2-40B4-BE49-F238E27FC236}">
+                <a16:creationId xmlns:a16="http://schemas.microsoft.com/office/drawing/2014/main" id="{29B505EE-4D4A-4432-809C-0BD27271E846}"/>
+              </a:ext>
+            </a:extLst>
+          </p:cNvPr>
+          <p:cNvSpPr>
+            <a:spLocks noGrp="1"/>
+          </p:cNvSpPr>
+          <p:nvPr>
+            <p:ph type="title"/>
+          </p:nvPr>
+        </p:nvSpPr>
+        <p:spPr/>
+        <p:txBody>
+          <a:bodyPr/>
+          <a:lstStyle/>
+          <a:p>
+            <a:r>
+              <a:rPr lang="fr-FR" dirty="0"/>
+              <a:t>synchrone</a:t>
+            </a:r>
+          </a:p>
+        </p:txBody>
+      </p:sp>
+      <p:cxnSp>
+        <p:nvCxnSpPr>
+          <p:cNvPr id="5" name="Straight Arrow Connector 4">
+            <a:extLst>
+              <a:ext uri="{FF2B5EF4-FFF2-40B4-BE49-F238E27FC236}">
+                <a16:creationId xmlns:a16="http://schemas.microsoft.com/office/drawing/2014/main" id="{EF5FA2C7-F869-4AB1-8F19-61D4CC5863C7}"/>
+              </a:ext>
+            </a:extLst>
+          </p:cNvPr>
+          <p:cNvCxnSpPr/>
+          <p:nvPr/>
+        </p:nvCxnSpPr>
+        <p:spPr>
+          <a:xfrm>
+            <a:off x="300318" y="2465294"/>
+            <a:ext cx="11613776" cy="0"/>
+          </a:xfrm>
+          <a:prstGeom prst="straightConnector1">
+            <a:avLst/>
+          </a:prstGeom>
+          <a:ln w="76200">
+            <a:tailEnd type="triangle"/>
+          </a:ln>
+        </p:spPr>
+        <p:style>
+          <a:lnRef idx="1">
+            <a:schemeClr val="accent1"/>
+          </a:lnRef>
+          <a:fillRef idx="0">
+            <a:schemeClr val="accent1"/>
+          </a:fillRef>
+          <a:effectRef idx="0">
+            <a:schemeClr val="accent1"/>
+          </a:effectRef>
+          <a:fontRef idx="minor">
+            <a:schemeClr val="tx1"/>
+          </a:fontRef>
+        </p:style>
+      </p:cxnSp>
+      <p:cxnSp>
+        <p:nvCxnSpPr>
+          <p:cNvPr id="7" name="Straight Connector 6">
+            <a:extLst>
+              <a:ext uri="{FF2B5EF4-FFF2-40B4-BE49-F238E27FC236}">
+                <a16:creationId xmlns:a16="http://schemas.microsoft.com/office/drawing/2014/main" id="{8809F4E0-051D-4EF6-A463-9AC83923BB3B}"/>
+              </a:ext>
+            </a:extLst>
+          </p:cNvPr>
+          <p:cNvCxnSpPr/>
+          <p:nvPr/>
+        </p:nvCxnSpPr>
+        <p:spPr>
+          <a:xfrm>
+            <a:off x="690282" y="2075329"/>
+            <a:ext cx="0" cy="829236"/>
+          </a:xfrm>
+          <a:prstGeom prst="line">
+            <a:avLst/>
+          </a:prstGeom>
+          <a:ln w="76200"/>
+        </p:spPr>
+        <p:style>
+          <a:lnRef idx="1">
+            <a:schemeClr val="accent1"/>
+          </a:lnRef>
+          <a:fillRef idx="0">
+            <a:schemeClr val="accent1"/>
+          </a:fillRef>
+          <a:effectRef idx="0">
+            <a:schemeClr val="accent1"/>
+          </a:effectRef>
+          <a:fontRef idx="minor">
+            <a:schemeClr val="tx1"/>
+          </a:fontRef>
+        </p:style>
+      </p:cxnSp>
+      <p:sp>
+        <p:nvSpPr>
+          <p:cNvPr id="8" name="Rectangle 7">
+            <a:extLst>
+              <a:ext uri="{FF2B5EF4-FFF2-40B4-BE49-F238E27FC236}">
+                <a16:creationId xmlns:a16="http://schemas.microsoft.com/office/drawing/2014/main" id="{B4EA267E-E678-4F65-81ED-4D2334BA68B9}"/>
+              </a:ext>
+            </a:extLst>
+          </p:cNvPr>
+          <p:cNvSpPr/>
+          <p:nvPr/>
+        </p:nvSpPr>
+        <p:spPr>
+          <a:xfrm>
+            <a:off x="714935" y="2218726"/>
+            <a:ext cx="5392271" cy="475090"/>
+          </a:xfrm>
+          <a:prstGeom prst="rect">
+            <a:avLst/>
+          </a:prstGeom>
+        </p:spPr>
+        <p:style>
+          <a:lnRef idx="2">
+            <a:schemeClr val="accent6">
+              <a:shade val="50000"/>
+            </a:schemeClr>
+          </a:lnRef>
+          <a:fillRef idx="1">
+            <a:schemeClr val="accent6"/>
+          </a:fillRef>
+          <a:effectRef idx="0">
+            <a:schemeClr val="accent6"/>
+          </a:effectRef>
+          <a:fontRef idx="minor">
+            <a:schemeClr val="lt1"/>
+          </a:fontRef>
+        </p:style>
+        <p:txBody>
+          <a:bodyPr rtlCol="0" anchor="ctr"/>
+          <a:lstStyle/>
+          <a:p>
+            <a:pPr algn="ctr"/>
+            <a:endParaRPr lang="fr-FR"/>
+          </a:p>
+        </p:txBody>
+      </p:sp>
+      <p:cxnSp>
+        <p:nvCxnSpPr>
+          <p:cNvPr id="10" name="Straight Arrow Connector 9">
+            <a:extLst>
+              <a:ext uri="{FF2B5EF4-FFF2-40B4-BE49-F238E27FC236}">
+                <a16:creationId xmlns:a16="http://schemas.microsoft.com/office/drawing/2014/main" id="{4296EAEA-87B4-41B7-9E1E-D04D0E70C104}"/>
+              </a:ext>
+            </a:extLst>
+          </p:cNvPr>
+          <p:cNvCxnSpPr/>
+          <p:nvPr/>
+        </p:nvCxnSpPr>
+        <p:spPr>
+          <a:xfrm>
+            <a:off x="277906" y="4231341"/>
+            <a:ext cx="11681012" cy="0"/>
+          </a:xfrm>
+          <a:prstGeom prst="straightConnector1">
+            <a:avLst/>
+          </a:prstGeom>
+          <a:ln w="76200">
+            <a:tailEnd type="triangle"/>
+          </a:ln>
+        </p:spPr>
+        <p:style>
+          <a:lnRef idx="1">
+            <a:schemeClr val="accent1"/>
+          </a:lnRef>
+          <a:fillRef idx="0">
+            <a:schemeClr val="accent1"/>
+          </a:fillRef>
+          <a:effectRef idx="0">
+            <a:schemeClr val="accent1"/>
+          </a:effectRef>
+          <a:fontRef idx="minor">
+            <a:schemeClr val="tx1"/>
+          </a:fontRef>
+        </p:style>
+      </p:cxnSp>
+      <p:cxnSp>
+        <p:nvCxnSpPr>
+          <p:cNvPr id="12" name="Straight Arrow Connector 11">
+            <a:extLst>
+              <a:ext uri="{FF2B5EF4-FFF2-40B4-BE49-F238E27FC236}">
+                <a16:creationId xmlns:a16="http://schemas.microsoft.com/office/drawing/2014/main" id="{B1E45E13-5641-4949-8133-0517569BD4D9}"/>
+              </a:ext>
+            </a:extLst>
+          </p:cNvPr>
+          <p:cNvCxnSpPr/>
+          <p:nvPr/>
+        </p:nvCxnSpPr>
+        <p:spPr>
+          <a:xfrm>
+            <a:off x="779929" y="2832847"/>
+            <a:ext cx="107577" cy="1290918"/>
+          </a:xfrm>
+          <a:prstGeom prst="straightConnector1">
+            <a:avLst/>
+          </a:prstGeom>
+          <a:ln w="76200">
+            <a:tailEnd type="triangle"/>
+          </a:ln>
+        </p:spPr>
+        <p:style>
+          <a:lnRef idx="1">
+            <a:schemeClr val="accent1"/>
+          </a:lnRef>
+          <a:fillRef idx="0">
+            <a:schemeClr val="accent1"/>
+          </a:fillRef>
+          <a:effectRef idx="0">
+            <a:schemeClr val="accent1"/>
+          </a:effectRef>
+          <a:fontRef idx="minor">
+            <a:schemeClr val="tx1"/>
+          </a:fontRef>
+        </p:style>
+      </p:cxnSp>
+      <p:sp>
+        <p:nvSpPr>
+          <p:cNvPr id="13" name="Rectangle 12">
+            <a:extLst>
+              <a:ext uri="{FF2B5EF4-FFF2-40B4-BE49-F238E27FC236}">
+                <a16:creationId xmlns:a16="http://schemas.microsoft.com/office/drawing/2014/main" id="{47F2150F-457B-4BF5-B8F6-9C0E3C8596D7}"/>
+              </a:ext>
+            </a:extLst>
+          </p:cNvPr>
+          <p:cNvSpPr/>
+          <p:nvPr/>
+        </p:nvSpPr>
+        <p:spPr>
+          <a:xfrm>
+            <a:off x="1004047" y="4016188"/>
+            <a:ext cx="4818529" cy="475089"/>
+          </a:xfrm>
+          <a:prstGeom prst="rect">
+            <a:avLst/>
+          </a:prstGeom>
+        </p:spPr>
+        <p:style>
+          <a:lnRef idx="2">
+            <a:schemeClr val="accent1">
+              <a:shade val="50000"/>
+            </a:schemeClr>
+          </a:lnRef>
+          <a:fillRef idx="1">
+            <a:schemeClr val="accent1"/>
+          </a:fillRef>
+          <a:effectRef idx="0">
+            <a:schemeClr val="accent1"/>
+          </a:effectRef>
+          <a:fontRef idx="minor">
+            <a:schemeClr val="lt1"/>
+          </a:fontRef>
+        </p:style>
+        <p:txBody>
+          <a:bodyPr rtlCol="0" anchor="ctr"/>
+          <a:lstStyle/>
+          <a:p>
+            <a:pPr algn="ctr"/>
+            <a:endParaRPr lang="fr-FR"/>
+          </a:p>
+        </p:txBody>
+      </p:sp>
+      <p:cxnSp>
+        <p:nvCxnSpPr>
+          <p:cNvPr id="15" name="Straight Arrow Connector 14">
+            <a:extLst>
+              <a:ext uri="{FF2B5EF4-FFF2-40B4-BE49-F238E27FC236}">
+                <a16:creationId xmlns:a16="http://schemas.microsoft.com/office/drawing/2014/main" id="{6087A84C-4631-4E51-8282-B4CDE34916E6}"/>
+              </a:ext>
+            </a:extLst>
+          </p:cNvPr>
+          <p:cNvCxnSpPr/>
+          <p:nvPr/>
+        </p:nvCxnSpPr>
+        <p:spPr>
+          <a:xfrm flipV="1">
+            <a:off x="5714999" y="2765612"/>
+            <a:ext cx="255495" cy="1053353"/>
+          </a:xfrm>
+          <a:prstGeom prst="straightConnector1">
+            <a:avLst/>
+          </a:prstGeom>
+          <a:ln w="76200">
+            <a:tailEnd type="triangle"/>
+          </a:ln>
+        </p:spPr>
+        <p:style>
+          <a:lnRef idx="1">
+            <a:schemeClr val="accent1"/>
+          </a:lnRef>
+          <a:fillRef idx="0">
+            <a:schemeClr val="accent1"/>
+          </a:fillRef>
+          <a:effectRef idx="0">
+            <a:schemeClr val="accent1"/>
+          </a:effectRef>
+          <a:fontRef idx="minor">
+            <a:schemeClr val="tx1"/>
+          </a:fontRef>
+        </p:style>
+      </p:cxnSp>
+      <p:cxnSp>
+        <p:nvCxnSpPr>
+          <p:cNvPr id="17" name="Straight Connector 16">
+            <a:extLst>
+              <a:ext uri="{FF2B5EF4-FFF2-40B4-BE49-F238E27FC236}">
+                <a16:creationId xmlns:a16="http://schemas.microsoft.com/office/drawing/2014/main" id="{5E7513D4-3F24-4ABA-8B04-E81B2EB67B6B}"/>
+              </a:ext>
+            </a:extLst>
+          </p:cNvPr>
+          <p:cNvCxnSpPr/>
+          <p:nvPr/>
+        </p:nvCxnSpPr>
+        <p:spPr>
+          <a:xfrm>
+            <a:off x="3133165" y="1873624"/>
+            <a:ext cx="0" cy="1402976"/>
+          </a:xfrm>
+          <a:prstGeom prst="line">
+            <a:avLst/>
+          </a:prstGeom>
+          <a:ln w="76200"/>
+        </p:spPr>
+        <p:style>
+          <a:lnRef idx="1">
+            <a:schemeClr val="accent1"/>
+          </a:lnRef>
+          <a:fillRef idx="0">
+            <a:schemeClr val="accent1"/>
+          </a:fillRef>
+          <a:effectRef idx="0">
+            <a:schemeClr val="accent1"/>
+          </a:effectRef>
+          <a:fontRef idx="minor">
+            <a:schemeClr val="tx1"/>
+          </a:fontRef>
+        </p:style>
+      </p:cxnSp>
+      <p:sp>
+        <p:nvSpPr>
+          <p:cNvPr id="18" name="Rectangle 17">
+            <a:extLst>
+              <a:ext uri="{FF2B5EF4-FFF2-40B4-BE49-F238E27FC236}">
+                <a16:creationId xmlns:a16="http://schemas.microsoft.com/office/drawing/2014/main" id="{C18D5D24-84C5-4B8F-8211-59D2069AC958}"/>
+              </a:ext>
+            </a:extLst>
+          </p:cNvPr>
+          <p:cNvSpPr/>
+          <p:nvPr/>
+        </p:nvSpPr>
+        <p:spPr>
+          <a:xfrm>
+            <a:off x="6154271" y="2218726"/>
+            <a:ext cx="318247" cy="475087"/>
+          </a:xfrm>
+          <a:prstGeom prst="rect">
+            <a:avLst/>
+          </a:prstGeom>
+        </p:spPr>
+        <p:style>
+          <a:lnRef idx="2">
+            <a:schemeClr val="accent1">
+              <a:shade val="50000"/>
+            </a:schemeClr>
+          </a:lnRef>
+          <a:fillRef idx="1">
+            <a:schemeClr val="accent1"/>
+          </a:fillRef>
+          <a:effectRef idx="0">
+            <a:schemeClr val="accent1"/>
+          </a:effectRef>
+          <a:fontRef idx="minor">
+            <a:schemeClr val="lt1"/>
+          </a:fontRef>
+        </p:style>
+        <p:txBody>
+          <a:bodyPr rtlCol="0" anchor="ctr"/>
+          <a:lstStyle/>
+          <a:p>
+            <a:pPr algn="ctr"/>
+            <a:endParaRPr lang="fr-FR"/>
+          </a:p>
+        </p:txBody>
+      </p:sp>
+    </p:spTree>
+    <p:extLst>
+      <p:ext uri="{BB962C8B-B14F-4D97-AF65-F5344CB8AC3E}">
+        <p14:creationId xmlns:p14="http://schemas.microsoft.com/office/powerpoint/2010/main" val="2789170093"/>
       </p:ext>
     </p:extLst>
   </p:cSld>

</xml_diff>

<commit_message>
doc: added powerpoint notes
</commit_message>
<xml_diff>
--- a/Notes.pptx
+++ b/Notes.pptx
@@ -16,7 +16,15 @@
     <p:sldId id="264" r:id="rId10"/>
     <p:sldId id="265" r:id="rId11"/>
     <p:sldId id="266" r:id="rId12"/>
-    <p:sldId id="267" r:id="rId13"/>
+    <p:sldId id="268" r:id="rId13"/>
+    <p:sldId id="269" r:id="rId14"/>
+    <p:sldId id="270" r:id="rId15"/>
+    <p:sldId id="271" r:id="rId16"/>
+    <p:sldId id="272" r:id="rId17"/>
+    <p:sldId id="273" r:id="rId18"/>
+    <p:sldId id="274" r:id="rId19"/>
+    <p:sldId id="275" r:id="rId20"/>
+    <p:sldId id="267" r:id="rId21"/>
   </p:sldIdLst>
   <p:sldSz cx="12192000" cy="6858000"/>
   <p:notesSz cx="6858000" cy="9144000"/>
@@ -4283,7 +4291,7 @@
           <p:cNvPr id="2" name="Title 1">
             <a:extLst>
               <a:ext uri="{FF2B5EF4-FFF2-40B4-BE49-F238E27FC236}">
-                <a16:creationId xmlns:a16="http://schemas.microsoft.com/office/drawing/2014/main" id="{D5722810-EDEB-4B60-A2FE-B66982AC35B9}"/>
+                <a16:creationId xmlns:a16="http://schemas.microsoft.com/office/drawing/2014/main" id="{EF8C259C-5BBF-4A30-9B23-D2DBB484AEDC}"/>
               </a:ext>
             </a:extLst>
           </p:cNvPr>
@@ -4301,7 +4309,7 @@
           <a:p>
             <a:r>
               <a:rPr lang="fr-FR" dirty="0"/>
-              <a:t>Webographie</a:t>
+              <a:t>CRUD REST</a:t>
             </a:r>
           </a:p>
         </p:txBody>
@@ -4311,7 +4319,7 @@
           <p:cNvPr id="3" name="Content Placeholder 2">
             <a:extLst>
               <a:ext uri="{FF2B5EF4-FFF2-40B4-BE49-F238E27FC236}">
-                <a16:creationId xmlns:a16="http://schemas.microsoft.com/office/drawing/2014/main" id="{A6B059E0-1AD8-4064-BE39-D9ADAC9B97FA}"/>
+                <a16:creationId xmlns:a16="http://schemas.microsoft.com/office/drawing/2014/main" id="{44609427-602F-47B8-90EF-F61C856153A8}"/>
               </a:ext>
             </a:extLst>
           </p:cNvPr>
@@ -4324,12 +4332,215 @@
         </p:nvSpPr>
         <p:spPr/>
         <p:txBody>
-          <a:bodyPr/>
-          <a:lstStyle/>
-          <a:p>
-            <a:r>
-              <a:rPr lang="fr-FR"/>
-              <a:t>https://refactoring.guru/</a:t>
+          <a:bodyPr>
+            <a:normAutofit fontScale="40000" lnSpcReduction="20000"/>
+          </a:bodyPr>
+          <a:lstStyle/>
+          <a:p>
+            <a:r>
+              <a:rPr lang="fr-FR" dirty="0" err="1"/>
+              <a:t>Create</a:t>
+            </a:r>
+            <a:r>
+              <a:rPr lang="fr-FR" dirty="0"/>
+              <a:t> </a:t>
+            </a:r>
+          </a:p>
+          <a:p>
+            <a:pPr lvl="1"/>
+            <a:r>
+              <a:rPr lang="fr-FR" dirty="0"/>
+              <a:t>POST /articles + body,</a:t>
+            </a:r>
+          </a:p>
+          <a:p>
+            <a:pPr lvl="1"/>
+            <a:r>
+              <a:rPr lang="fr-FR" dirty="0"/>
+              <a:t>retour code 201</a:t>
+            </a:r>
+          </a:p>
+          <a:p>
+            <a:pPr lvl="1"/>
+            <a:r>
+              <a:rPr lang="fr-FR" dirty="0" err="1"/>
+              <a:t>Create</a:t>
+            </a:r>
+            <a:r>
+              <a:rPr lang="fr-FR" dirty="0"/>
+              <a:t> Bulk, body contient liste objet</a:t>
+            </a:r>
+          </a:p>
+          <a:p>
+            <a:r>
+              <a:rPr lang="fr-FR" dirty="0" err="1"/>
+              <a:t>Retrieve</a:t>
+            </a:r>
+            <a:endParaRPr lang="fr-FR" dirty="0"/>
+          </a:p>
+          <a:p>
+            <a:pPr lvl="1"/>
+            <a:r>
+              <a:rPr lang="fr-FR" dirty="0"/>
+              <a:t>GET /articles</a:t>
+            </a:r>
+          </a:p>
+          <a:p>
+            <a:pPr lvl="1"/>
+            <a:r>
+              <a:rPr lang="fr-FR" dirty="0"/>
+              <a:t>retour code 200</a:t>
+            </a:r>
+          </a:p>
+          <a:p>
+            <a:pPr lvl="1"/>
+            <a:r>
+              <a:rPr lang="fr-FR" dirty="0" err="1"/>
+              <a:t>Problematiques</a:t>
+            </a:r>
+            <a:r>
+              <a:rPr lang="fr-FR" dirty="0"/>
+              <a:t> : pagination, filtre, ordonner</a:t>
+            </a:r>
+          </a:p>
+          <a:p>
+            <a:r>
+              <a:rPr lang="fr-FR" dirty="0" err="1"/>
+              <a:t>Retrieve</a:t>
+            </a:r>
+            <a:r>
+              <a:rPr lang="fr-FR" dirty="0"/>
+              <a:t> One</a:t>
+            </a:r>
+          </a:p>
+          <a:p>
+            <a:pPr lvl="1"/>
+            <a:r>
+              <a:rPr lang="fr-FR" dirty="0"/>
+              <a:t>GET /articles/:id</a:t>
+            </a:r>
+          </a:p>
+          <a:p>
+            <a:pPr lvl="1"/>
+            <a:r>
+              <a:rPr lang="fr-FR" dirty="0"/>
+              <a:t>retour code 200</a:t>
+            </a:r>
+          </a:p>
+          <a:p>
+            <a:r>
+              <a:rPr lang="fr-FR" dirty="0"/>
+              <a:t>Update</a:t>
+            </a:r>
+          </a:p>
+          <a:p>
+            <a:pPr lvl="1"/>
+            <a:r>
+              <a:rPr lang="fr-FR" dirty="0"/>
+              <a:t>Rewrite</a:t>
+            </a:r>
+          </a:p>
+          <a:p>
+            <a:pPr lvl="2"/>
+            <a:r>
+              <a:rPr lang="fr-FR" dirty="0"/>
+              <a:t>PUT /articles/:id + body de l’objet entier</a:t>
+            </a:r>
+          </a:p>
+          <a:p>
+            <a:pPr lvl="2"/>
+            <a:r>
+              <a:rPr lang="fr-FR" dirty="0"/>
+              <a:t>retour code 204 ou 200 (si retour)</a:t>
+            </a:r>
+          </a:p>
+          <a:p>
+            <a:pPr lvl="1"/>
+            <a:r>
+              <a:rPr lang="fr-FR" dirty="0"/>
+              <a:t>Patch</a:t>
+            </a:r>
+          </a:p>
+          <a:p>
+            <a:pPr lvl="2"/>
+            <a:r>
+              <a:rPr lang="fr-FR" dirty="0"/>
+              <a:t>PATCH /articles/:id + body des </a:t>
+            </a:r>
+            <a:r>
+              <a:rPr lang="fr-FR" dirty="0" err="1"/>
+              <a:t>differences</a:t>
+            </a:r>
+            <a:endParaRPr lang="fr-FR" dirty="0"/>
+          </a:p>
+          <a:p>
+            <a:pPr lvl="2"/>
+            <a:r>
+              <a:rPr lang="fr-FR" dirty="0"/>
+              <a:t>retour code 204 ou 200 (si retour)</a:t>
+            </a:r>
+          </a:p>
+          <a:p>
+            <a:pPr lvl="2"/>
+            <a:r>
+              <a:rPr lang="fr-FR" dirty="0"/>
+              <a:t>PATCH ALL</a:t>
+            </a:r>
+          </a:p>
+          <a:p>
+            <a:r>
+              <a:rPr lang="fr-FR" dirty="0" err="1"/>
+              <a:t>Delete</a:t>
+            </a:r>
+            <a:endParaRPr lang="fr-FR" dirty="0"/>
+          </a:p>
+          <a:p>
+            <a:pPr lvl="1"/>
+            <a:r>
+              <a:rPr lang="fr-FR" dirty="0" err="1"/>
+              <a:t>Delete</a:t>
+            </a:r>
+            <a:r>
+              <a:rPr lang="fr-FR" dirty="0"/>
+              <a:t> All : DELETE /articles, retour code 204</a:t>
+            </a:r>
+          </a:p>
+          <a:p>
+            <a:pPr lvl="1"/>
+            <a:r>
+              <a:rPr lang="fr-FR" dirty="0" err="1"/>
+              <a:t>Delete</a:t>
+            </a:r>
+            <a:r>
+              <a:rPr lang="fr-FR" dirty="0"/>
+              <a:t> One : DELETE /</a:t>
+            </a:r>
+            <a:r>
+              <a:rPr lang="fr-FR" dirty="0" err="1"/>
+              <a:t>articles:id</a:t>
+            </a:r>
+            <a:r>
+              <a:rPr lang="fr-FR" dirty="0"/>
+              <a:t>, retour code 204</a:t>
+            </a:r>
+          </a:p>
+          <a:p>
+            <a:pPr lvl="1"/>
+            <a:r>
+              <a:rPr lang="fr-FR" dirty="0" err="1"/>
+              <a:t>Delete</a:t>
+            </a:r>
+            <a:r>
+              <a:rPr lang="fr-FR" dirty="0"/>
+              <a:t> bulk : DELETE /articles + body contient une liste </a:t>
+            </a:r>
+            <a:r>
+              <a:rPr lang="fr-FR" dirty="0" err="1"/>
+              <a:t>d’id</a:t>
+            </a:r>
+            <a:r>
+              <a:rPr lang="fr-FR" dirty="0"/>
+              <a:t>. code retour 204</a:t>
             </a:r>
           </a:p>
         </p:txBody>
@@ -4337,7 +4548,4493 @@
     </p:spTree>
     <p:extLst>
       <p:ext uri="{BB962C8B-B14F-4D97-AF65-F5344CB8AC3E}">
-        <p14:creationId xmlns:p14="http://schemas.microsoft.com/office/powerpoint/2010/main" val="3640366517"/>
+        <p14:creationId xmlns:p14="http://schemas.microsoft.com/office/powerpoint/2010/main" val="4101045295"/>
+      </p:ext>
+    </p:extLst>
+  </p:cSld>
+  <p:clrMapOvr>
+    <a:masterClrMapping/>
+  </p:clrMapOvr>
+</p:sld>
+</file>
+
+<file path=ppt/slides/slide13.xml><?xml version="1.0" encoding="utf-8"?>
+<p:sld xmlns:a="http://schemas.openxmlformats.org/drawingml/2006/main" xmlns:r="http://schemas.openxmlformats.org/officeDocument/2006/relationships" xmlns:p="http://schemas.openxmlformats.org/presentationml/2006/main">
+  <p:cSld>
+    <p:spTree>
+      <p:nvGrpSpPr>
+        <p:cNvPr id="1" name=""/>
+        <p:cNvGrpSpPr/>
+        <p:nvPr/>
+      </p:nvGrpSpPr>
+      <p:grpSpPr>
+        <a:xfrm>
+          <a:off x="0" y="0"/>
+          <a:ext cx="0" cy="0"/>
+          <a:chOff x="0" y="0"/>
+          <a:chExt cx="0" cy="0"/>
+        </a:xfrm>
+      </p:grpSpPr>
+      <p:sp>
+        <p:nvSpPr>
+          <p:cNvPr id="2" name="Title 1">
+            <a:extLst>
+              <a:ext uri="{FF2B5EF4-FFF2-40B4-BE49-F238E27FC236}">
+                <a16:creationId xmlns:a16="http://schemas.microsoft.com/office/drawing/2014/main" id="{4CBDEAC1-C812-482B-84ED-1D7AA0D04BE6}"/>
+              </a:ext>
+            </a:extLst>
+          </p:cNvPr>
+          <p:cNvSpPr>
+            <a:spLocks noGrp="1"/>
+          </p:cNvSpPr>
+          <p:nvPr>
+            <p:ph type="title"/>
+          </p:nvPr>
+        </p:nvSpPr>
+        <p:spPr/>
+        <p:txBody>
+          <a:bodyPr/>
+          <a:lstStyle/>
+          <a:p>
+            <a:r>
+              <a:rPr lang="fr-FR" dirty="0" err="1"/>
+              <a:t>Problematique</a:t>
+            </a:r>
+            <a:r>
+              <a:rPr lang="fr-FR" dirty="0"/>
+              <a:t> </a:t>
+            </a:r>
+            <a:r>
+              <a:rPr lang="fr-FR" dirty="0" err="1"/>
+              <a:t>back-end</a:t>
+            </a:r>
+            <a:endParaRPr lang="fr-FR" dirty="0"/>
+          </a:p>
+        </p:txBody>
+      </p:sp>
+      <p:sp>
+        <p:nvSpPr>
+          <p:cNvPr id="4" name="Rectangle 3">
+            <a:extLst>
+              <a:ext uri="{FF2B5EF4-FFF2-40B4-BE49-F238E27FC236}">
+                <a16:creationId xmlns:a16="http://schemas.microsoft.com/office/drawing/2014/main" id="{4F7B4AEA-444A-48C9-A251-D500FBF987C4}"/>
+              </a:ext>
+            </a:extLst>
+          </p:cNvPr>
+          <p:cNvSpPr/>
+          <p:nvPr/>
+        </p:nvSpPr>
+        <p:spPr>
+          <a:xfrm>
+            <a:off x="2545976" y="1761564"/>
+            <a:ext cx="7741024" cy="2891119"/>
+          </a:xfrm>
+          <a:prstGeom prst="rect">
+            <a:avLst/>
+          </a:prstGeom>
+        </p:spPr>
+        <p:style>
+          <a:lnRef idx="2">
+            <a:schemeClr val="accent1"/>
+          </a:lnRef>
+          <a:fillRef idx="1">
+            <a:schemeClr val="lt1"/>
+          </a:fillRef>
+          <a:effectRef idx="0">
+            <a:schemeClr val="accent1"/>
+          </a:effectRef>
+          <a:fontRef idx="minor">
+            <a:schemeClr val="dk1"/>
+          </a:fontRef>
+        </p:style>
+        <p:txBody>
+          <a:bodyPr rtlCol="0" anchor="ctr"/>
+          <a:lstStyle/>
+          <a:p>
+            <a:pPr algn="ctr"/>
+            <a:endParaRPr lang="fr-FR" dirty="0"/>
+          </a:p>
+        </p:txBody>
+      </p:sp>
+      <p:cxnSp>
+        <p:nvCxnSpPr>
+          <p:cNvPr id="6" name="Straight Arrow Connector 5">
+            <a:extLst>
+              <a:ext uri="{FF2B5EF4-FFF2-40B4-BE49-F238E27FC236}">
+                <a16:creationId xmlns:a16="http://schemas.microsoft.com/office/drawing/2014/main" id="{95FBBFFA-C1EA-4B7C-B877-054662821DAB}"/>
+              </a:ext>
+            </a:extLst>
+          </p:cNvPr>
+          <p:cNvCxnSpPr/>
+          <p:nvPr/>
+        </p:nvCxnSpPr>
+        <p:spPr>
+          <a:xfrm>
+            <a:off x="1340224" y="2353235"/>
+            <a:ext cx="1779494" cy="0"/>
+          </a:xfrm>
+          <a:prstGeom prst="straightConnector1">
+            <a:avLst/>
+          </a:prstGeom>
+          <a:ln w="76200">
+            <a:tailEnd type="triangle"/>
+          </a:ln>
+        </p:spPr>
+        <p:style>
+          <a:lnRef idx="1">
+            <a:schemeClr val="accent1"/>
+          </a:lnRef>
+          <a:fillRef idx="0">
+            <a:schemeClr val="accent1"/>
+          </a:fillRef>
+          <a:effectRef idx="0">
+            <a:schemeClr val="accent1"/>
+          </a:effectRef>
+          <a:fontRef idx="minor">
+            <a:schemeClr val="tx1"/>
+          </a:fontRef>
+        </p:style>
+      </p:cxnSp>
+      <p:sp>
+        <p:nvSpPr>
+          <p:cNvPr id="7" name="Rectangle 6">
+            <a:extLst>
+              <a:ext uri="{FF2B5EF4-FFF2-40B4-BE49-F238E27FC236}">
+                <a16:creationId xmlns:a16="http://schemas.microsoft.com/office/drawing/2014/main" id="{A50C16B9-1615-4CA0-8DFB-5430A60EB221}"/>
+              </a:ext>
+            </a:extLst>
+          </p:cNvPr>
+          <p:cNvSpPr/>
+          <p:nvPr/>
+        </p:nvSpPr>
+        <p:spPr>
+          <a:xfrm>
+            <a:off x="5800164" y="1936377"/>
+            <a:ext cx="1165411" cy="1030936"/>
+          </a:xfrm>
+          <a:prstGeom prst="rect">
+            <a:avLst/>
+          </a:prstGeom>
+        </p:spPr>
+        <p:style>
+          <a:lnRef idx="2">
+            <a:schemeClr val="accent1">
+              <a:shade val="50000"/>
+            </a:schemeClr>
+          </a:lnRef>
+          <a:fillRef idx="1">
+            <a:schemeClr val="accent1"/>
+          </a:fillRef>
+          <a:effectRef idx="0">
+            <a:schemeClr val="accent1"/>
+          </a:effectRef>
+          <a:fontRef idx="minor">
+            <a:schemeClr val="lt1"/>
+          </a:fontRef>
+        </p:style>
+        <p:txBody>
+          <a:bodyPr rtlCol="0" anchor="ctr"/>
+          <a:lstStyle/>
+          <a:p>
+            <a:pPr algn="ctr"/>
+            <a:r>
+              <a:rPr lang="fr-FR" dirty="0"/>
+              <a:t>validation</a:t>
+            </a:r>
+          </a:p>
+        </p:txBody>
+      </p:sp>
+      <p:sp>
+        <p:nvSpPr>
+          <p:cNvPr id="8" name="Rectangle 7">
+            <a:extLst>
+              <a:ext uri="{FF2B5EF4-FFF2-40B4-BE49-F238E27FC236}">
+                <a16:creationId xmlns:a16="http://schemas.microsoft.com/office/drawing/2014/main" id="{08BCC520-AAB2-4747-95F5-EF771999FB89}"/>
+              </a:ext>
+            </a:extLst>
+          </p:cNvPr>
+          <p:cNvSpPr/>
+          <p:nvPr/>
+        </p:nvSpPr>
+        <p:spPr>
+          <a:xfrm>
+            <a:off x="7214347" y="1936377"/>
+            <a:ext cx="1165411" cy="1030936"/>
+          </a:xfrm>
+          <a:prstGeom prst="rect">
+            <a:avLst/>
+          </a:prstGeom>
+        </p:spPr>
+        <p:style>
+          <a:lnRef idx="2">
+            <a:schemeClr val="accent1">
+              <a:shade val="50000"/>
+            </a:schemeClr>
+          </a:lnRef>
+          <a:fillRef idx="1">
+            <a:schemeClr val="accent1"/>
+          </a:fillRef>
+          <a:effectRef idx="0">
+            <a:schemeClr val="accent1"/>
+          </a:effectRef>
+          <a:fontRef idx="minor">
+            <a:schemeClr val="lt1"/>
+          </a:fontRef>
+        </p:style>
+        <p:txBody>
+          <a:bodyPr rtlCol="0" anchor="ctr"/>
+          <a:lstStyle/>
+          <a:p>
+            <a:pPr algn="ctr"/>
+            <a:r>
+              <a:rPr lang="fr-FR" dirty="0" err="1"/>
+              <a:t>sanitazing</a:t>
+            </a:r>
+            <a:endParaRPr lang="fr-FR" dirty="0"/>
+          </a:p>
+        </p:txBody>
+      </p:sp>
+      <p:sp>
+        <p:nvSpPr>
+          <p:cNvPr id="9" name="Rectangle 8">
+            <a:extLst>
+              <a:ext uri="{FF2B5EF4-FFF2-40B4-BE49-F238E27FC236}">
+                <a16:creationId xmlns:a16="http://schemas.microsoft.com/office/drawing/2014/main" id="{16DD0278-0D1F-4B48-B143-F222086CC725}"/>
+              </a:ext>
+            </a:extLst>
+          </p:cNvPr>
+          <p:cNvSpPr/>
+          <p:nvPr/>
+        </p:nvSpPr>
+        <p:spPr>
+          <a:xfrm>
+            <a:off x="3119718" y="1936377"/>
+            <a:ext cx="1062317" cy="1030936"/>
+          </a:xfrm>
+          <a:prstGeom prst="rect">
+            <a:avLst/>
+          </a:prstGeom>
+        </p:spPr>
+        <p:style>
+          <a:lnRef idx="2">
+            <a:schemeClr val="accent1">
+              <a:shade val="50000"/>
+            </a:schemeClr>
+          </a:lnRef>
+          <a:fillRef idx="1">
+            <a:schemeClr val="accent1"/>
+          </a:fillRef>
+          <a:effectRef idx="0">
+            <a:schemeClr val="accent1"/>
+          </a:effectRef>
+          <a:fontRef idx="minor">
+            <a:schemeClr val="lt1"/>
+          </a:fontRef>
+        </p:style>
+        <p:txBody>
+          <a:bodyPr rtlCol="0" anchor="ctr"/>
+          <a:lstStyle/>
+          <a:p>
+            <a:pPr algn="ctr"/>
+            <a:r>
+              <a:rPr lang="fr-FR" dirty="0" err="1"/>
+              <a:t>AuthN</a:t>
+            </a:r>
+            <a:endParaRPr lang="fr-FR" dirty="0"/>
+          </a:p>
+        </p:txBody>
+      </p:sp>
+      <p:sp>
+        <p:nvSpPr>
+          <p:cNvPr id="10" name="Rectangle 9">
+            <a:extLst>
+              <a:ext uri="{FF2B5EF4-FFF2-40B4-BE49-F238E27FC236}">
+                <a16:creationId xmlns:a16="http://schemas.microsoft.com/office/drawing/2014/main" id="{616B36E6-5896-4F2C-AD48-C39C86BCE455}"/>
+              </a:ext>
+            </a:extLst>
+          </p:cNvPr>
+          <p:cNvSpPr/>
+          <p:nvPr/>
+        </p:nvSpPr>
+        <p:spPr>
+          <a:xfrm>
+            <a:off x="4430807" y="1936377"/>
+            <a:ext cx="1062317" cy="1030936"/>
+          </a:xfrm>
+          <a:prstGeom prst="rect">
+            <a:avLst/>
+          </a:prstGeom>
+        </p:spPr>
+        <p:style>
+          <a:lnRef idx="2">
+            <a:schemeClr val="accent1">
+              <a:shade val="50000"/>
+            </a:schemeClr>
+          </a:lnRef>
+          <a:fillRef idx="1">
+            <a:schemeClr val="accent1"/>
+          </a:fillRef>
+          <a:effectRef idx="0">
+            <a:schemeClr val="accent1"/>
+          </a:effectRef>
+          <a:fontRef idx="minor">
+            <a:schemeClr val="lt1"/>
+          </a:fontRef>
+        </p:style>
+        <p:txBody>
+          <a:bodyPr rtlCol="0" anchor="ctr"/>
+          <a:lstStyle/>
+          <a:p>
+            <a:pPr algn="ctr"/>
+            <a:r>
+              <a:rPr lang="fr-FR" dirty="0" err="1"/>
+              <a:t>AuthZ</a:t>
+            </a:r>
+            <a:endParaRPr lang="fr-FR" dirty="0"/>
+          </a:p>
+        </p:txBody>
+      </p:sp>
+      <p:cxnSp>
+        <p:nvCxnSpPr>
+          <p:cNvPr id="12" name="Straight Arrow Connector 11">
+            <a:extLst>
+              <a:ext uri="{FF2B5EF4-FFF2-40B4-BE49-F238E27FC236}">
+                <a16:creationId xmlns:a16="http://schemas.microsoft.com/office/drawing/2014/main" id="{B0E0AFC6-706D-47B5-9C79-1A5AF7D2E4A7}"/>
+              </a:ext>
+            </a:extLst>
+          </p:cNvPr>
+          <p:cNvCxnSpPr/>
+          <p:nvPr/>
+        </p:nvCxnSpPr>
+        <p:spPr>
+          <a:xfrm>
+            <a:off x="4182035" y="2451845"/>
+            <a:ext cx="248772" cy="0"/>
+          </a:xfrm>
+          <a:prstGeom prst="straightConnector1">
+            <a:avLst/>
+          </a:prstGeom>
+          <a:ln w="76200">
+            <a:tailEnd type="triangle"/>
+          </a:ln>
+        </p:spPr>
+        <p:style>
+          <a:lnRef idx="1">
+            <a:schemeClr val="accent1"/>
+          </a:lnRef>
+          <a:fillRef idx="0">
+            <a:schemeClr val="accent1"/>
+          </a:fillRef>
+          <a:effectRef idx="0">
+            <a:schemeClr val="accent1"/>
+          </a:effectRef>
+          <a:fontRef idx="minor">
+            <a:schemeClr val="tx1"/>
+          </a:fontRef>
+        </p:style>
+      </p:cxnSp>
+      <p:cxnSp>
+        <p:nvCxnSpPr>
+          <p:cNvPr id="14" name="Straight Arrow Connector 13">
+            <a:extLst>
+              <a:ext uri="{FF2B5EF4-FFF2-40B4-BE49-F238E27FC236}">
+                <a16:creationId xmlns:a16="http://schemas.microsoft.com/office/drawing/2014/main" id="{71BC892D-1BCD-40C8-8AD6-FB5F3B99CD82}"/>
+              </a:ext>
+            </a:extLst>
+          </p:cNvPr>
+          <p:cNvCxnSpPr>
+            <a:stCxn id="10" idx="3"/>
+          </p:cNvCxnSpPr>
+          <p:nvPr/>
+        </p:nvCxnSpPr>
+        <p:spPr>
+          <a:xfrm>
+            <a:off x="5493124" y="2451845"/>
+            <a:ext cx="307040" cy="0"/>
+          </a:xfrm>
+          <a:prstGeom prst="straightConnector1">
+            <a:avLst/>
+          </a:prstGeom>
+          <a:ln w="76200">
+            <a:tailEnd type="triangle"/>
+          </a:ln>
+        </p:spPr>
+        <p:style>
+          <a:lnRef idx="1">
+            <a:schemeClr val="accent1"/>
+          </a:lnRef>
+          <a:fillRef idx="0">
+            <a:schemeClr val="accent1"/>
+          </a:fillRef>
+          <a:effectRef idx="0">
+            <a:schemeClr val="accent1"/>
+          </a:effectRef>
+          <a:fontRef idx="minor">
+            <a:schemeClr val="tx1"/>
+          </a:fontRef>
+        </p:style>
+      </p:cxnSp>
+      <p:cxnSp>
+        <p:nvCxnSpPr>
+          <p:cNvPr id="16" name="Straight Arrow Connector 15">
+            <a:extLst>
+              <a:ext uri="{FF2B5EF4-FFF2-40B4-BE49-F238E27FC236}">
+                <a16:creationId xmlns:a16="http://schemas.microsoft.com/office/drawing/2014/main" id="{B8F58DE5-2853-4B6C-A7BC-F7EB6BE72D1C}"/>
+              </a:ext>
+            </a:extLst>
+          </p:cNvPr>
+          <p:cNvCxnSpPr>
+            <a:stCxn id="7" idx="3"/>
+            <a:endCxn id="8" idx="1"/>
+          </p:cNvCxnSpPr>
+          <p:nvPr/>
+        </p:nvCxnSpPr>
+        <p:spPr>
+          <a:xfrm>
+            <a:off x="6965575" y="2451845"/>
+            <a:ext cx="248772" cy="0"/>
+          </a:xfrm>
+          <a:prstGeom prst="straightConnector1">
+            <a:avLst/>
+          </a:prstGeom>
+          <a:ln w="76200">
+            <a:tailEnd type="triangle"/>
+          </a:ln>
+        </p:spPr>
+        <p:style>
+          <a:lnRef idx="1">
+            <a:schemeClr val="accent1"/>
+          </a:lnRef>
+          <a:fillRef idx="0">
+            <a:schemeClr val="accent1"/>
+          </a:fillRef>
+          <a:effectRef idx="0">
+            <a:schemeClr val="accent1"/>
+          </a:effectRef>
+          <a:fontRef idx="minor">
+            <a:schemeClr val="tx1"/>
+          </a:fontRef>
+        </p:style>
+      </p:cxnSp>
+      <p:sp>
+        <p:nvSpPr>
+          <p:cNvPr id="17" name="TextBox 16">
+            <a:extLst>
+              <a:ext uri="{FF2B5EF4-FFF2-40B4-BE49-F238E27FC236}">
+                <a16:creationId xmlns:a16="http://schemas.microsoft.com/office/drawing/2014/main" id="{CC100D8A-4516-491A-8B3D-8B896BA07A78}"/>
+              </a:ext>
+            </a:extLst>
+          </p:cNvPr>
+          <p:cNvSpPr txBox="1"/>
+          <p:nvPr/>
+        </p:nvSpPr>
+        <p:spPr>
+          <a:xfrm>
+            <a:off x="3383014" y="2967313"/>
+            <a:ext cx="535724" cy="369332"/>
+          </a:xfrm>
+          <a:prstGeom prst="rect">
+            <a:avLst/>
+          </a:prstGeom>
+          <a:noFill/>
+        </p:spPr>
+        <p:txBody>
+          <a:bodyPr wrap="none" rtlCol="0">
+            <a:spAutoFit/>
+          </a:bodyPr>
+          <a:lstStyle/>
+          <a:p>
+            <a:r>
+              <a:rPr lang="fr-FR" dirty="0"/>
+              <a:t>401</a:t>
+            </a:r>
+          </a:p>
+        </p:txBody>
+      </p:sp>
+      <p:sp>
+        <p:nvSpPr>
+          <p:cNvPr id="18" name="TextBox 17">
+            <a:extLst>
+              <a:ext uri="{FF2B5EF4-FFF2-40B4-BE49-F238E27FC236}">
+                <a16:creationId xmlns:a16="http://schemas.microsoft.com/office/drawing/2014/main" id="{B32BFCED-D70A-44A3-ACE0-7C00305E4BE7}"/>
+              </a:ext>
+            </a:extLst>
+          </p:cNvPr>
+          <p:cNvSpPr txBox="1"/>
+          <p:nvPr/>
+        </p:nvSpPr>
+        <p:spPr>
+          <a:xfrm>
+            <a:off x="4709792" y="2967313"/>
+            <a:ext cx="535724" cy="369332"/>
+          </a:xfrm>
+          <a:prstGeom prst="rect">
+            <a:avLst/>
+          </a:prstGeom>
+          <a:noFill/>
+        </p:spPr>
+        <p:txBody>
+          <a:bodyPr wrap="none" rtlCol="0">
+            <a:spAutoFit/>
+          </a:bodyPr>
+          <a:lstStyle/>
+          <a:p>
+            <a:r>
+              <a:rPr lang="fr-FR" dirty="0"/>
+              <a:t>403</a:t>
+            </a:r>
+          </a:p>
+        </p:txBody>
+      </p:sp>
+      <p:sp>
+        <p:nvSpPr>
+          <p:cNvPr id="19" name="TextBox 18">
+            <a:extLst>
+              <a:ext uri="{FF2B5EF4-FFF2-40B4-BE49-F238E27FC236}">
+                <a16:creationId xmlns:a16="http://schemas.microsoft.com/office/drawing/2014/main" id="{0F33AFEF-5845-4E67-A418-3B0D8D0033B4}"/>
+              </a:ext>
+            </a:extLst>
+          </p:cNvPr>
+          <p:cNvSpPr txBox="1"/>
+          <p:nvPr/>
+        </p:nvSpPr>
+        <p:spPr>
+          <a:xfrm>
+            <a:off x="6115007" y="2967313"/>
+            <a:ext cx="535724" cy="369332"/>
+          </a:xfrm>
+          <a:prstGeom prst="rect">
+            <a:avLst/>
+          </a:prstGeom>
+          <a:noFill/>
+        </p:spPr>
+        <p:txBody>
+          <a:bodyPr wrap="none" rtlCol="0">
+            <a:spAutoFit/>
+          </a:bodyPr>
+          <a:lstStyle/>
+          <a:p>
+            <a:r>
+              <a:rPr lang="fr-FR" dirty="0"/>
+              <a:t>400</a:t>
+            </a:r>
+          </a:p>
+        </p:txBody>
+      </p:sp>
+      <p:sp>
+        <p:nvSpPr>
+          <p:cNvPr id="20" name="Rectangle 19">
+            <a:extLst>
+              <a:ext uri="{FF2B5EF4-FFF2-40B4-BE49-F238E27FC236}">
+                <a16:creationId xmlns:a16="http://schemas.microsoft.com/office/drawing/2014/main" id="{258DAB8C-FC5E-45BA-B54D-A78D3AC996AB}"/>
+              </a:ext>
+            </a:extLst>
+          </p:cNvPr>
+          <p:cNvSpPr/>
+          <p:nvPr/>
+        </p:nvSpPr>
+        <p:spPr>
+          <a:xfrm>
+            <a:off x="8934411" y="2761130"/>
+            <a:ext cx="1165411" cy="1030936"/>
+          </a:xfrm>
+          <a:prstGeom prst="rect">
+            <a:avLst/>
+          </a:prstGeom>
+        </p:spPr>
+        <p:style>
+          <a:lnRef idx="2">
+            <a:schemeClr val="accent1">
+              <a:shade val="50000"/>
+            </a:schemeClr>
+          </a:lnRef>
+          <a:fillRef idx="1">
+            <a:schemeClr val="accent1"/>
+          </a:fillRef>
+          <a:effectRef idx="0">
+            <a:schemeClr val="accent1"/>
+          </a:effectRef>
+          <a:fontRef idx="minor">
+            <a:schemeClr val="lt1"/>
+          </a:fontRef>
+        </p:style>
+        <p:txBody>
+          <a:bodyPr rtlCol="0" anchor="ctr"/>
+          <a:lstStyle/>
+          <a:p>
+            <a:pPr algn="ctr"/>
+            <a:r>
+              <a:rPr lang="fr-FR" dirty="0"/>
+              <a:t>business</a:t>
+            </a:r>
+          </a:p>
+        </p:txBody>
+      </p:sp>
+      <p:cxnSp>
+        <p:nvCxnSpPr>
+          <p:cNvPr id="22" name="Straight Arrow Connector 21">
+            <a:extLst>
+              <a:ext uri="{FF2B5EF4-FFF2-40B4-BE49-F238E27FC236}">
+                <a16:creationId xmlns:a16="http://schemas.microsoft.com/office/drawing/2014/main" id="{8E20C976-A4F1-43E6-B6F9-C29E9BDF6E7F}"/>
+              </a:ext>
+            </a:extLst>
+          </p:cNvPr>
+          <p:cNvCxnSpPr>
+            <a:endCxn id="20" idx="1"/>
+          </p:cNvCxnSpPr>
+          <p:nvPr/>
+        </p:nvCxnSpPr>
+        <p:spPr>
+          <a:xfrm>
+            <a:off x="8379758" y="2451845"/>
+            <a:ext cx="554653" cy="824753"/>
+          </a:xfrm>
+          <a:prstGeom prst="straightConnector1">
+            <a:avLst/>
+          </a:prstGeom>
+          <a:ln w="76200">
+            <a:tailEnd type="triangle"/>
+          </a:ln>
+        </p:spPr>
+        <p:style>
+          <a:lnRef idx="1">
+            <a:schemeClr val="accent1"/>
+          </a:lnRef>
+          <a:fillRef idx="0">
+            <a:schemeClr val="accent1"/>
+          </a:fillRef>
+          <a:effectRef idx="0">
+            <a:schemeClr val="accent1"/>
+          </a:effectRef>
+          <a:fontRef idx="minor">
+            <a:schemeClr val="tx1"/>
+          </a:fontRef>
+        </p:style>
+      </p:cxnSp>
+    </p:spTree>
+    <p:extLst>
+      <p:ext uri="{BB962C8B-B14F-4D97-AF65-F5344CB8AC3E}">
+        <p14:creationId xmlns:p14="http://schemas.microsoft.com/office/powerpoint/2010/main" val="2202560068"/>
+      </p:ext>
+    </p:extLst>
+  </p:cSld>
+  <p:clrMapOvr>
+    <a:masterClrMapping/>
+  </p:clrMapOvr>
+</p:sld>
+</file>
+
+<file path=ppt/slides/slide14.xml><?xml version="1.0" encoding="utf-8"?>
+<p:sld xmlns:a="http://schemas.openxmlformats.org/drawingml/2006/main" xmlns:r="http://schemas.openxmlformats.org/officeDocument/2006/relationships" xmlns:p="http://schemas.openxmlformats.org/presentationml/2006/main">
+  <p:cSld>
+    <p:spTree>
+      <p:nvGrpSpPr>
+        <p:cNvPr id="1" name=""/>
+        <p:cNvGrpSpPr/>
+        <p:nvPr/>
+      </p:nvGrpSpPr>
+      <p:grpSpPr>
+        <a:xfrm>
+          <a:off x="0" y="0"/>
+          <a:ext cx="0" cy="0"/>
+          <a:chOff x="0" y="0"/>
+          <a:chExt cx="0" cy="0"/>
+        </a:xfrm>
+      </p:grpSpPr>
+      <p:sp>
+        <p:nvSpPr>
+          <p:cNvPr id="2" name="Title 1">
+            <a:extLst>
+              <a:ext uri="{FF2B5EF4-FFF2-40B4-BE49-F238E27FC236}">
+                <a16:creationId xmlns:a16="http://schemas.microsoft.com/office/drawing/2014/main" id="{C3583FBD-0512-41CD-AE57-07F3F4CF6F36}"/>
+              </a:ext>
+            </a:extLst>
+          </p:cNvPr>
+          <p:cNvSpPr>
+            <a:spLocks noGrp="1"/>
+          </p:cNvSpPr>
+          <p:nvPr>
+            <p:ph type="title"/>
+          </p:nvPr>
+        </p:nvSpPr>
+        <p:spPr/>
+        <p:txBody>
+          <a:bodyPr/>
+          <a:lstStyle/>
+          <a:p>
+            <a:r>
+              <a:rPr lang="fr-FR" dirty="0"/>
+              <a:t>Observable</a:t>
+            </a:r>
+          </a:p>
+        </p:txBody>
+      </p:sp>
+      <p:cxnSp>
+        <p:nvCxnSpPr>
+          <p:cNvPr id="5" name="Straight Arrow Connector 4">
+            <a:extLst>
+              <a:ext uri="{FF2B5EF4-FFF2-40B4-BE49-F238E27FC236}">
+                <a16:creationId xmlns:a16="http://schemas.microsoft.com/office/drawing/2014/main" id="{1C80AA5D-1658-4D25-9864-83AC4DCFEB18}"/>
+              </a:ext>
+            </a:extLst>
+          </p:cNvPr>
+          <p:cNvCxnSpPr/>
+          <p:nvPr/>
+        </p:nvCxnSpPr>
+        <p:spPr>
+          <a:xfrm flipV="1">
+            <a:off x="479612" y="2711824"/>
+            <a:ext cx="11340353" cy="58270"/>
+          </a:xfrm>
+          <a:prstGeom prst="straightConnector1">
+            <a:avLst/>
+          </a:prstGeom>
+          <a:ln w="76200">
+            <a:tailEnd type="triangle"/>
+          </a:ln>
+        </p:spPr>
+        <p:style>
+          <a:lnRef idx="1">
+            <a:schemeClr val="accent1"/>
+          </a:lnRef>
+          <a:fillRef idx="0">
+            <a:schemeClr val="accent1"/>
+          </a:fillRef>
+          <a:effectRef idx="0">
+            <a:schemeClr val="accent1"/>
+          </a:effectRef>
+          <a:fontRef idx="minor">
+            <a:schemeClr val="tx1"/>
+          </a:fontRef>
+        </p:style>
+      </p:cxnSp>
+      <p:cxnSp>
+        <p:nvCxnSpPr>
+          <p:cNvPr id="7" name="Straight Connector 6">
+            <a:extLst>
+              <a:ext uri="{FF2B5EF4-FFF2-40B4-BE49-F238E27FC236}">
+                <a16:creationId xmlns:a16="http://schemas.microsoft.com/office/drawing/2014/main" id="{DE94ABE1-7067-4BDC-B7FB-F3D08C2C1E62}"/>
+              </a:ext>
+            </a:extLst>
+          </p:cNvPr>
+          <p:cNvCxnSpPr/>
+          <p:nvPr/>
+        </p:nvCxnSpPr>
+        <p:spPr>
+          <a:xfrm>
+            <a:off x="1039906" y="2424953"/>
+            <a:ext cx="0" cy="770965"/>
+          </a:xfrm>
+          <a:prstGeom prst="line">
+            <a:avLst/>
+          </a:prstGeom>
+          <a:ln w="76200"/>
+        </p:spPr>
+        <p:style>
+          <a:lnRef idx="1">
+            <a:schemeClr val="accent1"/>
+          </a:lnRef>
+          <a:fillRef idx="0">
+            <a:schemeClr val="accent1"/>
+          </a:fillRef>
+          <a:effectRef idx="0">
+            <a:schemeClr val="accent1"/>
+          </a:effectRef>
+          <a:fontRef idx="minor">
+            <a:schemeClr val="tx1"/>
+          </a:fontRef>
+        </p:style>
+      </p:cxnSp>
+      <p:sp>
+        <p:nvSpPr>
+          <p:cNvPr id="8" name="TextBox 7">
+            <a:extLst>
+              <a:ext uri="{FF2B5EF4-FFF2-40B4-BE49-F238E27FC236}">
+                <a16:creationId xmlns:a16="http://schemas.microsoft.com/office/drawing/2014/main" id="{2D7154DB-9C14-467C-9FFC-C9463494F854}"/>
+              </a:ext>
+            </a:extLst>
+          </p:cNvPr>
+          <p:cNvSpPr txBox="1"/>
+          <p:nvPr/>
+        </p:nvSpPr>
+        <p:spPr>
+          <a:xfrm>
+            <a:off x="51574" y="3930183"/>
+            <a:ext cx="2922467" cy="369332"/>
+          </a:xfrm>
+          <a:prstGeom prst="rect">
+            <a:avLst/>
+          </a:prstGeom>
+          <a:noFill/>
+        </p:spPr>
+        <p:txBody>
+          <a:bodyPr wrap="none" rtlCol="0">
+            <a:spAutoFit/>
+          </a:bodyPr>
+          <a:lstStyle/>
+          <a:p>
+            <a:r>
+              <a:rPr lang="fr-FR" dirty="0" err="1"/>
+              <a:t>subscription</a:t>
+            </a:r>
+            <a:r>
+              <a:rPr lang="fr-FR" dirty="0"/>
+              <a:t> = </a:t>
+            </a:r>
+            <a:r>
+              <a:rPr lang="fr-FR" dirty="0" err="1"/>
+              <a:t>o.subscribe</a:t>
+            </a:r>
+            <a:r>
+              <a:rPr lang="fr-FR" dirty="0"/>
+              <a:t>(…)</a:t>
+            </a:r>
+          </a:p>
+        </p:txBody>
+      </p:sp>
+      <p:sp>
+        <p:nvSpPr>
+          <p:cNvPr id="9" name="Oval 8">
+            <a:extLst>
+              <a:ext uri="{FF2B5EF4-FFF2-40B4-BE49-F238E27FC236}">
+                <a16:creationId xmlns:a16="http://schemas.microsoft.com/office/drawing/2014/main" id="{6315E7A4-A413-4153-887D-419D8B856A11}"/>
+              </a:ext>
+            </a:extLst>
+          </p:cNvPr>
+          <p:cNvSpPr/>
+          <p:nvPr/>
+        </p:nvSpPr>
+        <p:spPr>
+          <a:xfrm>
+            <a:off x="2469776" y="2456329"/>
+            <a:ext cx="676835" cy="623047"/>
+          </a:xfrm>
+          <a:prstGeom prst="ellipse">
+            <a:avLst/>
+          </a:prstGeom>
+        </p:spPr>
+        <p:style>
+          <a:lnRef idx="2">
+            <a:schemeClr val="accent1">
+              <a:shade val="50000"/>
+            </a:schemeClr>
+          </a:lnRef>
+          <a:fillRef idx="1">
+            <a:schemeClr val="accent1"/>
+          </a:fillRef>
+          <a:effectRef idx="0">
+            <a:schemeClr val="accent1"/>
+          </a:effectRef>
+          <a:fontRef idx="minor">
+            <a:schemeClr val="lt1"/>
+          </a:fontRef>
+        </p:style>
+        <p:txBody>
+          <a:bodyPr rtlCol="0" anchor="ctr"/>
+          <a:lstStyle/>
+          <a:p>
+            <a:pPr algn="ctr"/>
+            <a:endParaRPr lang="fr-FR"/>
+          </a:p>
+        </p:txBody>
+      </p:sp>
+      <p:sp>
+        <p:nvSpPr>
+          <p:cNvPr id="10" name="Oval 9">
+            <a:extLst>
+              <a:ext uri="{FF2B5EF4-FFF2-40B4-BE49-F238E27FC236}">
+                <a16:creationId xmlns:a16="http://schemas.microsoft.com/office/drawing/2014/main" id="{21B0CB7D-8349-4287-A74A-4C2037A3B667}"/>
+              </a:ext>
+            </a:extLst>
+          </p:cNvPr>
+          <p:cNvSpPr/>
+          <p:nvPr/>
+        </p:nvSpPr>
+        <p:spPr>
+          <a:xfrm>
+            <a:off x="3899645" y="2429435"/>
+            <a:ext cx="676835" cy="623047"/>
+          </a:xfrm>
+          <a:prstGeom prst="ellipse">
+            <a:avLst/>
+          </a:prstGeom>
+        </p:spPr>
+        <p:style>
+          <a:lnRef idx="2">
+            <a:schemeClr val="accent1">
+              <a:shade val="50000"/>
+            </a:schemeClr>
+          </a:lnRef>
+          <a:fillRef idx="1">
+            <a:schemeClr val="accent1"/>
+          </a:fillRef>
+          <a:effectRef idx="0">
+            <a:schemeClr val="accent1"/>
+          </a:effectRef>
+          <a:fontRef idx="minor">
+            <a:schemeClr val="lt1"/>
+          </a:fontRef>
+        </p:style>
+        <p:txBody>
+          <a:bodyPr rtlCol="0" anchor="ctr"/>
+          <a:lstStyle/>
+          <a:p>
+            <a:pPr algn="ctr"/>
+            <a:endParaRPr lang="fr-FR"/>
+          </a:p>
+        </p:txBody>
+      </p:sp>
+      <p:sp>
+        <p:nvSpPr>
+          <p:cNvPr id="11" name="Oval 10">
+            <a:extLst>
+              <a:ext uri="{FF2B5EF4-FFF2-40B4-BE49-F238E27FC236}">
+                <a16:creationId xmlns:a16="http://schemas.microsoft.com/office/drawing/2014/main" id="{2B343469-127A-479F-A4A7-EB4AE5ADC785}"/>
+              </a:ext>
+            </a:extLst>
+          </p:cNvPr>
+          <p:cNvSpPr/>
+          <p:nvPr/>
+        </p:nvSpPr>
+        <p:spPr>
+          <a:xfrm>
+            <a:off x="5757582" y="2424953"/>
+            <a:ext cx="676835" cy="623047"/>
+          </a:xfrm>
+          <a:prstGeom prst="ellipse">
+            <a:avLst/>
+          </a:prstGeom>
+        </p:spPr>
+        <p:style>
+          <a:lnRef idx="2">
+            <a:schemeClr val="accent1">
+              <a:shade val="50000"/>
+            </a:schemeClr>
+          </a:lnRef>
+          <a:fillRef idx="1">
+            <a:schemeClr val="accent1"/>
+          </a:fillRef>
+          <a:effectRef idx="0">
+            <a:schemeClr val="accent1"/>
+          </a:effectRef>
+          <a:fontRef idx="minor">
+            <a:schemeClr val="lt1"/>
+          </a:fontRef>
+        </p:style>
+        <p:txBody>
+          <a:bodyPr rtlCol="0" anchor="ctr"/>
+          <a:lstStyle/>
+          <a:p>
+            <a:pPr algn="ctr"/>
+            <a:endParaRPr lang="fr-FR"/>
+          </a:p>
+        </p:txBody>
+      </p:sp>
+      <p:sp>
+        <p:nvSpPr>
+          <p:cNvPr id="12" name="Oval 11">
+            <a:extLst>
+              <a:ext uri="{FF2B5EF4-FFF2-40B4-BE49-F238E27FC236}">
+                <a16:creationId xmlns:a16="http://schemas.microsoft.com/office/drawing/2014/main" id="{0B13B1ED-FBBA-42F4-B78E-198354290764}"/>
+              </a:ext>
+            </a:extLst>
+          </p:cNvPr>
+          <p:cNvSpPr/>
+          <p:nvPr/>
+        </p:nvSpPr>
+        <p:spPr>
+          <a:xfrm>
+            <a:off x="6640606" y="2424952"/>
+            <a:ext cx="676835" cy="623047"/>
+          </a:xfrm>
+          <a:prstGeom prst="ellipse">
+            <a:avLst/>
+          </a:prstGeom>
+        </p:spPr>
+        <p:style>
+          <a:lnRef idx="2">
+            <a:schemeClr val="accent1">
+              <a:shade val="50000"/>
+            </a:schemeClr>
+          </a:lnRef>
+          <a:fillRef idx="1">
+            <a:schemeClr val="accent1"/>
+          </a:fillRef>
+          <a:effectRef idx="0">
+            <a:schemeClr val="accent1"/>
+          </a:effectRef>
+          <a:fontRef idx="minor">
+            <a:schemeClr val="lt1"/>
+          </a:fontRef>
+        </p:style>
+        <p:txBody>
+          <a:bodyPr rtlCol="0" anchor="ctr"/>
+          <a:lstStyle/>
+          <a:p>
+            <a:pPr algn="ctr"/>
+            <a:endParaRPr lang="fr-FR"/>
+          </a:p>
+        </p:txBody>
+      </p:sp>
+      <p:sp>
+        <p:nvSpPr>
+          <p:cNvPr id="13" name="TextBox 12">
+            <a:extLst>
+              <a:ext uri="{FF2B5EF4-FFF2-40B4-BE49-F238E27FC236}">
+                <a16:creationId xmlns:a16="http://schemas.microsoft.com/office/drawing/2014/main" id="{5C8CD278-9A57-4FDB-BE24-22FC2EE0C716}"/>
+              </a:ext>
+            </a:extLst>
+          </p:cNvPr>
+          <p:cNvSpPr txBox="1"/>
+          <p:nvPr/>
+        </p:nvSpPr>
+        <p:spPr>
+          <a:xfrm>
+            <a:off x="2489945" y="3244334"/>
+            <a:ext cx="595484" cy="369332"/>
+          </a:xfrm>
+          <a:prstGeom prst="rect">
+            <a:avLst/>
+          </a:prstGeom>
+          <a:noFill/>
+        </p:spPr>
+        <p:txBody>
+          <a:bodyPr wrap="none" rtlCol="0">
+            <a:spAutoFit/>
+          </a:bodyPr>
+          <a:lstStyle/>
+          <a:p>
+            <a:r>
+              <a:rPr lang="fr-FR" dirty="0" err="1"/>
+              <a:t>next</a:t>
+            </a:r>
+            <a:endParaRPr lang="fr-FR" dirty="0"/>
+          </a:p>
+        </p:txBody>
+      </p:sp>
+      <p:sp>
+        <p:nvSpPr>
+          <p:cNvPr id="14" name="TextBox 13">
+            <a:extLst>
+              <a:ext uri="{FF2B5EF4-FFF2-40B4-BE49-F238E27FC236}">
+                <a16:creationId xmlns:a16="http://schemas.microsoft.com/office/drawing/2014/main" id="{DCD86593-5BD6-46A1-85B0-3D92BCA08285}"/>
+              </a:ext>
+            </a:extLst>
+          </p:cNvPr>
+          <p:cNvSpPr txBox="1"/>
+          <p:nvPr/>
+        </p:nvSpPr>
+        <p:spPr>
+          <a:xfrm>
+            <a:off x="3899645" y="3293641"/>
+            <a:ext cx="595484" cy="369332"/>
+          </a:xfrm>
+          <a:prstGeom prst="rect">
+            <a:avLst/>
+          </a:prstGeom>
+          <a:noFill/>
+        </p:spPr>
+        <p:txBody>
+          <a:bodyPr wrap="none" rtlCol="0">
+            <a:spAutoFit/>
+          </a:bodyPr>
+          <a:lstStyle/>
+          <a:p>
+            <a:r>
+              <a:rPr lang="fr-FR" dirty="0" err="1"/>
+              <a:t>next</a:t>
+            </a:r>
+            <a:endParaRPr lang="fr-FR" dirty="0"/>
+          </a:p>
+        </p:txBody>
+      </p:sp>
+      <p:sp>
+        <p:nvSpPr>
+          <p:cNvPr id="15" name="TextBox 14">
+            <a:extLst>
+              <a:ext uri="{FF2B5EF4-FFF2-40B4-BE49-F238E27FC236}">
+                <a16:creationId xmlns:a16="http://schemas.microsoft.com/office/drawing/2014/main" id="{8EEB648A-600A-45E2-9F91-DEC4CF919C83}"/>
+              </a:ext>
+            </a:extLst>
+          </p:cNvPr>
+          <p:cNvSpPr txBox="1"/>
+          <p:nvPr/>
+        </p:nvSpPr>
+        <p:spPr>
+          <a:xfrm>
+            <a:off x="5753097" y="3257782"/>
+            <a:ext cx="595484" cy="369332"/>
+          </a:xfrm>
+          <a:prstGeom prst="rect">
+            <a:avLst/>
+          </a:prstGeom>
+          <a:noFill/>
+        </p:spPr>
+        <p:txBody>
+          <a:bodyPr wrap="none" rtlCol="0">
+            <a:spAutoFit/>
+          </a:bodyPr>
+          <a:lstStyle/>
+          <a:p>
+            <a:r>
+              <a:rPr lang="fr-FR" dirty="0" err="1"/>
+              <a:t>next</a:t>
+            </a:r>
+            <a:endParaRPr lang="fr-FR" dirty="0"/>
+          </a:p>
+        </p:txBody>
+      </p:sp>
+      <p:sp>
+        <p:nvSpPr>
+          <p:cNvPr id="16" name="TextBox 15">
+            <a:extLst>
+              <a:ext uri="{FF2B5EF4-FFF2-40B4-BE49-F238E27FC236}">
+                <a16:creationId xmlns:a16="http://schemas.microsoft.com/office/drawing/2014/main" id="{2ECB4B76-AC9B-47B5-8258-491EFE66F977}"/>
+              </a:ext>
+            </a:extLst>
+          </p:cNvPr>
+          <p:cNvSpPr txBox="1"/>
+          <p:nvPr/>
+        </p:nvSpPr>
+        <p:spPr>
+          <a:xfrm>
+            <a:off x="6620435" y="3239854"/>
+            <a:ext cx="595484" cy="369332"/>
+          </a:xfrm>
+          <a:prstGeom prst="rect">
+            <a:avLst/>
+          </a:prstGeom>
+          <a:noFill/>
+        </p:spPr>
+        <p:txBody>
+          <a:bodyPr wrap="none" rtlCol="0">
+            <a:spAutoFit/>
+          </a:bodyPr>
+          <a:lstStyle/>
+          <a:p>
+            <a:r>
+              <a:rPr lang="fr-FR" dirty="0" err="1"/>
+              <a:t>next</a:t>
+            </a:r>
+            <a:endParaRPr lang="fr-FR" dirty="0"/>
+          </a:p>
+        </p:txBody>
+      </p:sp>
+      <p:cxnSp>
+        <p:nvCxnSpPr>
+          <p:cNvPr id="18" name="Straight Connector 17">
+            <a:extLst>
+              <a:ext uri="{FF2B5EF4-FFF2-40B4-BE49-F238E27FC236}">
+                <a16:creationId xmlns:a16="http://schemas.microsoft.com/office/drawing/2014/main" id="{B7D56FD2-62CD-4406-9B93-531782D71287}"/>
+              </a:ext>
+            </a:extLst>
+          </p:cNvPr>
+          <p:cNvCxnSpPr/>
+          <p:nvPr/>
+        </p:nvCxnSpPr>
+        <p:spPr>
+          <a:xfrm>
+            <a:off x="8086165" y="2348753"/>
+            <a:ext cx="0" cy="847165"/>
+          </a:xfrm>
+          <a:prstGeom prst="line">
+            <a:avLst/>
+          </a:prstGeom>
+          <a:ln w="76200"/>
+        </p:spPr>
+        <p:style>
+          <a:lnRef idx="1">
+            <a:schemeClr val="accent1"/>
+          </a:lnRef>
+          <a:fillRef idx="0">
+            <a:schemeClr val="accent1"/>
+          </a:fillRef>
+          <a:effectRef idx="0">
+            <a:schemeClr val="accent1"/>
+          </a:effectRef>
+          <a:fontRef idx="minor">
+            <a:schemeClr val="tx1"/>
+          </a:fontRef>
+        </p:style>
+      </p:cxnSp>
+      <p:sp>
+        <p:nvSpPr>
+          <p:cNvPr id="19" name="TextBox 18">
+            <a:extLst>
+              <a:ext uri="{FF2B5EF4-FFF2-40B4-BE49-F238E27FC236}">
+                <a16:creationId xmlns:a16="http://schemas.microsoft.com/office/drawing/2014/main" id="{0C5A58CC-9397-4BE3-B765-AD22674A1654}"/>
+              </a:ext>
+            </a:extLst>
+          </p:cNvPr>
+          <p:cNvSpPr txBox="1"/>
+          <p:nvPr/>
+        </p:nvSpPr>
+        <p:spPr>
+          <a:xfrm>
+            <a:off x="7606549" y="3284679"/>
+            <a:ext cx="1065484" cy="369332"/>
+          </a:xfrm>
+          <a:prstGeom prst="rect">
+            <a:avLst/>
+          </a:prstGeom>
+          <a:noFill/>
+        </p:spPr>
+        <p:txBody>
+          <a:bodyPr wrap="none" rtlCol="0">
+            <a:spAutoFit/>
+          </a:bodyPr>
+          <a:lstStyle/>
+          <a:p>
+            <a:r>
+              <a:rPr lang="fr-FR" dirty="0" err="1"/>
+              <a:t>complete</a:t>
+            </a:r>
+            <a:endParaRPr lang="fr-FR" dirty="0"/>
+          </a:p>
+        </p:txBody>
+      </p:sp>
+      <p:cxnSp>
+        <p:nvCxnSpPr>
+          <p:cNvPr id="21" name="Straight Connector 20">
+            <a:extLst>
+              <a:ext uri="{FF2B5EF4-FFF2-40B4-BE49-F238E27FC236}">
+                <a16:creationId xmlns:a16="http://schemas.microsoft.com/office/drawing/2014/main" id="{B252B859-1C55-491E-BC26-402C4EF4F68F}"/>
+              </a:ext>
+            </a:extLst>
+          </p:cNvPr>
+          <p:cNvCxnSpPr/>
+          <p:nvPr/>
+        </p:nvCxnSpPr>
+        <p:spPr>
+          <a:xfrm>
+            <a:off x="5109882" y="1690688"/>
+            <a:ext cx="0" cy="3087500"/>
+          </a:xfrm>
+          <a:prstGeom prst="line">
+            <a:avLst/>
+          </a:prstGeom>
+          <a:ln w="76200"/>
+        </p:spPr>
+        <p:style>
+          <a:lnRef idx="1">
+            <a:schemeClr val="accent1"/>
+          </a:lnRef>
+          <a:fillRef idx="0">
+            <a:schemeClr val="accent1"/>
+          </a:fillRef>
+          <a:effectRef idx="0">
+            <a:schemeClr val="accent1"/>
+          </a:effectRef>
+          <a:fontRef idx="minor">
+            <a:schemeClr val="tx1"/>
+          </a:fontRef>
+        </p:style>
+      </p:cxnSp>
+      <p:sp>
+        <p:nvSpPr>
+          <p:cNvPr id="22" name="TextBox 21">
+            <a:extLst>
+              <a:ext uri="{FF2B5EF4-FFF2-40B4-BE49-F238E27FC236}">
+                <a16:creationId xmlns:a16="http://schemas.microsoft.com/office/drawing/2014/main" id="{D0989A2C-B5E3-43A6-A8C0-0E51E5991C4B}"/>
+              </a:ext>
+            </a:extLst>
+          </p:cNvPr>
+          <p:cNvSpPr txBox="1"/>
+          <p:nvPr/>
+        </p:nvSpPr>
+        <p:spPr>
+          <a:xfrm>
+            <a:off x="4047112" y="4864261"/>
+            <a:ext cx="2566600" cy="369332"/>
+          </a:xfrm>
+          <a:prstGeom prst="rect">
+            <a:avLst/>
+          </a:prstGeom>
+          <a:noFill/>
+        </p:spPr>
+        <p:txBody>
+          <a:bodyPr wrap="none" rtlCol="0">
+            <a:spAutoFit/>
+          </a:bodyPr>
+          <a:lstStyle/>
+          <a:p>
+            <a:r>
+              <a:rPr lang="fr-FR" dirty="0" err="1"/>
+              <a:t>subscription.unsubsribe</a:t>
+            </a:r>
+            <a:r>
+              <a:rPr lang="fr-FR" dirty="0"/>
+              <a:t>()</a:t>
+            </a:r>
+          </a:p>
+        </p:txBody>
+      </p:sp>
+      <p:cxnSp>
+        <p:nvCxnSpPr>
+          <p:cNvPr id="24" name="Straight Connector 23">
+            <a:extLst>
+              <a:ext uri="{FF2B5EF4-FFF2-40B4-BE49-F238E27FC236}">
+                <a16:creationId xmlns:a16="http://schemas.microsoft.com/office/drawing/2014/main" id="{470E98CC-8EDD-4C7C-8940-8DB7C7ACE006}"/>
+              </a:ext>
+            </a:extLst>
+          </p:cNvPr>
+          <p:cNvCxnSpPr/>
+          <p:nvPr/>
+        </p:nvCxnSpPr>
+        <p:spPr>
+          <a:xfrm>
+            <a:off x="9475694" y="2424952"/>
+            <a:ext cx="425824" cy="623047"/>
+          </a:xfrm>
+          <a:prstGeom prst="line">
+            <a:avLst/>
+          </a:prstGeom>
+          <a:ln w="76200"/>
+        </p:spPr>
+        <p:style>
+          <a:lnRef idx="1">
+            <a:schemeClr val="accent1"/>
+          </a:lnRef>
+          <a:fillRef idx="0">
+            <a:schemeClr val="accent1"/>
+          </a:fillRef>
+          <a:effectRef idx="0">
+            <a:schemeClr val="accent1"/>
+          </a:effectRef>
+          <a:fontRef idx="minor">
+            <a:schemeClr val="tx1"/>
+          </a:fontRef>
+        </p:style>
+      </p:cxnSp>
+      <p:cxnSp>
+        <p:nvCxnSpPr>
+          <p:cNvPr id="26" name="Straight Connector 25">
+            <a:extLst>
+              <a:ext uri="{FF2B5EF4-FFF2-40B4-BE49-F238E27FC236}">
+                <a16:creationId xmlns:a16="http://schemas.microsoft.com/office/drawing/2014/main" id="{C5449032-E234-4CB2-9C0A-C9DD753DA8B4}"/>
+              </a:ext>
+            </a:extLst>
+          </p:cNvPr>
+          <p:cNvCxnSpPr/>
+          <p:nvPr/>
+        </p:nvCxnSpPr>
+        <p:spPr>
+          <a:xfrm flipH="1">
+            <a:off x="9421906" y="2324100"/>
+            <a:ext cx="533400" cy="775447"/>
+          </a:xfrm>
+          <a:prstGeom prst="line">
+            <a:avLst/>
+          </a:prstGeom>
+          <a:ln w="76200"/>
+        </p:spPr>
+        <p:style>
+          <a:lnRef idx="1">
+            <a:schemeClr val="accent1"/>
+          </a:lnRef>
+          <a:fillRef idx="0">
+            <a:schemeClr val="accent1"/>
+          </a:fillRef>
+          <a:effectRef idx="0">
+            <a:schemeClr val="accent1"/>
+          </a:effectRef>
+          <a:fontRef idx="minor">
+            <a:schemeClr val="tx1"/>
+          </a:fontRef>
+        </p:style>
+      </p:cxnSp>
+      <p:sp>
+        <p:nvSpPr>
+          <p:cNvPr id="27" name="TextBox 26">
+            <a:extLst>
+              <a:ext uri="{FF2B5EF4-FFF2-40B4-BE49-F238E27FC236}">
+                <a16:creationId xmlns:a16="http://schemas.microsoft.com/office/drawing/2014/main" id="{40EE9367-81CC-4043-BE15-B80751D537EB}"/>
+              </a:ext>
+            </a:extLst>
+          </p:cNvPr>
+          <p:cNvSpPr txBox="1"/>
+          <p:nvPr/>
+        </p:nvSpPr>
+        <p:spPr>
+          <a:xfrm>
+            <a:off x="9372734" y="3186953"/>
+            <a:ext cx="658642" cy="369332"/>
+          </a:xfrm>
+          <a:prstGeom prst="rect">
+            <a:avLst/>
+          </a:prstGeom>
+          <a:noFill/>
+        </p:spPr>
+        <p:txBody>
+          <a:bodyPr wrap="none" rtlCol="0">
+            <a:spAutoFit/>
+          </a:bodyPr>
+          <a:lstStyle/>
+          <a:p>
+            <a:r>
+              <a:rPr lang="fr-FR" dirty="0" err="1"/>
+              <a:t>error</a:t>
+            </a:r>
+            <a:endParaRPr lang="fr-FR" dirty="0"/>
+          </a:p>
+        </p:txBody>
+      </p:sp>
+    </p:spTree>
+    <p:extLst>
+      <p:ext uri="{BB962C8B-B14F-4D97-AF65-F5344CB8AC3E}">
+        <p14:creationId xmlns:p14="http://schemas.microsoft.com/office/powerpoint/2010/main" val="2025025853"/>
+      </p:ext>
+    </p:extLst>
+  </p:cSld>
+  <p:clrMapOvr>
+    <a:masterClrMapping/>
+  </p:clrMapOvr>
+</p:sld>
+</file>
+
+<file path=ppt/slides/slide15.xml><?xml version="1.0" encoding="utf-8"?>
+<p:sld xmlns:a="http://schemas.openxmlformats.org/drawingml/2006/main" xmlns:r="http://schemas.openxmlformats.org/officeDocument/2006/relationships" xmlns:p="http://schemas.openxmlformats.org/presentationml/2006/main">
+  <p:cSld>
+    <p:spTree>
+      <p:nvGrpSpPr>
+        <p:cNvPr id="1" name=""/>
+        <p:cNvGrpSpPr/>
+        <p:nvPr/>
+      </p:nvGrpSpPr>
+      <p:grpSpPr>
+        <a:xfrm>
+          <a:off x="0" y="0"/>
+          <a:ext cx="0" cy="0"/>
+          <a:chOff x="0" y="0"/>
+          <a:chExt cx="0" cy="0"/>
+        </a:xfrm>
+      </p:grpSpPr>
+      <p:sp>
+        <p:nvSpPr>
+          <p:cNvPr id="2" name="Title 1">
+            <a:extLst>
+              <a:ext uri="{FF2B5EF4-FFF2-40B4-BE49-F238E27FC236}">
+                <a16:creationId xmlns:a16="http://schemas.microsoft.com/office/drawing/2014/main" id="{E6733150-7398-46AE-B70A-3D7007A5E310}"/>
+              </a:ext>
+            </a:extLst>
+          </p:cNvPr>
+          <p:cNvSpPr>
+            <a:spLocks noGrp="1"/>
+          </p:cNvSpPr>
+          <p:nvPr>
+            <p:ph type="title"/>
+          </p:nvPr>
+        </p:nvSpPr>
+        <p:spPr/>
+        <p:txBody>
+          <a:bodyPr/>
+          <a:lstStyle/>
+          <a:p>
+            <a:r>
+              <a:rPr lang="fr-FR" dirty="0"/>
+              <a:t>observable </a:t>
+            </a:r>
+            <a:r>
+              <a:rPr lang="fr-FR" dirty="0" err="1"/>
+              <a:t>operator</a:t>
+            </a:r>
+            <a:r>
+              <a:rPr lang="fr-FR" dirty="0"/>
+              <a:t> </a:t>
+            </a:r>
+            <a:r>
+              <a:rPr lang="fr-FR" dirty="0" err="1"/>
+              <a:t>debounceTime</a:t>
+            </a:r>
+            <a:endParaRPr lang="fr-FR" dirty="0"/>
+          </a:p>
+        </p:txBody>
+      </p:sp>
+      <p:cxnSp>
+        <p:nvCxnSpPr>
+          <p:cNvPr id="5" name="Straight Arrow Connector 4">
+            <a:extLst>
+              <a:ext uri="{FF2B5EF4-FFF2-40B4-BE49-F238E27FC236}">
+                <a16:creationId xmlns:a16="http://schemas.microsoft.com/office/drawing/2014/main" id="{662FED96-A53A-4A4E-AF30-966005271812}"/>
+              </a:ext>
+            </a:extLst>
+          </p:cNvPr>
+          <p:cNvCxnSpPr/>
+          <p:nvPr/>
+        </p:nvCxnSpPr>
+        <p:spPr>
+          <a:xfrm>
+            <a:off x="215153" y="2303929"/>
+            <a:ext cx="11376212" cy="0"/>
+          </a:xfrm>
+          <a:prstGeom prst="straightConnector1">
+            <a:avLst/>
+          </a:prstGeom>
+          <a:ln w="76200">
+            <a:tailEnd type="triangle"/>
+          </a:ln>
+        </p:spPr>
+        <p:style>
+          <a:lnRef idx="1">
+            <a:schemeClr val="accent1"/>
+          </a:lnRef>
+          <a:fillRef idx="0">
+            <a:schemeClr val="accent1"/>
+          </a:fillRef>
+          <a:effectRef idx="0">
+            <a:schemeClr val="accent1"/>
+          </a:effectRef>
+          <a:fontRef idx="minor">
+            <a:schemeClr val="tx1"/>
+          </a:fontRef>
+        </p:style>
+      </p:cxnSp>
+      <p:sp>
+        <p:nvSpPr>
+          <p:cNvPr id="6" name="Oval 5">
+            <a:extLst>
+              <a:ext uri="{FF2B5EF4-FFF2-40B4-BE49-F238E27FC236}">
+                <a16:creationId xmlns:a16="http://schemas.microsoft.com/office/drawing/2014/main" id="{DF9757C3-379B-4849-B74C-FC670543E347}"/>
+              </a:ext>
+            </a:extLst>
+          </p:cNvPr>
+          <p:cNvSpPr/>
+          <p:nvPr/>
+        </p:nvSpPr>
+        <p:spPr>
+          <a:xfrm>
+            <a:off x="1532965" y="1990164"/>
+            <a:ext cx="672353" cy="627529"/>
+          </a:xfrm>
+          <a:prstGeom prst="ellipse">
+            <a:avLst/>
+          </a:prstGeom>
+        </p:spPr>
+        <p:style>
+          <a:lnRef idx="2">
+            <a:schemeClr val="accent1">
+              <a:shade val="50000"/>
+            </a:schemeClr>
+          </a:lnRef>
+          <a:fillRef idx="1">
+            <a:schemeClr val="accent1"/>
+          </a:fillRef>
+          <a:effectRef idx="0">
+            <a:schemeClr val="accent1"/>
+          </a:effectRef>
+          <a:fontRef idx="minor">
+            <a:schemeClr val="lt1"/>
+          </a:fontRef>
+        </p:style>
+        <p:txBody>
+          <a:bodyPr rtlCol="0" anchor="ctr"/>
+          <a:lstStyle/>
+          <a:p>
+            <a:pPr algn="ctr"/>
+            <a:endParaRPr lang="fr-FR"/>
+          </a:p>
+        </p:txBody>
+      </p:sp>
+      <p:cxnSp>
+        <p:nvCxnSpPr>
+          <p:cNvPr id="8" name="Straight Connector 7">
+            <a:extLst>
+              <a:ext uri="{FF2B5EF4-FFF2-40B4-BE49-F238E27FC236}">
+                <a16:creationId xmlns:a16="http://schemas.microsoft.com/office/drawing/2014/main" id="{63ADAD24-0E82-4137-82A6-78E620849E63}"/>
+              </a:ext>
+            </a:extLst>
+          </p:cNvPr>
+          <p:cNvCxnSpPr/>
+          <p:nvPr/>
+        </p:nvCxnSpPr>
+        <p:spPr>
+          <a:xfrm>
+            <a:off x="519953" y="1913965"/>
+            <a:ext cx="0" cy="762000"/>
+          </a:xfrm>
+          <a:prstGeom prst="line">
+            <a:avLst/>
+          </a:prstGeom>
+          <a:ln w="76200"/>
+        </p:spPr>
+        <p:style>
+          <a:lnRef idx="1">
+            <a:schemeClr val="accent1"/>
+          </a:lnRef>
+          <a:fillRef idx="0">
+            <a:schemeClr val="accent1"/>
+          </a:fillRef>
+          <a:effectRef idx="0">
+            <a:schemeClr val="accent1"/>
+          </a:effectRef>
+          <a:fontRef idx="minor">
+            <a:schemeClr val="tx1"/>
+          </a:fontRef>
+        </p:style>
+      </p:cxnSp>
+      <p:sp>
+        <p:nvSpPr>
+          <p:cNvPr id="9" name="Oval 8">
+            <a:extLst>
+              <a:ext uri="{FF2B5EF4-FFF2-40B4-BE49-F238E27FC236}">
+                <a16:creationId xmlns:a16="http://schemas.microsoft.com/office/drawing/2014/main" id="{3555A8CD-191B-44BA-B443-D93DEB6378B9}"/>
+              </a:ext>
+            </a:extLst>
+          </p:cNvPr>
+          <p:cNvSpPr/>
+          <p:nvPr/>
+        </p:nvSpPr>
+        <p:spPr>
+          <a:xfrm>
+            <a:off x="8444752" y="1990163"/>
+            <a:ext cx="672353" cy="627529"/>
+          </a:xfrm>
+          <a:prstGeom prst="ellipse">
+            <a:avLst/>
+          </a:prstGeom>
+        </p:spPr>
+        <p:style>
+          <a:lnRef idx="2">
+            <a:schemeClr val="accent1">
+              <a:shade val="50000"/>
+            </a:schemeClr>
+          </a:lnRef>
+          <a:fillRef idx="1">
+            <a:schemeClr val="accent1"/>
+          </a:fillRef>
+          <a:effectRef idx="0">
+            <a:schemeClr val="accent1"/>
+          </a:effectRef>
+          <a:fontRef idx="minor">
+            <a:schemeClr val="lt1"/>
+          </a:fontRef>
+        </p:style>
+        <p:txBody>
+          <a:bodyPr rtlCol="0" anchor="ctr"/>
+          <a:lstStyle/>
+          <a:p>
+            <a:pPr algn="ctr"/>
+            <a:endParaRPr lang="fr-FR"/>
+          </a:p>
+        </p:txBody>
+      </p:sp>
+      <p:sp>
+        <p:nvSpPr>
+          <p:cNvPr id="10" name="Oval 9">
+            <a:extLst>
+              <a:ext uri="{FF2B5EF4-FFF2-40B4-BE49-F238E27FC236}">
+                <a16:creationId xmlns:a16="http://schemas.microsoft.com/office/drawing/2014/main" id="{1B9B5BEB-1BED-48BC-A457-A70197A41B1D}"/>
+              </a:ext>
+            </a:extLst>
+          </p:cNvPr>
+          <p:cNvSpPr/>
+          <p:nvPr/>
+        </p:nvSpPr>
+        <p:spPr>
+          <a:xfrm>
+            <a:off x="3639671" y="1990164"/>
+            <a:ext cx="672353" cy="627529"/>
+          </a:xfrm>
+          <a:prstGeom prst="ellipse">
+            <a:avLst/>
+          </a:prstGeom>
+        </p:spPr>
+        <p:style>
+          <a:lnRef idx="2">
+            <a:schemeClr val="accent1">
+              <a:shade val="50000"/>
+            </a:schemeClr>
+          </a:lnRef>
+          <a:fillRef idx="1">
+            <a:schemeClr val="accent1"/>
+          </a:fillRef>
+          <a:effectRef idx="0">
+            <a:schemeClr val="accent1"/>
+          </a:effectRef>
+          <a:fontRef idx="minor">
+            <a:schemeClr val="lt1"/>
+          </a:fontRef>
+        </p:style>
+        <p:txBody>
+          <a:bodyPr rtlCol="0" anchor="ctr"/>
+          <a:lstStyle/>
+          <a:p>
+            <a:pPr algn="ctr"/>
+            <a:endParaRPr lang="fr-FR"/>
+          </a:p>
+        </p:txBody>
+      </p:sp>
+      <p:sp>
+        <p:nvSpPr>
+          <p:cNvPr id="11" name="Oval 10">
+            <a:extLst>
+              <a:ext uri="{FF2B5EF4-FFF2-40B4-BE49-F238E27FC236}">
+                <a16:creationId xmlns:a16="http://schemas.microsoft.com/office/drawing/2014/main" id="{68CD15ED-D4D1-4CC7-85D7-5CC381F72A12}"/>
+              </a:ext>
+            </a:extLst>
+          </p:cNvPr>
+          <p:cNvSpPr/>
+          <p:nvPr/>
+        </p:nvSpPr>
+        <p:spPr>
+          <a:xfrm>
+            <a:off x="4314265" y="1981198"/>
+            <a:ext cx="672353" cy="627529"/>
+          </a:xfrm>
+          <a:prstGeom prst="ellipse">
+            <a:avLst/>
+          </a:prstGeom>
+        </p:spPr>
+        <p:style>
+          <a:lnRef idx="2">
+            <a:schemeClr val="accent1">
+              <a:shade val="50000"/>
+            </a:schemeClr>
+          </a:lnRef>
+          <a:fillRef idx="1">
+            <a:schemeClr val="accent1"/>
+          </a:fillRef>
+          <a:effectRef idx="0">
+            <a:schemeClr val="accent1"/>
+          </a:effectRef>
+          <a:fontRef idx="minor">
+            <a:schemeClr val="lt1"/>
+          </a:fontRef>
+        </p:style>
+        <p:txBody>
+          <a:bodyPr rtlCol="0" anchor="ctr"/>
+          <a:lstStyle/>
+          <a:p>
+            <a:pPr algn="ctr"/>
+            <a:endParaRPr lang="fr-FR"/>
+          </a:p>
+        </p:txBody>
+      </p:sp>
+      <p:sp>
+        <p:nvSpPr>
+          <p:cNvPr id="12" name="Oval 11">
+            <a:extLst>
+              <a:ext uri="{FF2B5EF4-FFF2-40B4-BE49-F238E27FC236}">
+                <a16:creationId xmlns:a16="http://schemas.microsoft.com/office/drawing/2014/main" id="{707912E7-8E31-4229-B775-6221D3B0D01B}"/>
+              </a:ext>
+            </a:extLst>
+          </p:cNvPr>
+          <p:cNvSpPr/>
+          <p:nvPr/>
+        </p:nvSpPr>
+        <p:spPr>
+          <a:xfrm>
+            <a:off x="4988859" y="1981199"/>
+            <a:ext cx="672353" cy="627529"/>
+          </a:xfrm>
+          <a:prstGeom prst="ellipse">
+            <a:avLst/>
+          </a:prstGeom>
+        </p:spPr>
+        <p:style>
+          <a:lnRef idx="2">
+            <a:schemeClr val="accent1">
+              <a:shade val="50000"/>
+            </a:schemeClr>
+          </a:lnRef>
+          <a:fillRef idx="1">
+            <a:schemeClr val="accent1"/>
+          </a:fillRef>
+          <a:effectRef idx="0">
+            <a:schemeClr val="accent1"/>
+          </a:effectRef>
+          <a:fontRef idx="minor">
+            <a:schemeClr val="lt1"/>
+          </a:fontRef>
+        </p:style>
+        <p:txBody>
+          <a:bodyPr rtlCol="0" anchor="ctr"/>
+          <a:lstStyle/>
+          <a:p>
+            <a:pPr algn="ctr"/>
+            <a:endParaRPr lang="fr-FR"/>
+          </a:p>
+        </p:txBody>
+      </p:sp>
+      <p:cxnSp>
+        <p:nvCxnSpPr>
+          <p:cNvPr id="13" name="Straight Arrow Connector 12">
+            <a:extLst>
+              <a:ext uri="{FF2B5EF4-FFF2-40B4-BE49-F238E27FC236}">
+                <a16:creationId xmlns:a16="http://schemas.microsoft.com/office/drawing/2014/main" id="{60B73E08-C340-4110-89C4-071139033C42}"/>
+              </a:ext>
+            </a:extLst>
+          </p:cNvPr>
+          <p:cNvCxnSpPr/>
+          <p:nvPr/>
+        </p:nvCxnSpPr>
+        <p:spPr>
+          <a:xfrm>
+            <a:off x="215153" y="4061012"/>
+            <a:ext cx="11376212" cy="0"/>
+          </a:xfrm>
+          <a:prstGeom prst="straightConnector1">
+            <a:avLst/>
+          </a:prstGeom>
+          <a:ln w="76200">
+            <a:tailEnd type="triangle"/>
+          </a:ln>
+        </p:spPr>
+        <p:style>
+          <a:lnRef idx="1">
+            <a:schemeClr val="accent1"/>
+          </a:lnRef>
+          <a:fillRef idx="0">
+            <a:schemeClr val="accent1"/>
+          </a:fillRef>
+          <a:effectRef idx="0">
+            <a:schemeClr val="accent1"/>
+          </a:effectRef>
+          <a:fontRef idx="minor">
+            <a:schemeClr val="tx1"/>
+          </a:fontRef>
+        </p:style>
+      </p:cxnSp>
+      <p:sp>
+        <p:nvSpPr>
+          <p:cNvPr id="14" name="Oval 13">
+            <a:extLst>
+              <a:ext uri="{FF2B5EF4-FFF2-40B4-BE49-F238E27FC236}">
+                <a16:creationId xmlns:a16="http://schemas.microsoft.com/office/drawing/2014/main" id="{89A2D1C4-45AA-48C0-9E0E-E968A25BFBDE}"/>
+              </a:ext>
+            </a:extLst>
+          </p:cNvPr>
+          <p:cNvSpPr/>
+          <p:nvPr/>
+        </p:nvSpPr>
+        <p:spPr>
+          <a:xfrm>
+            <a:off x="2290483" y="3747246"/>
+            <a:ext cx="672353" cy="627529"/>
+          </a:xfrm>
+          <a:prstGeom prst="ellipse">
+            <a:avLst/>
+          </a:prstGeom>
+        </p:spPr>
+        <p:style>
+          <a:lnRef idx="2">
+            <a:schemeClr val="accent1">
+              <a:shade val="50000"/>
+            </a:schemeClr>
+          </a:lnRef>
+          <a:fillRef idx="1">
+            <a:schemeClr val="accent1"/>
+          </a:fillRef>
+          <a:effectRef idx="0">
+            <a:schemeClr val="accent1"/>
+          </a:effectRef>
+          <a:fontRef idx="minor">
+            <a:schemeClr val="lt1"/>
+          </a:fontRef>
+        </p:style>
+        <p:txBody>
+          <a:bodyPr rtlCol="0" anchor="ctr"/>
+          <a:lstStyle/>
+          <a:p>
+            <a:pPr algn="ctr"/>
+            <a:endParaRPr lang="fr-FR"/>
+          </a:p>
+        </p:txBody>
+      </p:sp>
+      <p:cxnSp>
+        <p:nvCxnSpPr>
+          <p:cNvPr id="15" name="Straight Connector 14">
+            <a:extLst>
+              <a:ext uri="{FF2B5EF4-FFF2-40B4-BE49-F238E27FC236}">
+                <a16:creationId xmlns:a16="http://schemas.microsoft.com/office/drawing/2014/main" id="{BCCA200D-E96A-4782-874B-0EB30F663698}"/>
+              </a:ext>
+            </a:extLst>
+          </p:cNvPr>
+          <p:cNvCxnSpPr/>
+          <p:nvPr/>
+        </p:nvCxnSpPr>
+        <p:spPr>
+          <a:xfrm>
+            <a:off x="519953" y="3671048"/>
+            <a:ext cx="0" cy="762000"/>
+          </a:xfrm>
+          <a:prstGeom prst="line">
+            <a:avLst/>
+          </a:prstGeom>
+          <a:ln w="76200"/>
+        </p:spPr>
+        <p:style>
+          <a:lnRef idx="1">
+            <a:schemeClr val="accent1"/>
+          </a:lnRef>
+          <a:fillRef idx="0">
+            <a:schemeClr val="accent1"/>
+          </a:fillRef>
+          <a:effectRef idx="0">
+            <a:schemeClr val="accent1"/>
+          </a:effectRef>
+          <a:fontRef idx="minor">
+            <a:schemeClr val="tx1"/>
+          </a:fontRef>
+        </p:style>
+      </p:cxnSp>
+      <p:sp>
+        <p:nvSpPr>
+          <p:cNvPr id="16" name="Oval 15">
+            <a:extLst>
+              <a:ext uri="{FF2B5EF4-FFF2-40B4-BE49-F238E27FC236}">
+                <a16:creationId xmlns:a16="http://schemas.microsoft.com/office/drawing/2014/main" id="{FB491347-3E4D-485E-9971-B78737AA3E94}"/>
+              </a:ext>
+            </a:extLst>
+          </p:cNvPr>
+          <p:cNvSpPr/>
+          <p:nvPr/>
+        </p:nvSpPr>
+        <p:spPr>
+          <a:xfrm>
+            <a:off x="9157446" y="3724831"/>
+            <a:ext cx="672353" cy="627529"/>
+          </a:xfrm>
+          <a:prstGeom prst="ellipse">
+            <a:avLst/>
+          </a:prstGeom>
+        </p:spPr>
+        <p:style>
+          <a:lnRef idx="2">
+            <a:schemeClr val="accent1">
+              <a:shade val="50000"/>
+            </a:schemeClr>
+          </a:lnRef>
+          <a:fillRef idx="1">
+            <a:schemeClr val="accent1"/>
+          </a:fillRef>
+          <a:effectRef idx="0">
+            <a:schemeClr val="accent1"/>
+          </a:effectRef>
+          <a:fontRef idx="minor">
+            <a:schemeClr val="lt1"/>
+          </a:fontRef>
+        </p:style>
+        <p:txBody>
+          <a:bodyPr rtlCol="0" anchor="ctr"/>
+          <a:lstStyle/>
+          <a:p>
+            <a:pPr algn="ctr"/>
+            <a:endParaRPr lang="fr-FR"/>
+          </a:p>
+        </p:txBody>
+      </p:sp>
+      <p:sp>
+        <p:nvSpPr>
+          <p:cNvPr id="19" name="Oval 18">
+            <a:extLst>
+              <a:ext uri="{FF2B5EF4-FFF2-40B4-BE49-F238E27FC236}">
+                <a16:creationId xmlns:a16="http://schemas.microsoft.com/office/drawing/2014/main" id="{9F2C2CCC-7B01-4851-898E-AF9EC5E6B766}"/>
+              </a:ext>
+            </a:extLst>
+          </p:cNvPr>
+          <p:cNvSpPr/>
+          <p:nvPr/>
+        </p:nvSpPr>
+        <p:spPr>
+          <a:xfrm>
+            <a:off x="5853953" y="3733797"/>
+            <a:ext cx="672353" cy="627529"/>
+          </a:xfrm>
+          <a:prstGeom prst="ellipse">
+            <a:avLst/>
+          </a:prstGeom>
+        </p:spPr>
+        <p:style>
+          <a:lnRef idx="2">
+            <a:schemeClr val="accent1">
+              <a:shade val="50000"/>
+            </a:schemeClr>
+          </a:lnRef>
+          <a:fillRef idx="1">
+            <a:schemeClr val="accent1"/>
+          </a:fillRef>
+          <a:effectRef idx="0">
+            <a:schemeClr val="accent1"/>
+          </a:effectRef>
+          <a:fontRef idx="minor">
+            <a:schemeClr val="lt1"/>
+          </a:fontRef>
+        </p:style>
+        <p:txBody>
+          <a:bodyPr rtlCol="0" anchor="ctr"/>
+          <a:lstStyle/>
+          <a:p>
+            <a:pPr algn="ctr"/>
+            <a:endParaRPr lang="fr-FR"/>
+          </a:p>
+        </p:txBody>
+      </p:sp>
+    </p:spTree>
+    <p:extLst>
+      <p:ext uri="{BB962C8B-B14F-4D97-AF65-F5344CB8AC3E}">
+        <p14:creationId xmlns:p14="http://schemas.microsoft.com/office/powerpoint/2010/main" val="2421560045"/>
+      </p:ext>
+    </p:extLst>
+  </p:cSld>
+  <p:clrMapOvr>
+    <a:masterClrMapping/>
+  </p:clrMapOvr>
+</p:sld>
+</file>
+
+<file path=ppt/slides/slide16.xml><?xml version="1.0" encoding="utf-8"?>
+<p:sld xmlns:a="http://schemas.openxmlformats.org/drawingml/2006/main" xmlns:r="http://schemas.openxmlformats.org/officeDocument/2006/relationships" xmlns:p="http://schemas.openxmlformats.org/presentationml/2006/main">
+  <p:cSld>
+    <p:spTree>
+      <p:nvGrpSpPr>
+        <p:cNvPr id="1" name=""/>
+        <p:cNvGrpSpPr/>
+        <p:nvPr/>
+      </p:nvGrpSpPr>
+      <p:grpSpPr>
+        <a:xfrm>
+          <a:off x="0" y="0"/>
+          <a:ext cx="0" cy="0"/>
+          <a:chOff x="0" y="0"/>
+          <a:chExt cx="0" cy="0"/>
+        </a:xfrm>
+      </p:grpSpPr>
+      <p:sp>
+        <p:nvSpPr>
+          <p:cNvPr id="2" name="Title 1">
+            <a:extLst>
+              <a:ext uri="{FF2B5EF4-FFF2-40B4-BE49-F238E27FC236}">
+                <a16:creationId xmlns:a16="http://schemas.microsoft.com/office/drawing/2014/main" id="{23DED0F9-3E95-4080-9D53-9FD2833EE877}"/>
+              </a:ext>
+            </a:extLst>
+          </p:cNvPr>
+          <p:cNvSpPr>
+            <a:spLocks noGrp="1"/>
+          </p:cNvSpPr>
+          <p:nvPr>
+            <p:ph type="title"/>
+          </p:nvPr>
+        </p:nvSpPr>
+        <p:spPr/>
+        <p:txBody>
+          <a:bodyPr/>
+          <a:lstStyle/>
+          <a:p>
+            <a:r>
+              <a:rPr lang="fr-FR" dirty="0"/>
+              <a:t>Projets intéressants</a:t>
+            </a:r>
+          </a:p>
+        </p:txBody>
+      </p:sp>
+      <p:sp>
+        <p:nvSpPr>
+          <p:cNvPr id="3" name="Content Placeholder 2">
+            <a:extLst>
+              <a:ext uri="{FF2B5EF4-FFF2-40B4-BE49-F238E27FC236}">
+                <a16:creationId xmlns:a16="http://schemas.microsoft.com/office/drawing/2014/main" id="{E76B2CAA-ABFC-4EAE-8ECE-8A2225A8A672}"/>
+              </a:ext>
+            </a:extLst>
+          </p:cNvPr>
+          <p:cNvSpPr>
+            <a:spLocks noGrp="1"/>
+          </p:cNvSpPr>
+          <p:nvPr>
+            <p:ph idx="1"/>
+          </p:nvPr>
+        </p:nvSpPr>
+        <p:spPr/>
+        <p:txBody>
+          <a:bodyPr>
+            <a:normAutofit fontScale="77500" lnSpcReduction="20000"/>
+          </a:bodyPr>
+          <a:lstStyle/>
+          <a:p>
+            <a:r>
+              <a:rPr lang="fr-FR" dirty="0"/>
+              <a:t>stars:&gt;50000</a:t>
+            </a:r>
+          </a:p>
+          <a:p>
+            <a:r>
+              <a:rPr lang="fr-FR" dirty="0" err="1"/>
+              <a:t>lowdb</a:t>
+            </a:r>
+            <a:endParaRPr lang="fr-FR" dirty="0"/>
+          </a:p>
+          <a:p>
+            <a:r>
+              <a:rPr lang="fr-FR" dirty="0" err="1"/>
+              <a:t>json</a:t>
+            </a:r>
+            <a:r>
+              <a:rPr lang="fr-FR" dirty="0"/>
+              <a:t>-serve</a:t>
+            </a:r>
+          </a:p>
+          <a:p>
+            <a:r>
+              <a:rPr lang="fr-FR" dirty="0" err="1"/>
+              <a:t>webpack</a:t>
+            </a:r>
+            <a:endParaRPr lang="fr-FR" dirty="0"/>
+          </a:p>
+          <a:p>
+            <a:r>
+              <a:rPr lang="fr-FR" dirty="0" err="1"/>
+              <a:t>babel</a:t>
+            </a:r>
+            <a:endParaRPr lang="fr-FR" dirty="0"/>
+          </a:p>
+          <a:p>
+            <a:r>
+              <a:rPr lang="fr-FR" dirty="0" err="1"/>
+              <a:t>browserlist</a:t>
+            </a:r>
+            <a:endParaRPr lang="fr-FR" dirty="0"/>
+          </a:p>
+          <a:p>
+            <a:r>
+              <a:rPr lang="fr-FR" dirty="0" err="1"/>
+              <a:t>typescript</a:t>
+            </a:r>
+            <a:r>
+              <a:rPr lang="fr-FR" dirty="0"/>
+              <a:t>/</a:t>
+            </a:r>
+            <a:r>
+              <a:rPr lang="fr-FR" dirty="0" err="1"/>
+              <a:t>ts-node</a:t>
+            </a:r>
+            <a:endParaRPr lang="fr-FR" dirty="0"/>
+          </a:p>
+          <a:p>
+            <a:r>
+              <a:rPr lang="fr-FR" dirty="0" err="1"/>
+              <a:t>nodemon</a:t>
+            </a:r>
+            <a:endParaRPr lang="fr-FR" dirty="0"/>
+          </a:p>
+          <a:p>
+            <a:r>
+              <a:rPr lang="fr-FR" dirty="0" err="1"/>
+              <a:t>eslint</a:t>
+            </a:r>
+            <a:endParaRPr lang="fr-FR" dirty="0"/>
+          </a:p>
+          <a:p>
+            <a:r>
+              <a:rPr lang="fr-FR" dirty="0" err="1"/>
+              <a:t>cypress</a:t>
+            </a:r>
+            <a:endParaRPr lang="fr-FR" dirty="0"/>
+          </a:p>
+          <a:p>
+            <a:r>
+              <a:rPr lang="fr-FR" dirty="0" err="1"/>
+              <a:t>mocha</a:t>
+            </a:r>
+            <a:endParaRPr lang="fr-FR" dirty="0"/>
+          </a:p>
+          <a:p>
+            <a:r>
+              <a:rPr lang="fr-FR" dirty="0" err="1"/>
+              <a:t>gts</a:t>
+            </a:r>
+            <a:endParaRPr lang="fr-FR" dirty="0"/>
+          </a:p>
+          <a:p>
+            <a:endParaRPr lang="fr-FR" dirty="0"/>
+          </a:p>
+        </p:txBody>
+      </p:sp>
+    </p:spTree>
+    <p:extLst>
+      <p:ext uri="{BB962C8B-B14F-4D97-AF65-F5344CB8AC3E}">
+        <p14:creationId xmlns:p14="http://schemas.microsoft.com/office/powerpoint/2010/main" val="1442822859"/>
+      </p:ext>
+    </p:extLst>
+  </p:cSld>
+  <p:clrMapOvr>
+    <a:masterClrMapping/>
+  </p:clrMapOvr>
+</p:sld>
+</file>
+
+<file path=ppt/slides/slide17.xml><?xml version="1.0" encoding="utf-8"?>
+<p:sld xmlns:a="http://schemas.openxmlformats.org/drawingml/2006/main" xmlns:r="http://schemas.openxmlformats.org/officeDocument/2006/relationships" xmlns:p="http://schemas.openxmlformats.org/presentationml/2006/main">
+  <p:cSld>
+    <p:spTree>
+      <p:nvGrpSpPr>
+        <p:cNvPr id="1" name=""/>
+        <p:cNvGrpSpPr/>
+        <p:nvPr/>
+      </p:nvGrpSpPr>
+      <p:grpSpPr>
+        <a:xfrm>
+          <a:off x="0" y="0"/>
+          <a:ext cx="0" cy="0"/>
+          <a:chOff x="0" y="0"/>
+          <a:chExt cx="0" cy="0"/>
+        </a:xfrm>
+      </p:grpSpPr>
+      <p:sp>
+        <p:nvSpPr>
+          <p:cNvPr id="2" name="Title 1">
+            <a:extLst>
+              <a:ext uri="{FF2B5EF4-FFF2-40B4-BE49-F238E27FC236}">
+                <a16:creationId xmlns:a16="http://schemas.microsoft.com/office/drawing/2014/main" id="{C8D0F3D5-E84A-483D-85D8-7733D9673DD8}"/>
+              </a:ext>
+            </a:extLst>
+          </p:cNvPr>
+          <p:cNvSpPr>
+            <a:spLocks noGrp="1"/>
+          </p:cNvSpPr>
+          <p:nvPr>
+            <p:ph type="title"/>
+          </p:nvPr>
+        </p:nvSpPr>
+        <p:spPr/>
+        <p:txBody>
+          <a:bodyPr/>
+          <a:lstStyle/>
+          <a:p>
+            <a:r>
+              <a:rPr lang="en-US" dirty="0" err="1"/>
+              <a:t>maquette</a:t>
+            </a:r>
+            <a:endParaRPr lang="fr-FR" dirty="0"/>
+          </a:p>
+        </p:txBody>
+      </p:sp>
+      <p:sp>
+        <p:nvSpPr>
+          <p:cNvPr id="4" name="Rectangle 3">
+            <a:extLst>
+              <a:ext uri="{FF2B5EF4-FFF2-40B4-BE49-F238E27FC236}">
+                <a16:creationId xmlns:a16="http://schemas.microsoft.com/office/drawing/2014/main" id="{1282B8F7-7602-44BA-9AA7-C52BE1309A6F}"/>
+              </a:ext>
+            </a:extLst>
+          </p:cNvPr>
+          <p:cNvSpPr/>
+          <p:nvPr/>
+        </p:nvSpPr>
+        <p:spPr>
+          <a:xfrm>
+            <a:off x="806824" y="1806388"/>
+            <a:ext cx="3133164" cy="4204447"/>
+          </a:xfrm>
+          <a:prstGeom prst="rect">
+            <a:avLst/>
+          </a:prstGeom>
+        </p:spPr>
+        <p:style>
+          <a:lnRef idx="2">
+            <a:schemeClr val="accent1"/>
+          </a:lnRef>
+          <a:fillRef idx="1">
+            <a:schemeClr val="lt1"/>
+          </a:fillRef>
+          <a:effectRef idx="0">
+            <a:schemeClr val="accent1"/>
+          </a:effectRef>
+          <a:fontRef idx="minor">
+            <a:schemeClr val="dk1"/>
+          </a:fontRef>
+        </p:style>
+        <p:txBody>
+          <a:bodyPr rtlCol="0" anchor="ctr"/>
+          <a:lstStyle/>
+          <a:p>
+            <a:pPr algn="ctr"/>
+            <a:endParaRPr lang="fr-FR"/>
+          </a:p>
+        </p:txBody>
+      </p:sp>
+      <p:sp>
+        <p:nvSpPr>
+          <p:cNvPr id="5" name="Rectangle 4">
+            <a:extLst>
+              <a:ext uri="{FF2B5EF4-FFF2-40B4-BE49-F238E27FC236}">
+                <a16:creationId xmlns:a16="http://schemas.microsoft.com/office/drawing/2014/main" id="{F0578214-2D88-487E-BF3D-2BA546878E21}"/>
+              </a:ext>
+            </a:extLst>
+          </p:cNvPr>
+          <p:cNvSpPr/>
+          <p:nvPr/>
+        </p:nvSpPr>
+        <p:spPr>
+          <a:xfrm>
+            <a:off x="806824" y="1806388"/>
+            <a:ext cx="3133164" cy="632012"/>
+          </a:xfrm>
+          <a:prstGeom prst="rect">
+            <a:avLst/>
+          </a:prstGeom>
+        </p:spPr>
+        <p:style>
+          <a:lnRef idx="2">
+            <a:schemeClr val="accent3">
+              <a:shade val="50000"/>
+            </a:schemeClr>
+          </a:lnRef>
+          <a:fillRef idx="1">
+            <a:schemeClr val="accent3"/>
+          </a:fillRef>
+          <a:effectRef idx="0">
+            <a:schemeClr val="accent3"/>
+          </a:effectRef>
+          <a:fontRef idx="minor">
+            <a:schemeClr val="lt1"/>
+          </a:fontRef>
+        </p:style>
+        <p:txBody>
+          <a:bodyPr rtlCol="0" anchor="ctr"/>
+          <a:lstStyle/>
+          <a:p>
+            <a:pPr algn="ctr"/>
+            <a:endParaRPr lang="fr-FR"/>
+          </a:p>
+        </p:txBody>
+      </p:sp>
+      <p:sp>
+        <p:nvSpPr>
+          <p:cNvPr id="6" name="Rectangle 5">
+            <a:extLst>
+              <a:ext uri="{FF2B5EF4-FFF2-40B4-BE49-F238E27FC236}">
+                <a16:creationId xmlns:a16="http://schemas.microsoft.com/office/drawing/2014/main" id="{732C3649-8172-4782-8417-3E240F7AC772}"/>
+              </a:ext>
+            </a:extLst>
+          </p:cNvPr>
+          <p:cNvSpPr/>
+          <p:nvPr/>
+        </p:nvSpPr>
+        <p:spPr>
+          <a:xfrm>
+            <a:off x="806824" y="5378823"/>
+            <a:ext cx="3133164" cy="632012"/>
+          </a:xfrm>
+          <a:prstGeom prst="rect">
+            <a:avLst/>
+          </a:prstGeom>
+        </p:spPr>
+        <p:style>
+          <a:lnRef idx="2">
+            <a:schemeClr val="accent3">
+              <a:shade val="50000"/>
+            </a:schemeClr>
+          </a:lnRef>
+          <a:fillRef idx="1">
+            <a:schemeClr val="accent3"/>
+          </a:fillRef>
+          <a:effectRef idx="0">
+            <a:schemeClr val="accent3"/>
+          </a:effectRef>
+          <a:fontRef idx="minor">
+            <a:schemeClr val="lt1"/>
+          </a:fontRef>
+        </p:style>
+        <p:txBody>
+          <a:bodyPr rtlCol="0" anchor="ctr"/>
+          <a:lstStyle/>
+          <a:p>
+            <a:pPr algn="ctr"/>
+            <a:r>
+              <a:rPr lang="en-US" dirty="0"/>
+              <a:t>Mentions L</a:t>
+            </a:r>
+            <a:r>
+              <a:rPr lang="fr-FR" dirty="0"/>
+              <a:t>é</a:t>
+            </a:r>
+            <a:r>
+              <a:rPr lang="en-US" dirty="0"/>
+              <a:t>gales</a:t>
+            </a:r>
+            <a:endParaRPr lang="fr-FR" dirty="0"/>
+          </a:p>
+        </p:txBody>
+      </p:sp>
+      <p:sp>
+        <p:nvSpPr>
+          <p:cNvPr id="7" name="Rectangle 6">
+            <a:extLst>
+              <a:ext uri="{FF2B5EF4-FFF2-40B4-BE49-F238E27FC236}">
+                <a16:creationId xmlns:a16="http://schemas.microsoft.com/office/drawing/2014/main" id="{F82797BA-D89F-4C2F-BA4B-FBC61423C138}"/>
+              </a:ext>
+            </a:extLst>
+          </p:cNvPr>
+          <p:cNvSpPr/>
+          <p:nvPr/>
+        </p:nvSpPr>
+        <p:spPr>
+          <a:xfrm>
+            <a:off x="959223" y="1907241"/>
+            <a:ext cx="600636" cy="452718"/>
+          </a:xfrm>
+          <a:prstGeom prst="rect">
+            <a:avLst/>
+          </a:prstGeom>
+        </p:spPr>
+        <p:style>
+          <a:lnRef idx="2">
+            <a:schemeClr val="dk1">
+              <a:shade val="50000"/>
+            </a:schemeClr>
+          </a:lnRef>
+          <a:fillRef idx="1">
+            <a:schemeClr val="dk1"/>
+          </a:fillRef>
+          <a:effectRef idx="0">
+            <a:schemeClr val="dk1"/>
+          </a:effectRef>
+          <a:fontRef idx="minor">
+            <a:schemeClr val="lt1"/>
+          </a:fontRef>
+        </p:style>
+        <p:txBody>
+          <a:bodyPr rtlCol="0" anchor="ctr"/>
+          <a:lstStyle/>
+          <a:p>
+            <a:pPr algn="ctr"/>
+            <a:endParaRPr lang="fr-FR"/>
+          </a:p>
+        </p:txBody>
+      </p:sp>
+      <p:sp>
+        <p:nvSpPr>
+          <p:cNvPr id="8" name="TextBox 7">
+            <a:extLst>
+              <a:ext uri="{FF2B5EF4-FFF2-40B4-BE49-F238E27FC236}">
+                <a16:creationId xmlns:a16="http://schemas.microsoft.com/office/drawing/2014/main" id="{45615574-920C-43D4-BF6A-01468D3A511E}"/>
+              </a:ext>
+            </a:extLst>
+          </p:cNvPr>
+          <p:cNvSpPr txBox="1"/>
+          <p:nvPr/>
+        </p:nvSpPr>
+        <p:spPr>
+          <a:xfrm>
+            <a:off x="1537447" y="1961492"/>
+            <a:ext cx="1463862" cy="369332"/>
+          </a:xfrm>
+          <a:prstGeom prst="rect">
+            <a:avLst/>
+          </a:prstGeom>
+          <a:noFill/>
+        </p:spPr>
+        <p:txBody>
+          <a:bodyPr wrap="none" rtlCol="0">
+            <a:spAutoFit/>
+          </a:bodyPr>
+          <a:lstStyle/>
+          <a:p>
+            <a:r>
+              <a:rPr lang="fr-FR" dirty="0"/>
+              <a:t>Gestion Stock</a:t>
+            </a:r>
+          </a:p>
+        </p:txBody>
+      </p:sp>
+      <p:sp>
+        <p:nvSpPr>
+          <p:cNvPr id="9" name="TextBox 8">
+            <a:extLst>
+              <a:ext uri="{FF2B5EF4-FFF2-40B4-BE49-F238E27FC236}">
+                <a16:creationId xmlns:a16="http://schemas.microsoft.com/office/drawing/2014/main" id="{0FF727AB-227B-4216-9C48-AA4C222E0401}"/>
+              </a:ext>
+            </a:extLst>
+          </p:cNvPr>
+          <p:cNvSpPr txBox="1"/>
+          <p:nvPr/>
+        </p:nvSpPr>
+        <p:spPr>
+          <a:xfrm>
+            <a:off x="838200" y="3244334"/>
+            <a:ext cx="3077637" cy="369332"/>
+          </a:xfrm>
+          <a:prstGeom prst="rect">
+            <a:avLst/>
+          </a:prstGeom>
+          <a:noFill/>
+        </p:spPr>
+        <p:txBody>
+          <a:bodyPr wrap="none" rtlCol="0">
+            <a:spAutoFit/>
+          </a:bodyPr>
+          <a:lstStyle/>
+          <a:p>
+            <a:r>
+              <a:rPr lang="fr-FR" dirty="0"/>
+              <a:t>Gérer efficacement votre stock</a:t>
+            </a:r>
+          </a:p>
+        </p:txBody>
+      </p:sp>
+      <p:sp>
+        <p:nvSpPr>
+          <p:cNvPr id="10" name="Rectangle 9">
+            <a:extLst>
+              <a:ext uri="{FF2B5EF4-FFF2-40B4-BE49-F238E27FC236}">
+                <a16:creationId xmlns:a16="http://schemas.microsoft.com/office/drawing/2014/main" id="{833B1130-834B-461E-8764-17EF33B7A007}"/>
+              </a:ext>
+            </a:extLst>
+          </p:cNvPr>
+          <p:cNvSpPr/>
+          <p:nvPr/>
+        </p:nvSpPr>
+        <p:spPr>
+          <a:xfrm>
+            <a:off x="1613647" y="3778624"/>
+            <a:ext cx="1613647" cy="551329"/>
+          </a:xfrm>
+          <a:prstGeom prst="rect">
+            <a:avLst/>
+          </a:prstGeom>
+        </p:spPr>
+        <p:style>
+          <a:lnRef idx="2">
+            <a:schemeClr val="accent3">
+              <a:shade val="50000"/>
+            </a:schemeClr>
+          </a:lnRef>
+          <a:fillRef idx="1">
+            <a:schemeClr val="accent3"/>
+          </a:fillRef>
+          <a:effectRef idx="0">
+            <a:schemeClr val="accent3"/>
+          </a:effectRef>
+          <a:fontRef idx="minor">
+            <a:schemeClr val="lt1"/>
+          </a:fontRef>
+        </p:style>
+        <p:txBody>
+          <a:bodyPr rtlCol="0" anchor="ctr"/>
+          <a:lstStyle/>
+          <a:p>
+            <a:pPr algn="ctr"/>
+            <a:r>
+              <a:rPr lang="fr-FR" dirty="0"/>
+              <a:t>Voir le stock</a:t>
+            </a:r>
+          </a:p>
+        </p:txBody>
+      </p:sp>
+      <p:sp>
+        <p:nvSpPr>
+          <p:cNvPr id="11" name="Rectangle 10">
+            <a:extLst>
+              <a:ext uri="{FF2B5EF4-FFF2-40B4-BE49-F238E27FC236}">
+                <a16:creationId xmlns:a16="http://schemas.microsoft.com/office/drawing/2014/main" id="{F3213407-3F4F-4315-ABA4-904A9BFDD1C6}"/>
+              </a:ext>
+            </a:extLst>
+          </p:cNvPr>
+          <p:cNvSpPr/>
+          <p:nvPr/>
+        </p:nvSpPr>
+        <p:spPr>
+          <a:xfrm>
+            <a:off x="5069541" y="1806388"/>
+            <a:ext cx="3133164" cy="4204447"/>
+          </a:xfrm>
+          <a:prstGeom prst="rect">
+            <a:avLst/>
+          </a:prstGeom>
+        </p:spPr>
+        <p:style>
+          <a:lnRef idx="2">
+            <a:schemeClr val="accent1"/>
+          </a:lnRef>
+          <a:fillRef idx="1">
+            <a:schemeClr val="lt1"/>
+          </a:fillRef>
+          <a:effectRef idx="0">
+            <a:schemeClr val="accent1"/>
+          </a:effectRef>
+          <a:fontRef idx="minor">
+            <a:schemeClr val="dk1"/>
+          </a:fontRef>
+        </p:style>
+        <p:txBody>
+          <a:bodyPr rtlCol="0" anchor="ctr"/>
+          <a:lstStyle/>
+          <a:p>
+            <a:pPr algn="ctr"/>
+            <a:endParaRPr lang="fr-FR"/>
+          </a:p>
+        </p:txBody>
+      </p:sp>
+      <p:sp>
+        <p:nvSpPr>
+          <p:cNvPr id="12" name="Rectangle 11">
+            <a:extLst>
+              <a:ext uri="{FF2B5EF4-FFF2-40B4-BE49-F238E27FC236}">
+                <a16:creationId xmlns:a16="http://schemas.microsoft.com/office/drawing/2014/main" id="{DD26CBE4-7E7E-4B8F-8FF0-74F96E14BB51}"/>
+              </a:ext>
+            </a:extLst>
+          </p:cNvPr>
+          <p:cNvSpPr/>
+          <p:nvPr/>
+        </p:nvSpPr>
+        <p:spPr>
+          <a:xfrm>
+            <a:off x="5069541" y="1806388"/>
+            <a:ext cx="3133164" cy="632012"/>
+          </a:xfrm>
+          <a:prstGeom prst="rect">
+            <a:avLst/>
+          </a:prstGeom>
+        </p:spPr>
+        <p:style>
+          <a:lnRef idx="2">
+            <a:schemeClr val="accent3">
+              <a:shade val="50000"/>
+            </a:schemeClr>
+          </a:lnRef>
+          <a:fillRef idx="1">
+            <a:schemeClr val="accent3"/>
+          </a:fillRef>
+          <a:effectRef idx="0">
+            <a:schemeClr val="accent3"/>
+          </a:effectRef>
+          <a:fontRef idx="minor">
+            <a:schemeClr val="lt1"/>
+          </a:fontRef>
+        </p:style>
+        <p:txBody>
+          <a:bodyPr rtlCol="0" anchor="ctr"/>
+          <a:lstStyle/>
+          <a:p>
+            <a:pPr algn="ctr"/>
+            <a:endParaRPr lang="fr-FR"/>
+          </a:p>
+        </p:txBody>
+      </p:sp>
+      <p:sp>
+        <p:nvSpPr>
+          <p:cNvPr id="13" name="Rectangle 12">
+            <a:extLst>
+              <a:ext uri="{FF2B5EF4-FFF2-40B4-BE49-F238E27FC236}">
+                <a16:creationId xmlns:a16="http://schemas.microsoft.com/office/drawing/2014/main" id="{8191076B-3BB7-4A7E-B7D4-4F3C68F401CD}"/>
+              </a:ext>
+            </a:extLst>
+          </p:cNvPr>
+          <p:cNvSpPr/>
+          <p:nvPr/>
+        </p:nvSpPr>
+        <p:spPr>
+          <a:xfrm>
+            <a:off x="5069541" y="5378823"/>
+            <a:ext cx="3133164" cy="632012"/>
+          </a:xfrm>
+          <a:prstGeom prst="rect">
+            <a:avLst/>
+          </a:prstGeom>
+        </p:spPr>
+        <p:style>
+          <a:lnRef idx="2">
+            <a:schemeClr val="accent3">
+              <a:shade val="50000"/>
+            </a:schemeClr>
+          </a:lnRef>
+          <a:fillRef idx="1">
+            <a:schemeClr val="accent3"/>
+          </a:fillRef>
+          <a:effectRef idx="0">
+            <a:schemeClr val="accent3"/>
+          </a:effectRef>
+          <a:fontRef idx="minor">
+            <a:schemeClr val="lt1"/>
+          </a:fontRef>
+        </p:style>
+        <p:txBody>
+          <a:bodyPr rtlCol="0" anchor="ctr"/>
+          <a:lstStyle/>
+          <a:p>
+            <a:pPr algn="ctr"/>
+            <a:r>
+              <a:rPr lang="en-US" dirty="0"/>
+              <a:t>Mentions L</a:t>
+            </a:r>
+            <a:r>
+              <a:rPr lang="fr-FR" dirty="0"/>
+              <a:t>é</a:t>
+            </a:r>
+            <a:r>
+              <a:rPr lang="en-US" dirty="0"/>
+              <a:t>gales</a:t>
+            </a:r>
+            <a:endParaRPr lang="fr-FR" dirty="0"/>
+          </a:p>
+        </p:txBody>
+      </p:sp>
+      <p:sp>
+        <p:nvSpPr>
+          <p:cNvPr id="14" name="Rectangle 13">
+            <a:extLst>
+              <a:ext uri="{FF2B5EF4-FFF2-40B4-BE49-F238E27FC236}">
+                <a16:creationId xmlns:a16="http://schemas.microsoft.com/office/drawing/2014/main" id="{0FC09472-87CE-4003-B7F8-F9B0B8D0F748}"/>
+              </a:ext>
+            </a:extLst>
+          </p:cNvPr>
+          <p:cNvSpPr/>
+          <p:nvPr/>
+        </p:nvSpPr>
+        <p:spPr>
+          <a:xfrm>
+            <a:off x="5221940" y="1907241"/>
+            <a:ext cx="600636" cy="452718"/>
+          </a:xfrm>
+          <a:prstGeom prst="rect">
+            <a:avLst/>
+          </a:prstGeom>
+        </p:spPr>
+        <p:style>
+          <a:lnRef idx="2">
+            <a:schemeClr val="dk1">
+              <a:shade val="50000"/>
+            </a:schemeClr>
+          </a:lnRef>
+          <a:fillRef idx="1">
+            <a:schemeClr val="dk1"/>
+          </a:fillRef>
+          <a:effectRef idx="0">
+            <a:schemeClr val="dk1"/>
+          </a:effectRef>
+          <a:fontRef idx="minor">
+            <a:schemeClr val="lt1"/>
+          </a:fontRef>
+        </p:style>
+        <p:txBody>
+          <a:bodyPr rtlCol="0" anchor="ctr"/>
+          <a:lstStyle/>
+          <a:p>
+            <a:pPr algn="ctr"/>
+            <a:endParaRPr lang="fr-FR"/>
+          </a:p>
+        </p:txBody>
+      </p:sp>
+      <p:sp>
+        <p:nvSpPr>
+          <p:cNvPr id="15" name="TextBox 14">
+            <a:extLst>
+              <a:ext uri="{FF2B5EF4-FFF2-40B4-BE49-F238E27FC236}">
+                <a16:creationId xmlns:a16="http://schemas.microsoft.com/office/drawing/2014/main" id="{A8DA6E30-B8B9-4334-8635-3A3FCCFDF15B}"/>
+              </a:ext>
+            </a:extLst>
+          </p:cNvPr>
+          <p:cNvSpPr txBox="1"/>
+          <p:nvPr/>
+        </p:nvSpPr>
+        <p:spPr>
+          <a:xfrm>
+            <a:off x="5800164" y="1961492"/>
+            <a:ext cx="1463862" cy="369332"/>
+          </a:xfrm>
+          <a:prstGeom prst="rect">
+            <a:avLst/>
+          </a:prstGeom>
+          <a:noFill/>
+        </p:spPr>
+        <p:txBody>
+          <a:bodyPr wrap="none" rtlCol="0">
+            <a:spAutoFit/>
+          </a:bodyPr>
+          <a:lstStyle/>
+          <a:p>
+            <a:r>
+              <a:rPr lang="fr-FR" dirty="0"/>
+              <a:t>Gestion Stock</a:t>
+            </a:r>
+          </a:p>
+        </p:txBody>
+      </p:sp>
+      <p:sp>
+        <p:nvSpPr>
+          <p:cNvPr id="18" name="Rectangle 17">
+            <a:extLst>
+              <a:ext uri="{FF2B5EF4-FFF2-40B4-BE49-F238E27FC236}">
+                <a16:creationId xmlns:a16="http://schemas.microsoft.com/office/drawing/2014/main" id="{859CC7B6-2ED1-46EA-AD06-7EAB29DB0325}"/>
+              </a:ext>
+            </a:extLst>
+          </p:cNvPr>
+          <p:cNvSpPr/>
+          <p:nvPr/>
+        </p:nvSpPr>
+        <p:spPr>
+          <a:xfrm>
+            <a:off x="5495365" y="3334871"/>
+            <a:ext cx="2299447" cy="1698811"/>
+          </a:xfrm>
+          <a:prstGeom prst="rect">
+            <a:avLst/>
+          </a:prstGeom>
+        </p:spPr>
+        <p:style>
+          <a:lnRef idx="2">
+            <a:schemeClr val="accent1">
+              <a:shade val="50000"/>
+            </a:schemeClr>
+          </a:lnRef>
+          <a:fillRef idx="1">
+            <a:schemeClr val="accent1"/>
+          </a:fillRef>
+          <a:effectRef idx="0">
+            <a:schemeClr val="accent1"/>
+          </a:effectRef>
+          <a:fontRef idx="minor">
+            <a:schemeClr val="lt1"/>
+          </a:fontRef>
+        </p:style>
+        <p:txBody>
+          <a:bodyPr rtlCol="0" anchor="ctr"/>
+          <a:lstStyle/>
+          <a:p>
+            <a:pPr algn="ctr"/>
+            <a:endParaRPr lang="fr-FR"/>
+          </a:p>
+        </p:txBody>
+      </p:sp>
+      <p:sp>
+        <p:nvSpPr>
+          <p:cNvPr id="19" name="Rectangle 18">
+            <a:extLst>
+              <a:ext uri="{FF2B5EF4-FFF2-40B4-BE49-F238E27FC236}">
+                <a16:creationId xmlns:a16="http://schemas.microsoft.com/office/drawing/2014/main" id="{7405438C-25B0-49F9-881A-4A60C2379B86}"/>
+              </a:ext>
+            </a:extLst>
+          </p:cNvPr>
+          <p:cNvSpPr/>
+          <p:nvPr/>
+        </p:nvSpPr>
+        <p:spPr>
+          <a:xfrm>
+            <a:off x="5495365" y="2895600"/>
+            <a:ext cx="510988" cy="331695"/>
+          </a:xfrm>
+          <a:prstGeom prst="rect">
+            <a:avLst/>
+          </a:prstGeom>
+        </p:spPr>
+        <p:style>
+          <a:lnRef idx="2">
+            <a:schemeClr val="accent1">
+              <a:shade val="50000"/>
+            </a:schemeClr>
+          </a:lnRef>
+          <a:fillRef idx="1">
+            <a:schemeClr val="accent1"/>
+          </a:fillRef>
+          <a:effectRef idx="0">
+            <a:schemeClr val="accent1"/>
+          </a:effectRef>
+          <a:fontRef idx="minor">
+            <a:schemeClr val="lt1"/>
+          </a:fontRef>
+        </p:style>
+        <p:txBody>
+          <a:bodyPr rtlCol="0" anchor="ctr"/>
+          <a:lstStyle/>
+          <a:p>
+            <a:pPr algn="ctr"/>
+            <a:r>
+              <a:rPr lang="fr-FR" dirty="0"/>
+              <a:t>+</a:t>
+            </a:r>
+          </a:p>
+        </p:txBody>
+      </p:sp>
+      <p:sp>
+        <p:nvSpPr>
+          <p:cNvPr id="20" name="Rectangle 19">
+            <a:extLst>
+              <a:ext uri="{FF2B5EF4-FFF2-40B4-BE49-F238E27FC236}">
+                <a16:creationId xmlns:a16="http://schemas.microsoft.com/office/drawing/2014/main" id="{9859DB5A-D47D-4A5D-8917-86FAC2066601}"/>
+              </a:ext>
+            </a:extLst>
+          </p:cNvPr>
+          <p:cNvSpPr/>
+          <p:nvPr/>
+        </p:nvSpPr>
+        <p:spPr>
+          <a:xfrm>
+            <a:off x="6136341" y="2895600"/>
+            <a:ext cx="555812" cy="331695"/>
+          </a:xfrm>
+          <a:prstGeom prst="rect">
+            <a:avLst/>
+          </a:prstGeom>
+        </p:spPr>
+        <p:style>
+          <a:lnRef idx="2">
+            <a:schemeClr val="accent1">
+              <a:shade val="50000"/>
+            </a:schemeClr>
+          </a:lnRef>
+          <a:fillRef idx="1">
+            <a:schemeClr val="accent1"/>
+          </a:fillRef>
+          <a:effectRef idx="0">
+            <a:schemeClr val="accent1"/>
+          </a:effectRef>
+          <a:fontRef idx="minor">
+            <a:schemeClr val="lt1"/>
+          </a:fontRef>
+        </p:style>
+        <p:txBody>
+          <a:bodyPr rtlCol="0" anchor="ctr"/>
+          <a:lstStyle/>
+          <a:p>
+            <a:pPr algn="ctr"/>
+            <a:r>
+              <a:rPr lang="fr-FR" dirty="0"/>
+              <a:t>S</a:t>
+            </a:r>
+          </a:p>
+        </p:txBody>
+      </p:sp>
+      <p:sp>
+        <p:nvSpPr>
+          <p:cNvPr id="21" name="TextBox 20">
+            <a:extLst>
+              <a:ext uri="{FF2B5EF4-FFF2-40B4-BE49-F238E27FC236}">
+                <a16:creationId xmlns:a16="http://schemas.microsoft.com/office/drawing/2014/main" id="{7B144748-5313-483E-9FB0-26C8BBC891F9}"/>
+              </a:ext>
+            </a:extLst>
+          </p:cNvPr>
+          <p:cNvSpPr txBox="1"/>
+          <p:nvPr/>
+        </p:nvSpPr>
+        <p:spPr>
+          <a:xfrm>
+            <a:off x="5784243" y="2517303"/>
+            <a:ext cx="1721690" cy="369332"/>
+          </a:xfrm>
+          <a:prstGeom prst="rect">
+            <a:avLst/>
+          </a:prstGeom>
+          <a:noFill/>
+        </p:spPr>
+        <p:txBody>
+          <a:bodyPr wrap="none" rtlCol="0">
+            <a:spAutoFit/>
+          </a:bodyPr>
+          <a:lstStyle/>
+          <a:p>
+            <a:r>
+              <a:rPr lang="fr-FR" dirty="0"/>
+              <a:t>Liste des articles</a:t>
+            </a:r>
+          </a:p>
+        </p:txBody>
+      </p:sp>
+      <p:sp>
+        <p:nvSpPr>
+          <p:cNvPr id="22" name="Rectangle 21">
+            <a:extLst>
+              <a:ext uri="{FF2B5EF4-FFF2-40B4-BE49-F238E27FC236}">
+                <a16:creationId xmlns:a16="http://schemas.microsoft.com/office/drawing/2014/main" id="{32CB6109-83BE-460C-BF08-2464D8835DEB}"/>
+              </a:ext>
+            </a:extLst>
+          </p:cNvPr>
+          <p:cNvSpPr/>
+          <p:nvPr/>
+        </p:nvSpPr>
+        <p:spPr>
+          <a:xfrm>
+            <a:off x="8588188" y="1806388"/>
+            <a:ext cx="3133164" cy="4204447"/>
+          </a:xfrm>
+          <a:prstGeom prst="rect">
+            <a:avLst/>
+          </a:prstGeom>
+        </p:spPr>
+        <p:style>
+          <a:lnRef idx="2">
+            <a:schemeClr val="accent1"/>
+          </a:lnRef>
+          <a:fillRef idx="1">
+            <a:schemeClr val="lt1"/>
+          </a:fillRef>
+          <a:effectRef idx="0">
+            <a:schemeClr val="accent1"/>
+          </a:effectRef>
+          <a:fontRef idx="minor">
+            <a:schemeClr val="dk1"/>
+          </a:fontRef>
+        </p:style>
+        <p:txBody>
+          <a:bodyPr rtlCol="0" anchor="ctr"/>
+          <a:lstStyle/>
+          <a:p>
+            <a:pPr algn="ctr"/>
+            <a:endParaRPr lang="fr-FR"/>
+          </a:p>
+        </p:txBody>
+      </p:sp>
+      <p:sp>
+        <p:nvSpPr>
+          <p:cNvPr id="23" name="Rectangle 22">
+            <a:extLst>
+              <a:ext uri="{FF2B5EF4-FFF2-40B4-BE49-F238E27FC236}">
+                <a16:creationId xmlns:a16="http://schemas.microsoft.com/office/drawing/2014/main" id="{259848B2-43F3-48A5-AF47-35790390FF77}"/>
+              </a:ext>
+            </a:extLst>
+          </p:cNvPr>
+          <p:cNvSpPr/>
+          <p:nvPr/>
+        </p:nvSpPr>
+        <p:spPr>
+          <a:xfrm>
+            <a:off x="8588188" y="1806388"/>
+            <a:ext cx="3133164" cy="632012"/>
+          </a:xfrm>
+          <a:prstGeom prst="rect">
+            <a:avLst/>
+          </a:prstGeom>
+        </p:spPr>
+        <p:style>
+          <a:lnRef idx="2">
+            <a:schemeClr val="accent3">
+              <a:shade val="50000"/>
+            </a:schemeClr>
+          </a:lnRef>
+          <a:fillRef idx="1">
+            <a:schemeClr val="accent3"/>
+          </a:fillRef>
+          <a:effectRef idx="0">
+            <a:schemeClr val="accent3"/>
+          </a:effectRef>
+          <a:fontRef idx="minor">
+            <a:schemeClr val="lt1"/>
+          </a:fontRef>
+        </p:style>
+        <p:txBody>
+          <a:bodyPr rtlCol="0" anchor="ctr"/>
+          <a:lstStyle/>
+          <a:p>
+            <a:pPr algn="ctr"/>
+            <a:endParaRPr lang="fr-FR"/>
+          </a:p>
+        </p:txBody>
+      </p:sp>
+      <p:sp>
+        <p:nvSpPr>
+          <p:cNvPr id="24" name="Rectangle 23">
+            <a:extLst>
+              <a:ext uri="{FF2B5EF4-FFF2-40B4-BE49-F238E27FC236}">
+                <a16:creationId xmlns:a16="http://schemas.microsoft.com/office/drawing/2014/main" id="{CB934AB2-E786-40ED-9AEB-016341768D98}"/>
+              </a:ext>
+            </a:extLst>
+          </p:cNvPr>
+          <p:cNvSpPr/>
+          <p:nvPr/>
+        </p:nvSpPr>
+        <p:spPr>
+          <a:xfrm>
+            <a:off x="8588188" y="5378823"/>
+            <a:ext cx="3133164" cy="632012"/>
+          </a:xfrm>
+          <a:prstGeom prst="rect">
+            <a:avLst/>
+          </a:prstGeom>
+        </p:spPr>
+        <p:style>
+          <a:lnRef idx="2">
+            <a:schemeClr val="accent3">
+              <a:shade val="50000"/>
+            </a:schemeClr>
+          </a:lnRef>
+          <a:fillRef idx="1">
+            <a:schemeClr val="accent3"/>
+          </a:fillRef>
+          <a:effectRef idx="0">
+            <a:schemeClr val="accent3"/>
+          </a:effectRef>
+          <a:fontRef idx="minor">
+            <a:schemeClr val="lt1"/>
+          </a:fontRef>
+        </p:style>
+        <p:txBody>
+          <a:bodyPr rtlCol="0" anchor="ctr"/>
+          <a:lstStyle/>
+          <a:p>
+            <a:pPr algn="ctr"/>
+            <a:r>
+              <a:rPr lang="en-US" dirty="0"/>
+              <a:t>Mentions L</a:t>
+            </a:r>
+            <a:r>
+              <a:rPr lang="fr-FR" dirty="0"/>
+              <a:t>é</a:t>
+            </a:r>
+            <a:r>
+              <a:rPr lang="en-US" dirty="0"/>
+              <a:t>gales</a:t>
+            </a:r>
+            <a:endParaRPr lang="fr-FR" dirty="0"/>
+          </a:p>
+        </p:txBody>
+      </p:sp>
+      <p:sp>
+        <p:nvSpPr>
+          <p:cNvPr id="25" name="Rectangle 24">
+            <a:extLst>
+              <a:ext uri="{FF2B5EF4-FFF2-40B4-BE49-F238E27FC236}">
+                <a16:creationId xmlns:a16="http://schemas.microsoft.com/office/drawing/2014/main" id="{E49EB369-EC84-41B2-8ECA-1D70EC98E12E}"/>
+              </a:ext>
+            </a:extLst>
+          </p:cNvPr>
+          <p:cNvSpPr/>
+          <p:nvPr/>
+        </p:nvSpPr>
+        <p:spPr>
+          <a:xfrm>
+            <a:off x="8740587" y="1907241"/>
+            <a:ext cx="600636" cy="452718"/>
+          </a:xfrm>
+          <a:prstGeom prst="rect">
+            <a:avLst/>
+          </a:prstGeom>
+        </p:spPr>
+        <p:style>
+          <a:lnRef idx="2">
+            <a:schemeClr val="dk1">
+              <a:shade val="50000"/>
+            </a:schemeClr>
+          </a:lnRef>
+          <a:fillRef idx="1">
+            <a:schemeClr val="dk1"/>
+          </a:fillRef>
+          <a:effectRef idx="0">
+            <a:schemeClr val="dk1"/>
+          </a:effectRef>
+          <a:fontRef idx="minor">
+            <a:schemeClr val="lt1"/>
+          </a:fontRef>
+        </p:style>
+        <p:txBody>
+          <a:bodyPr rtlCol="0" anchor="ctr"/>
+          <a:lstStyle/>
+          <a:p>
+            <a:pPr algn="ctr"/>
+            <a:endParaRPr lang="fr-FR"/>
+          </a:p>
+        </p:txBody>
+      </p:sp>
+      <p:sp>
+        <p:nvSpPr>
+          <p:cNvPr id="26" name="TextBox 25">
+            <a:extLst>
+              <a:ext uri="{FF2B5EF4-FFF2-40B4-BE49-F238E27FC236}">
+                <a16:creationId xmlns:a16="http://schemas.microsoft.com/office/drawing/2014/main" id="{BF447087-D11E-46F9-A2CD-3CBF82786B7B}"/>
+              </a:ext>
+            </a:extLst>
+          </p:cNvPr>
+          <p:cNvSpPr txBox="1"/>
+          <p:nvPr/>
+        </p:nvSpPr>
+        <p:spPr>
+          <a:xfrm>
+            <a:off x="9318811" y="1961492"/>
+            <a:ext cx="1463862" cy="369332"/>
+          </a:xfrm>
+          <a:prstGeom prst="rect">
+            <a:avLst/>
+          </a:prstGeom>
+          <a:noFill/>
+        </p:spPr>
+        <p:txBody>
+          <a:bodyPr wrap="none" rtlCol="0">
+            <a:spAutoFit/>
+          </a:bodyPr>
+          <a:lstStyle/>
+          <a:p>
+            <a:r>
+              <a:rPr lang="fr-FR" dirty="0"/>
+              <a:t>Gestion Stock</a:t>
+            </a:r>
+          </a:p>
+        </p:txBody>
+      </p:sp>
+      <p:sp>
+        <p:nvSpPr>
+          <p:cNvPr id="27" name="Rectangle 26">
+            <a:extLst>
+              <a:ext uri="{FF2B5EF4-FFF2-40B4-BE49-F238E27FC236}">
+                <a16:creationId xmlns:a16="http://schemas.microsoft.com/office/drawing/2014/main" id="{0573D4D3-A93C-418C-A387-C1F45FA8A386}"/>
+              </a:ext>
+            </a:extLst>
+          </p:cNvPr>
+          <p:cNvSpPr/>
+          <p:nvPr/>
+        </p:nvSpPr>
+        <p:spPr>
+          <a:xfrm>
+            <a:off x="9014012" y="3334871"/>
+            <a:ext cx="2299447" cy="1698811"/>
+          </a:xfrm>
+          <a:prstGeom prst="rect">
+            <a:avLst/>
+          </a:prstGeom>
+        </p:spPr>
+        <p:style>
+          <a:lnRef idx="2">
+            <a:schemeClr val="accent1">
+              <a:shade val="50000"/>
+            </a:schemeClr>
+          </a:lnRef>
+          <a:fillRef idx="1">
+            <a:schemeClr val="accent1"/>
+          </a:fillRef>
+          <a:effectRef idx="0">
+            <a:schemeClr val="accent1"/>
+          </a:effectRef>
+          <a:fontRef idx="minor">
+            <a:schemeClr val="lt1"/>
+          </a:fontRef>
+        </p:style>
+        <p:txBody>
+          <a:bodyPr rtlCol="0" anchor="ctr"/>
+          <a:lstStyle/>
+          <a:p>
+            <a:pPr algn="ctr"/>
+            <a:endParaRPr lang="fr-FR"/>
+          </a:p>
+        </p:txBody>
+      </p:sp>
+      <p:sp>
+        <p:nvSpPr>
+          <p:cNvPr id="30" name="TextBox 29">
+            <a:extLst>
+              <a:ext uri="{FF2B5EF4-FFF2-40B4-BE49-F238E27FC236}">
+                <a16:creationId xmlns:a16="http://schemas.microsoft.com/office/drawing/2014/main" id="{31E54130-AE77-40EE-BB93-77F7EEE5DAD9}"/>
+              </a:ext>
+            </a:extLst>
+          </p:cNvPr>
+          <p:cNvSpPr txBox="1"/>
+          <p:nvPr/>
+        </p:nvSpPr>
+        <p:spPr>
+          <a:xfrm>
+            <a:off x="9302890" y="2517303"/>
+            <a:ext cx="1803442" cy="369332"/>
+          </a:xfrm>
+          <a:prstGeom prst="rect">
+            <a:avLst/>
+          </a:prstGeom>
+          <a:noFill/>
+        </p:spPr>
+        <p:txBody>
+          <a:bodyPr wrap="none" rtlCol="0">
+            <a:spAutoFit/>
+          </a:bodyPr>
+          <a:lstStyle/>
+          <a:p>
+            <a:r>
+              <a:rPr lang="fr-FR" dirty="0"/>
+              <a:t>Ajout d’un article</a:t>
+            </a:r>
+          </a:p>
+        </p:txBody>
+      </p:sp>
+    </p:spTree>
+    <p:extLst>
+      <p:ext uri="{BB962C8B-B14F-4D97-AF65-F5344CB8AC3E}">
+        <p14:creationId xmlns:p14="http://schemas.microsoft.com/office/powerpoint/2010/main" val="756717608"/>
+      </p:ext>
+    </p:extLst>
+  </p:cSld>
+  <p:clrMapOvr>
+    <a:masterClrMapping/>
+  </p:clrMapOvr>
+</p:sld>
+</file>
+
+<file path=ppt/slides/slide18.xml><?xml version="1.0" encoding="utf-8"?>
+<p:sld xmlns:a="http://schemas.openxmlformats.org/drawingml/2006/main" xmlns:r="http://schemas.openxmlformats.org/officeDocument/2006/relationships" xmlns:p="http://schemas.openxmlformats.org/presentationml/2006/main">
+  <p:cSld>
+    <p:spTree>
+      <p:nvGrpSpPr>
+        <p:cNvPr id="1" name=""/>
+        <p:cNvGrpSpPr/>
+        <p:nvPr/>
+      </p:nvGrpSpPr>
+      <p:grpSpPr>
+        <a:xfrm>
+          <a:off x="0" y="0"/>
+          <a:ext cx="0" cy="0"/>
+          <a:chOff x="0" y="0"/>
+          <a:chExt cx="0" cy="0"/>
+        </a:xfrm>
+      </p:grpSpPr>
+      <p:sp>
+        <p:nvSpPr>
+          <p:cNvPr id="2" name="Title 1">
+            <a:extLst>
+              <a:ext uri="{FF2B5EF4-FFF2-40B4-BE49-F238E27FC236}">
+                <a16:creationId xmlns:a16="http://schemas.microsoft.com/office/drawing/2014/main" id="{3BD0A353-B3C6-4827-A80F-8A892FA0BF36}"/>
+              </a:ext>
+            </a:extLst>
+          </p:cNvPr>
+          <p:cNvSpPr>
+            <a:spLocks noGrp="1"/>
+          </p:cNvSpPr>
+          <p:nvPr>
+            <p:ph type="title"/>
+          </p:nvPr>
+        </p:nvSpPr>
+        <p:spPr/>
+        <p:txBody>
+          <a:bodyPr/>
+          <a:lstStyle/>
+          <a:p>
+            <a:r>
+              <a:rPr lang="fr-FR" dirty="0"/>
+              <a:t>Framework </a:t>
+            </a:r>
+            <a:r>
+              <a:rPr lang="fr-FR" dirty="0" err="1"/>
+              <a:t>FrontEnd</a:t>
+            </a:r>
+            <a:endParaRPr lang="fr-FR" dirty="0"/>
+          </a:p>
+        </p:txBody>
+      </p:sp>
+      <p:cxnSp>
+        <p:nvCxnSpPr>
+          <p:cNvPr id="5" name="Straight Arrow Connector 4">
+            <a:extLst>
+              <a:ext uri="{FF2B5EF4-FFF2-40B4-BE49-F238E27FC236}">
+                <a16:creationId xmlns:a16="http://schemas.microsoft.com/office/drawing/2014/main" id="{D56B2DD9-0E5D-4833-945A-D6A274A42846}"/>
+              </a:ext>
+            </a:extLst>
+          </p:cNvPr>
+          <p:cNvCxnSpPr/>
+          <p:nvPr/>
+        </p:nvCxnSpPr>
+        <p:spPr>
+          <a:xfrm>
+            <a:off x="170329" y="2900082"/>
+            <a:ext cx="11851342" cy="0"/>
+          </a:xfrm>
+          <a:prstGeom prst="straightConnector1">
+            <a:avLst/>
+          </a:prstGeom>
+          <a:ln w="76200">
+            <a:tailEnd type="triangle"/>
+          </a:ln>
+        </p:spPr>
+        <p:style>
+          <a:lnRef idx="1">
+            <a:schemeClr val="accent1"/>
+          </a:lnRef>
+          <a:fillRef idx="0">
+            <a:schemeClr val="accent1"/>
+          </a:fillRef>
+          <a:effectRef idx="0">
+            <a:schemeClr val="accent1"/>
+          </a:effectRef>
+          <a:fontRef idx="minor">
+            <a:schemeClr val="tx1"/>
+          </a:fontRef>
+        </p:style>
+      </p:cxnSp>
+      <p:cxnSp>
+        <p:nvCxnSpPr>
+          <p:cNvPr id="7" name="Straight Connector 6">
+            <a:extLst>
+              <a:ext uri="{FF2B5EF4-FFF2-40B4-BE49-F238E27FC236}">
+                <a16:creationId xmlns:a16="http://schemas.microsoft.com/office/drawing/2014/main" id="{2ADFA72C-BF57-4F06-8150-665C838002A8}"/>
+              </a:ext>
+            </a:extLst>
+          </p:cNvPr>
+          <p:cNvCxnSpPr/>
+          <p:nvPr/>
+        </p:nvCxnSpPr>
+        <p:spPr>
+          <a:xfrm>
+            <a:off x="367553" y="2528047"/>
+            <a:ext cx="0" cy="775447"/>
+          </a:xfrm>
+          <a:prstGeom prst="line">
+            <a:avLst/>
+          </a:prstGeom>
+          <a:ln w="76200"/>
+        </p:spPr>
+        <p:style>
+          <a:lnRef idx="1">
+            <a:schemeClr val="accent1"/>
+          </a:lnRef>
+          <a:fillRef idx="0">
+            <a:schemeClr val="accent1"/>
+          </a:fillRef>
+          <a:effectRef idx="0">
+            <a:schemeClr val="accent1"/>
+          </a:effectRef>
+          <a:fontRef idx="minor">
+            <a:schemeClr val="tx1"/>
+          </a:fontRef>
+        </p:style>
+      </p:cxnSp>
+      <p:sp>
+        <p:nvSpPr>
+          <p:cNvPr id="8" name="TextBox 7">
+            <a:extLst>
+              <a:ext uri="{FF2B5EF4-FFF2-40B4-BE49-F238E27FC236}">
+                <a16:creationId xmlns:a16="http://schemas.microsoft.com/office/drawing/2014/main" id="{A763D24F-3A2A-4846-92CB-C421454244E3}"/>
+              </a:ext>
+            </a:extLst>
+          </p:cNvPr>
+          <p:cNvSpPr txBox="1"/>
+          <p:nvPr/>
+        </p:nvSpPr>
+        <p:spPr>
+          <a:xfrm>
+            <a:off x="85165" y="3397623"/>
+            <a:ext cx="1094915" cy="646331"/>
+          </a:xfrm>
+          <a:prstGeom prst="rect">
+            <a:avLst/>
+          </a:prstGeom>
+          <a:noFill/>
+        </p:spPr>
+        <p:txBody>
+          <a:bodyPr wrap="none" rtlCol="0">
+            <a:spAutoFit/>
+          </a:bodyPr>
+          <a:lstStyle/>
+          <a:p>
+            <a:r>
+              <a:rPr lang="fr-FR" dirty="0"/>
+              <a:t>Javascript</a:t>
+            </a:r>
+          </a:p>
+          <a:p>
+            <a:r>
+              <a:rPr lang="fr-FR" dirty="0"/>
+              <a:t>1995</a:t>
+            </a:r>
+          </a:p>
+        </p:txBody>
+      </p:sp>
+      <p:cxnSp>
+        <p:nvCxnSpPr>
+          <p:cNvPr id="10" name="Straight Connector 9">
+            <a:extLst>
+              <a:ext uri="{FF2B5EF4-FFF2-40B4-BE49-F238E27FC236}">
+                <a16:creationId xmlns:a16="http://schemas.microsoft.com/office/drawing/2014/main" id="{10C7BDF8-C833-4A83-B5C7-4E26A18FEC26}"/>
+              </a:ext>
+            </a:extLst>
+          </p:cNvPr>
+          <p:cNvCxnSpPr/>
+          <p:nvPr/>
+        </p:nvCxnSpPr>
+        <p:spPr>
+          <a:xfrm>
+            <a:off x="2519082" y="2496671"/>
+            <a:ext cx="0" cy="806823"/>
+          </a:xfrm>
+          <a:prstGeom prst="line">
+            <a:avLst/>
+          </a:prstGeom>
+          <a:ln w="76200"/>
+        </p:spPr>
+        <p:style>
+          <a:lnRef idx="1">
+            <a:schemeClr val="accent1"/>
+          </a:lnRef>
+          <a:fillRef idx="0">
+            <a:schemeClr val="accent1"/>
+          </a:fillRef>
+          <a:effectRef idx="0">
+            <a:schemeClr val="accent1"/>
+          </a:effectRef>
+          <a:fontRef idx="minor">
+            <a:schemeClr val="tx1"/>
+          </a:fontRef>
+        </p:style>
+      </p:cxnSp>
+      <p:sp>
+        <p:nvSpPr>
+          <p:cNvPr id="11" name="TextBox 10">
+            <a:extLst>
+              <a:ext uri="{FF2B5EF4-FFF2-40B4-BE49-F238E27FC236}">
+                <a16:creationId xmlns:a16="http://schemas.microsoft.com/office/drawing/2014/main" id="{5C3E9189-3E35-4ACA-B694-AD11EF29394F}"/>
+              </a:ext>
+            </a:extLst>
+          </p:cNvPr>
+          <p:cNvSpPr txBox="1"/>
+          <p:nvPr/>
+        </p:nvSpPr>
+        <p:spPr>
+          <a:xfrm>
+            <a:off x="2160494" y="3429000"/>
+            <a:ext cx="783741" cy="646331"/>
+          </a:xfrm>
+          <a:prstGeom prst="rect">
+            <a:avLst/>
+          </a:prstGeom>
+          <a:noFill/>
+        </p:spPr>
+        <p:txBody>
+          <a:bodyPr wrap="none" rtlCol="0">
+            <a:spAutoFit/>
+          </a:bodyPr>
+          <a:lstStyle/>
+          <a:p>
+            <a:r>
+              <a:rPr lang="fr-FR" dirty="0" err="1"/>
+              <a:t>jquery</a:t>
+            </a:r>
+            <a:endParaRPr lang="fr-FR" dirty="0"/>
+          </a:p>
+          <a:p>
+            <a:r>
+              <a:rPr lang="fr-FR" dirty="0"/>
+              <a:t>2006</a:t>
+            </a:r>
+          </a:p>
+        </p:txBody>
+      </p:sp>
+      <p:cxnSp>
+        <p:nvCxnSpPr>
+          <p:cNvPr id="13" name="Straight Connector 12">
+            <a:extLst>
+              <a:ext uri="{FF2B5EF4-FFF2-40B4-BE49-F238E27FC236}">
+                <a16:creationId xmlns:a16="http://schemas.microsoft.com/office/drawing/2014/main" id="{1CF5ABBB-8FB7-4000-B52E-9F94F227DD2D}"/>
+              </a:ext>
+            </a:extLst>
+          </p:cNvPr>
+          <p:cNvCxnSpPr/>
+          <p:nvPr/>
+        </p:nvCxnSpPr>
+        <p:spPr>
+          <a:xfrm>
+            <a:off x="4424082" y="2496671"/>
+            <a:ext cx="0" cy="806823"/>
+          </a:xfrm>
+          <a:prstGeom prst="line">
+            <a:avLst/>
+          </a:prstGeom>
+          <a:ln w="76200"/>
+        </p:spPr>
+        <p:style>
+          <a:lnRef idx="1">
+            <a:schemeClr val="accent1"/>
+          </a:lnRef>
+          <a:fillRef idx="0">
+            <a:schemeClr val="accent1"/>
+          </a:fillRef>
+          <a:effectRef idx="0">
+            <a:schemeClr val="accent1"/>
+          </a:effectRef>
+          <a:fontRef idx="minor">
+            <a:schemeClr val="tx1"/>
+          </a:fontRef>
+        </p:style>
+      </p:cxnSp>
+      <p:sp>
+        <p:nvSpPr>
+          <p:cNvPr id="14" name="TextBox 13">
+            <a:extLst>
+              <a:ext uri="{FF2B5EF4-FFF2-40B4-BE49-F238E27FC236}">
+                <a16:creationId xmlns:a16="http://schemas.microsoft.com/office/drawing/2014/main" id="{AC74AACF-D58F-40A0-90B7-7FD2939B827B}"/>
+              </a:ext>
+            </a:extLst>
+          </p:cNvPr>
+          <p:cNvSpPr txBox="1"/>
+          <p:nvPr/>
+        </p:nvSpPr>
+        <p:spPr>
+          <a:xfrm>
+            <a:off x="3971365" y="3397623"/>
+            <a:ext cx="1134035" cy="1200329"/>
+          </a:xfrm>
+          <a:prstGeom prst="rect">
+            <a:avLst/>
+          </a:prstGeom>
+          <a:noFill/>
+        </p:spPr>
+        <p:txBody>
+          <a:bodyPr wrap="square" rtlCol="0">
+            <a:spAutoFit/>
+          </a:bodyPr>
+          <a:lstStyle/>
+          <a:p>
+            <a:r>
+              <a:rPr lang="fr-FR" dirty="0"/>
+              <a:t>AngularJS</a:t>
+            </a:r>
+          </a:p>
+          <a:p>
+            <a:r>
+              <a:rPr lang="fr-FR" dirty="0"/>
+              <a:t>v1</a:t>
+            </a:r>
+          </a:p>
+          <a:p>
+            <a:r>
+              <a:rPr lang="fr-FR" dirty="0"/>
+              <a:t>2011</a:t>
+            </a:r>
+          </a:p>
+          <a:p>
+            <a:r>
+              <a:rPr lang="fr-FR" dirty="0"/>
+              <a:t>$q</a:t>
+            </a:r>
+          </a:p>
+        </p:txBody>
+      </p:sp>
+      <p:cxnSp>
+        <p:nvCxnSpPr>
+          <p:cNvPr id="16" name="Straight Connector 15">
+            <a:extLst>
+              <a:ext uri="{FF2B5EF4-FFF2-40B4-BE49-F238E27FC236}">
+                <a16:creationId xmlns:a16="http://schemas.microsoft.com/office/drawing/2014/main" id="{1FA5CCFA-7F3A-4047-B0A1-CC08BE06757E}"/>
+              </a:ext>
+            </a:extLst>
+          </p:cNvPr>
+          <p:cNvCxnSpPr/>
+          <p:nvPr/>
+        </p:nvCxnSpPr>
+        <p:spPr>
+          <a:xfrm>
+            <a:off x="2850776" y="2106706"/>
+            <a:ext cx="0" cy="2326341"/>
+          </a:xfrm>
+          <a:prstGeom prst="line">
+            <a:avLst/>
+          </a:prstGeom>
+          <a:ln w="76200"/>
+        </p:spPr>
+        <p:style>
+          <a:lnRef idx="1">
+            <a:schemeClr val="accent1"/>
+          </a:lnRef>
+          <a:fillRef idx="0">
+            <a:schemeClr val="accent1"/>
+          </a:fillRef>
+          <a:effectRef idx="0">
+            <a:schemeClr val="accent1"/>
+          </a:effectRef>
+          <a:fontRef idx="minor">
+            <a:schemeClr val="tx1"/>
+          </a:fontRef>
+        </p:style>
+      </p:cxnSp>
+      <p:sp>
+        <p:nvSpPr>
+          <p:cNvPr id="17" name="TextBox 16">
+            <a:extLst>
+              <a:ext uri="{FF2B5EF4-FFF2-40B4-BE49-F238E27FC236}">
+                <a16:creationId xmlns:a16="http://schemas.microsoft.com/office/drawing/2014/main" id="{9010451B-291E-481F-B723-A11B5CC85EE2}"/>
+              </a:ext>
+            </a:extLst>
+          </p:cNvPr>
+          <p:cNvSpPr txBox="1"/>
+          <p:nvPr/>
+        </p:nvSpPr>
+        <p:spPr>
+          <a:xfrm>
+            <a:off x="2524051" y="4525899"/>
+            <a:ext cx="653449" cy="646331"/>
+          </a:xfrm>
+          <a:prstGeom prst="rect">
+            <a:avLst/>
+          </a:prstGeom>
+          <a:noFill/>
+        </p:spPr>
+        <p:txBody>
+          <a:bodyPr wrap="none" rtlCol="0">
+            <a:spAutoFit/>
+          </a:bodyPr>
+          <a:lstStyle/>
+          <a:p>
+            <a:r>
+              <a:rPr lang="fr-FR" dirty="0" err="1"/>
+              <a:t>ExtJS</a:t>
+            </a:r>
+            <a:endParaRPr lang="fr-FR" dirty="0"/>
+          </a:p>
+          <a:p>
+            <a:r>
+              <a:rPr lang="en-US" dirty="0"/>
+              <a:t>2007</a:t>
+            </a:r>
+            <a:endParaRPr lang="fr-FR" dirty="0"/>
+          </a:p>
+        </p:txBody>
+      </p:sp>
+      <p:cxnSp>
+        <p:nvCxnSpPr>
+          <p:cNvPr id="19" name="Straight Connector 18">
+            <a:extLst>
+              <a:ext uri="{FF2B5EF4-FFF2-40B4-BE49-F238E27FC236}">
+                <a16:creationId xmlns:a16="http://schemas.microsoft.com/office/drawing/2014/main" id="{42314308-117D-41A0-ABEC-A71BAB834E28}"/>
+              </a:ext>
+            </a:extLst>
+          </p:cNvPr>
+          <p:cNvCxnSpPr/>
+          <p:nvPr/>
+        </p:nvCxnSpPr>
+        <p:spPr>
+          <a:xfrm>
+            <a:off x="5764306" y="2510117"/>
+            <a:ext cx="0" cy="811306"/>
+          </a:xfrm>
+          <a:prstGeom prst="line">
+            <a:avLst/>
+          </a:prstGeom>
+          <a:ln w="76200"/>
+        </p:spPr>
+        <p:style>
+          <a:lnRef idx="1">
+            <a:schemeClr val="accent1"/>
+          </a:lnRef>
+          <a:fillRef idx="0">
+            <a:schemeClr val="accent1"/>
+          </a:fillRef>
+          <a:effectRef idx="0">
+            <a:schemeClr val="accent1"/>
+          </a:effectRef>
+          <a:fontRef idx="minor">
+            <a:schemeClr val="tx1"/>
+          </a:fontRef>
+        </p:style>
+      </p:cxnSp>
+      <p:sp>
+        <p:nvSpPr>
+          <p:cNvPr id="20" name="TextBox 19">
+            <a:extLst>
+              <a:ext uri="{FF2B5EF4-FFF2-40B4-BE49-F238E27FC236}">
+                <a16:creationId xmlns:a16="http://schemas.microsoft.com/office/drawing/2014/main" id="{62067075-2833-4EBC-B66B-22B09DE44538}"/>
+              </a:ext>
+            </a:extLst>
+          </p:cNvPr>
+          <p:cNvSpPr txBox="1"/>
+          <p:nvPr/>
+        </p:nvSpPr>
+        <p:spPr>
+          <a:xfrm>
+            <a:off x="5486400" y="3397623"/>
+            <a:ext cx="914033" cy="1200329"/>
+          </a:xfrm>
+          <a:prstGeom prst="rect">
+            <a:avLst/>
+          </a:prstGeom>
+          <a:noFill/>
+        </p:spPr>
+        <p:txBody>
+          <a:bodyPr wrap="none" rtlCol="0">
+            <a:spAutoFit/>
+          </a:bodyPr>
+          <a:lstStyle/>
+          <a:p>
+            <a:r>
+              <a:rPr lang="fr-FR" dirty="0" err="1"/>
+              <a:t>Angular</a:t>
+            </a:r>
+            <a:endParaRPr lang="fr-FR" dirty="0"/>
+          </a:p>
+          <a:p>
+            <a:r>
+              <a:rPr lang="fr-FR" dirty="0"/>
+              <a:t>v2</a:t>
+            </a:r>
+          </a:p>
+          <a:p>
+            <a:r>
+              <a:rPr lang="fr-FR" dirty="0"/>
+              <a:t>2015</a:t>
+            </a:r>
+          </a:p>
+          <a:p>
+            <a:r>
+              <a:rPr lang="fr-FR" dirty="0"/>
+              <a:t>TS</a:t>
+            </a:r>
+          </a:p>
+        </p:txBody>
+      </p:sp>
+      <p:cxnSp>
+        <p:nvCxnSpPr>
+          <p:cNvPr id="22" name="Straight Connector 21">
+            <a:extLst>
+              <a:ext uri="{FF2B5EF4-FFF2-40B4-BE49-F238E27FC236}">
+                <a16:creationId xmlns:a16="http://schemas.microsoft.com/office/drawing/2014/main" id="{A623A0BB-9B06-4306-849C-65CBAEFE0C25}"/>
+              </a:ext>
+            </a:extLst>
+          </p:cNvPr>
+          <p:cNvCxnSpPr/>
+          <p:nvPr/>
+        </p:nvCxnSpPr>
+        <p:spPr>
+          <a:xfrm>
+            <a:off x="4858871" y="2151529"/>
+            <a:ext cx="0" cy="3124200"/>
+          </a:xfrm>
+          <a:prstGeom prst="line">
+            <a:avLst/>
+          </a:prstGeom>
+          <a:ln w="76200"/>
+        </p:spPr>
+        <p:style>
+          <a:lnRef idx="1">
+            <a:schemeClr val="accent1"/>
+          </a:lnRef>
+          <a:fillRef idx="0">
+            <a:schemeClr val="accent1"/>
+          </a:fillRef>
+          <a:effectRef idx="0">
+            <a:schemeClr val="accent1"/>
+          </a:effectRef>
+          <a:fontRef idx="minor">
+            <a:schemeClr val="tx1"/>
+          </a:fontRef>
+        </p:style>
+      </p:cxnSp>
+      <p:sp>
+        <p:nvSpPr>
+          <p:cNvPr id="23" name="TextBox 22">
+            <a:extLst>
+              <a:ext uri="{FF2B5EF4-FFF2-40B4-BE49-F238E27FC236}">
+                <a16:creationId xmlns:a16="http://schemas.microsoft.com/office/drawing/2014/main" id="{FF130D63-8A5A-432E-9CFF-CA95EB938F38}"/>
+              </a:ext>
+            </a:extLst>
+          </p:cNvPr>
+          <p:cNvSpPr txBox="1"/>
+          <p:nvPr/>
+        </p:nvSpPr>
+        <p:spPr>
+          <a:xfrm>
+            <a:off x="4675094" y="5432612"/>
+            <a:ext cx="652743" cy="646331"/>
+          </a:xfrm>
+          <a:prstGeom prst="rect">
+            <a:avLst/>
+          </a:prstGeom>
+          <a:noFill/>
+        </p:spPr>
+        <p:txBody>
+          <a:bodyPr wrap="none" rtlCol="0">
+            <a:spAutoFit/>
+          </a:bodyPr>
+          <a:lstStyle/>
+          <a:p>
+            <a:r>
+              <a:rPr lang="fr-FR" dirty="0"/>
+              <a:t>2012</a:t>
+            </a:r>
+          </a:p>
+          <a:p>
+            <a:r>
+              <a:rPr lang="fr-FR" dirty="0"/>
+              <a:t>TS</a:t>
+            </a:r>
+          </a:p>
+        </p:txBody>
+      </p:sp>
+      <p:cxnSp>
+        <p:nvCxnSpPr>
+          <p:cNvPr id="25" name="Straight Connector 24">
+            <a:extLst>
+              <a:ext uri="{FF2B5EF4-FFF2-40B4-BE49-F238E27FC236}">
+                <a16:creationId xmlns:a16="http://schemas.microsoft.com/office/drawing/2014/main" id="{CCD5650A-0D48-4779-B71E-6168CCCD7EB4}"/>
+              </a:ext>
+            </a:extLst>
+          </p:cNvPr>
+          <p:cNvCxnSpPr/>
+          <p:nvPr/>
+        </p:nvCxnSpPr>
+        <p:spPr>
+          <a:xfrm>
+            <a:off x="5396754" y="2226608"/>
+            <a:ext cx="0" cy="1378323"/>
+          </a:xfrm>
+          <a:prstGeom prst="line">
+            <a:avLst/>
+          </a:prstGeom>
+          <a:ln w="76200"/>
+        </p:spPr>
+        <p:style>
+          <a:lnRef idx="1">
+            <a:schemeClr val="accent1"/>
+          </a:lnRef>
+          <a:fillRef idx="0">
+            <a:schemeClr val="accent1"/>
+          </a:fillRef>
+          <a:effectRef idx="0">
+            <a:schemeClr val="accent1"/>
+          </a:effectRef>
+          <a:fontRef idx="minor">
+            <a:schemeClr val="tx1"/>
+          </a:fontRef>
+        </p:style>
+      </p:cxnSp>
+      <p:sp>
+        <p:nvSpPr>
+          <p:cNvPr id="26" name="TextBox 25">
+            <a:extLst>
+              <a:ext uri="{FF2B5EF4-FFF2-40B4-BE49-F238E27FC236}">
+                <a16:creationId xmlns:a16="http://schemas.microsoft.com/office/drawing/2014/main" id="{D84346A4-E6A8-4FED-8D36-30A7D40CA5AF}"/>
+              </a:ext>
+            </a:extLst>
+          </p:cNvPr>
+          <p:cNvSpPr txBox="1"/>
+          <p:nvPr/>
+        </p:nvSpPr>
+        <p:spPr>
+          <a:xfrm>
+            <a:off x="5001465" y="1513025"/>
+            <a:ext cx="899670" cy="646331"/>
+          </a:xfrm>
+          <a:prstGeom prst="rect">
+            <a:avLst/>
+          </a:prstGeom>
+          <a:noFill/>
+        </p:spPr>
+        <p:txBody>
+          <a:bodyPr wrap="none" rtlCol="0">
+            <a:spAutoFit/>
+          </a:bodyPr>
+          <a:lstStyle/>
+          <a:p>
+            <a:r>
+              <a:rPr lang="fr-FR" dirty="0" err="1"/>
+              <a:t>ReactJS</a:t>
+            </a:r>
+            <a:endParaRPr lang="fr-FR" dirty="0"/>
+          </a:p>
+          <a:p>
+            <a:r>
+              <a:rPr lang="fr-FR" dirty="0"/>
+              <a:t>librairie</a:t>
+            </a:r>
+          </a:p>
+        </p:txBody>
+      </p:sp>
+      <p:cxnSp>
+        <p:nvCxnSpPr>
+          <p:cNvPr id="28" name="Straight Connector 27">
+            <a:extLst>
+              <a:ext uri="{FF2B5EF4-FFF2-40B4-BE49-F238E27FC236}">
+                <a16:creationId xmlns:a16="http://schemas.microsoft.com/office/drawing/2014/main" id="{F795E674-C5D3-4BD9-AC7B-12632480C2D0}"/>
+              </a:ext>
+            </a:extLst>
+          </p:cNvPr>
+          <p:cNvCxnSpPr>
+            <a:cxnSpLocks/>
+          </p:cNvCxnSpPr>
+          <p:nvPr/>
+        </p:nvCxnSpPr>
+        <p:spPr>
+          <a:xfrm>
+            <a:off x="5620871" y="2451847"/>
+            <a:ext cx="0" cy="2684929"/>
+          </a:xfrm>
+          <a:prstGeom prst="line">
+            <a:avLst/>
+          </a:prstGeom>
+          <a:ln w="76200"/>
+        </p:spPr>
+        <p:style>
+          <a:lnRef idx="1">
+            <a:schemeClr val="accent1"/>
+          </a:lnRef>
+          <a:fillRef idx="0">
+            <a:schemeClr val="accent1"/>
+          </a:fillRef>
+          <a:effectRef idx="0">
+            <a:schemeClr val="accent1"/>
+          </a:effectRef>
+          <a:fontRef idx="minor">
+            <a:schemeClr val="tx1"/>
+          </a:fontRef>
+        </p:style>
+      </p:cxnSp>
+      <p:sp>
+        <p:nvSpPr>
+          <p:cNvPr id="30" name="TextBox 29">
+            <a:extLst>
+              <a:ext uri="{FF2B5EF4-FFF2-40B4-BE49-F238E27FC236}">
+                <a16:creationId xmlns:a16="http://schemas.microsoft.com/office/drawing/2014/main" id="{A61DB78F-70CF-4280-B11E-7B8D21C9596D}"/>
+              </a:ext>
+            </a:extLst>
+          </p:cNvPr>
+          <p:cNvSpPr txBox="1"/>
+          <p:nvPr/>
+        </p:nvSpPr>
+        <p:spPr>
+          <a:xfrm>
+            <a:off x="5346308" y="5136776"/>
+            <a:ext cx="749692" cy="646331"/>
+          </a:xfrm>
+          <a:prstGeom prst="rect">
+            <a:avLst/>
+          </a:prstGeom>
+          <a:noFill/>
+        </p:spPr>
+        <p:txBody>
+          <a:bodyPr wrap="none" rtlCol="0">
+            <a:spAutoFit/>
+          </a:bodyPr>
+          <a:lstStyle/>
+          <a:p>
+            <a:r>
+              <a:rPr lang="fr-FR" dirty="0"/>
+              <a:t>Vue.js</a:t>
+            </a:r>
+          </a:p>
+          <a:p>
+            <a:r>
+              <a:rPr lang="fr-FR" dirty="0"/>
+              <a:t>2014</a:t>
+            </a:r>
+          </a:p>
+        </p:txBody>
+      </p:sp>
+      <p:cxnSp>
+        <p:nvCxnSpPr>
+          <p:cNvPr id="32" name="Straight Connector 31">
+            <a:extLst>
+              <a:ext uri="{FF2B5EF4-FFF2-40B4-BE49-F238E27FC236}">
+                <a16:creationId xmlns:a16="http://schemas.microsoft.com/office/drawing/2014/main" id="{D29416A8-7D2A-4C8E-9CBF-3809E9E392D0}"/>
+              </a:ext>
+            </a:extLst>
+          </p:cNvPr>
+          <p:cNvCxnSpPr/>
+          <p:nvPr/>
+        </p:nvCxnSpPr>
+        <p:spPr>
+          <a:xfrm>
+            <a:off x="6190129" y="2649071"/>
+            <a:ext cx="2438400" cy="0"/>
+          </a:xfrm>
+          <a:prstGeom prst="line">
+            <a:avLst/>
+          </a:prstGeom>
+          <a:ln w="76200">
+            <a:prstDash val="sysDash"/>
+          </a:ln>
+        </p:spPr>
+        <p:style>
+          <a:lnRef idx="1">
+            <a:schemeClr val="accent1"/>
+          </a:lnRef>
+          <a:fillRef idx="0">
+            <a:schemeClr val="accent1"/>
+          </a:fillRef>
+          <a:effectRef idx="0">
+            <a:schemeClr val="accent1"/>
+          </a:effectRef>
+          <a:fontRef idx="minor">
+            <a:schemeClr val="tx1"/>
+          </a:fontRef>
+        </p:style>
+      </p:cxnSp>
+    </p:spTree>
+    <p:extLst>
+      <p:ext uri="{BB962C8B-B14F-4D97-AF65-F5344CB8AC3E}">
+        <p14:creationId xmlns:p14="http://schemas.microsoft.com/office/powerpoint/2010/main" val="2064438309"/>
+      </p:ext>
+    </p:extLst>
+  </p:cSld>
+  <p:clrMapOvr>
+    <a:masterClrMapping/>
+  </p:clrMapOvr>
+</p:sld>
+</file>
+
+<file path=ppt/slides/slide19.xml><?xml version="1.0" encoding="utf-8"?>
+<p:sld xmlns:a="http://schemas.openxmlformats.org/drawingml/2006/main" xmlns:r="http://schemas.openxmlformats.org/officeDocument/2006/relationships" xmlns:p="http://schemas.openxmlformats.org/presentationml/2006/main">
+  <p:cSld>
+    <p:spTree>
+      <p:nvGrpSpPr>
+        <p:cNvPr id="1" name=""/>
+        <p:cNvGrpSpPr/>
+        <p:nvPr/>
+      </p:nvGrpSpPr>
+      <p:grpSpPr>
+        <a:xfrm>
+          <a:off x="0" y="0"/>
+          <a:ext cx="0" cy="0"/>
+          <a:chOff x="0" y="0"/>
+          <a:chExt cx="0" cy="0"/>
+        </a:xfrm>
+      </p:grpSpPr>
+      <p:sp>
+        <p:nvSpPr>
+          <p:cNvPr id="13" name="Rectangle: Rounded Corners 12">
+            <a:extLst>
+              <a:ext uri="{FF2B5EF4-FFF2-40B4-BE49-F238E27FC236}">
+                <a16:creationId xmlns:a16="http://schemas.microsoft.com/office/drawing/2014/main" id="{16DD099D-B357-4391-ACCA-14B92669AC32}"/>
+              </a:ext>
+            </a:extLst>
+          </p:cNvPr>
+          <p:cNvSpPr/>
+          <p:nvPr/>
+        </p:nvSpPr>
+        <p:spPr>
+          <a:xfrm>
+            <a:off x="1305354" y="1286435"/>
+            <a:ext cx="8932340" cy="5015753"/>
+          </a:xfrm>
+          <a:prstGeom prst="roundRect">
+            <a:avLst/>
+          </a:prstGeom>
+        </p:spPr>
+        <p:style>
+          <a:lnRef idx="2">
+            <a:schemeClr val="accent1"/>
+          </a:lnRef>
+          <a:fillRef idx="1">
+            <a:schemeClr val="lt1"/>
+          </a:fillRef>
+          <a:effectRef idx="0">
+            <a:schemeClr val="accent1"/>
+          </a:effectRef>
+          <a:fontRef idx="minor">
+            <a:schemeClr val="dk1"/>
+          </a:fontRef>
+        </p:style>
+        <p:txBody>
+          <a:bodyPr rtlCol="0" anchor="ctr"/>
+          <a:lstStyle/>
+          <a:p>
+            <a:pPr algn="ctr"/>
+            <a:endParaRPr lang="fr-FR"/>
+          </a:p>
+        </p:txBody>
+      </p:sp>
+      <p:sp>
+        <p:nvSpPr>
+          <p:cNvPr id="2" name="Title 1">
+            <a:extLst>
+              <a:ext uri="{FF2B5EF4-FFF2-40B4-BE49-F238E27FC236}">
+                <a16:creationId xmlns:a16="http://schemas.microsoft.com/office/drawing/2014/main" id="{D6392BCE-A065-4AF4-A9E6-21F4FE1827BD}"/>
+              </a:ext>
+            </a:extLst>
+          </p:cNvPr>
+          <p:cNvSpPr>
+            <a:spLocks noGrp="1"/>
+          </p:cNvSpPr>
+          <p:nvPr>
+            <p:ph type="title"/>
+          </p:nvPr>
+        </p:nvSpPr>
+        <p:spPr/>
+        <p:txBody>
+          <a:bodyPr/>
+          <a:lstStyle/>
+          <a:p>
+            <a:r>
+              <a:rPr lang="fr-FR" dirty="0"/>
+              <a:t>Reverse proxy</a:t>
+            </a:r>
+          </a:p>
+        </p:txBody>
+      </p:sp>
+      <p:sp>
+        <p:nvSpPr>
+          <p:cNvPr id="4" name="Rectangle: Rounded Corners 3">
+            <a:extLst>
+              <a:ext uri="{FF2B5EF4-FFF2-40B4-BE49-F238E27FC236}">
+                <a16:creationId xmlns:a16="http://schemas.microsoft.com/office/drawing/2014/main" id="{55FAE527-EB1C-4181-8B6A-93BC8B4C12F3}"/>
+              </a:ext>
+            </a:extLst>
+          </p:cNvPr>
+          <p:cNvSpPr/>
+          <p:nvPr/>
+        </p:nvSpPr>
+        <p:spPr>
+          <a:xfrm>
+            <a:off x="1376082" y="2277035"/>
+            <a:ext cx="1954306" cy="1815353"/>
+          </a:xfrm>
+          <a:prstGeom prst="roundRect">
+            <a:avLst/>
+          </a:prstGeom>
+        </p:spPr>
+        <p:style>
+          <a:lnRef idx="2">
+            <a:schemeClr val="accent1">
+              <a:shade val="50000"/>
+            </a:schemeClr>
+          </a:lnRef>
+          <a:fillRef idx="1">
+            <a:schemeClr val="accent1"/>
+          </a:fillRef>
+          <a:effectRef idx="0">
+            <a:schemeClr val="accent1"/>
+          </a:effectRef>
+          <a:fontRef idx="minor">
+            <a:schemeClr val="lt1"/>
+          </a:fontRef>
+        </p:style>
+        <p:txBody>
+          <a:bodyPr rtlCol="0" anchor="ctr"/>
+          <a:lstStyle/>
+          <a:p>
+            <a:pPr algn="ctr"/>
+            <a:r>
+              <a:rPr lang="fr-FR" dirty="0"/>
+              <a:t>Nginx</a:t>
+            </a:r>
+          </a:p>
+        </p:txBody>
+      </p:sp>
+      <p:cxnSp>
+        <p:nvCxnSpPr>
+          <p:cNvPr id="6" name="Straight Arrow Connector 5">
+            <a:extLst>
+              <a:ext uri="{FF2B5EF4-FFF2-40B4-BE49-F238E27FC236}">
+                <a16:creationId xmlns:a16="http://schemas.microsoft.com/office/drawing/2014/main" id="{39C7185D-1D54-49F9-A0BC-305AAF24E922}"/>
+              </a:ext>
+            </a:extLst>
+          </p:cNvPr>
+          <p:cNvCxnSpPr/>
+          <p:nvPr/>
+        </p:nvCxnSpPr>
+        <p:spPr>
+          <a:xfrm>
+            <a:off x="403412" y="2232212"/>
+            <a:ext cx="972670" cy="533400"/>
+          </a:xfrm>
+          <a:prstGeom prst="straightConnector1">
+            <a:avLst/>
+          </a:prstGeom>
+          <a:ln w="76200">
+            <a:tailEnd type="triangle"/>
+          </a:ln>
+        </p:spPr>
+        <p:style>
+          <a:lnRef idx="1">
+            <a:schemeClr val="accent1"/>
+          </a:lnRef>
+          <a:fillRef idx="0">
+            <a:schemeClr val="accent1"/>
+          </a:fillRef>
+          <a:effectRef idx="0">
+            <a:schemeClr val="accent1"/>
+          </a:effectRef>
+          <a:fontRef idx="minor">
+            <a:schemeClr val="tx1"/>
+          </a:fontRef>
+        </p:style>
+      </p:cxnSp>
+      <p:sp>
+        <p:nvSpPr>
+          <p:cNvPr id="7" name="TextBox 6">
+            <a:extLst>
+              <a:ext uri="{FF2B5EF4-FFF2-40B4-BE49-F238E27FC236}">
+                <a16:creationId xmlns:a16="http://schemas.microsoft.com/office/drawing/2014/main" id="{C5FDFD95-9F71-4606-B575-7D79F2409FD6}"/>
+              </a:ext>
+            </a:extLst>
+          </p:cNvPr>
+          <p:cNvSpPr txBox="1"/>
+          <p:nvPr/>
+        </p:nvSpPr>
+        <p:spPr>
+          <a:xfrm>
+            <a:off x="524435" y="1690688"/>
+            <a:ext cx="780919" cy="369332"/>
+          </a:xfrm>
+          <a:prstGeom prst="rect">
+            <a:avLst/>
+          </a:prstGeom>
+          <a:noFill/>
+        </p:spPr>
+        <p:txBody>
+          <a:bodyPr wrap="none" rtlCol="0">
+            <a:spAutoFit/>
+          </a:bodyPr>
+          <a:lstStyle/>
+          <a:p>
+            <a:r>
+              <a:rPr lang="fr-FR" dirty="0"/>
+              <a:t>HTTPS</a:t>
+            </a:r>
+          </a:p>
+        </p:txBody>
+      </p:sp>
+      <p:sp>
+        <p:nvSpPr>
+          <p:cNvPr id="8" name="Rectangle 7">
+            <a:extLst>
+              <a:ext uri="{FF2B5EF4-FFF2-40B4-BE49-F238E27FC236}">
+                <a16:creationId xmlns:a16="http://schemas.microsoft.com/office/drawing/2014/main" id="{19CEECF0-8EDB-434C-BCCF-C8E0C3E68F79}"/>
+              </a:ext>
+            </a:extLst>
+          </p:cNvPr>
+          <p:cNvSpPr/>
+          <p:nvPr/>
+        </p:nvSpPr>
+        <p:spPr>
+          <a:xfrm>
+            <a:off x="2541494" y="4128247"/>
+            <a:ext cx="1071282" cy="667871"/>
+          </a:xfrm>
+          <a:prstGeom prst="rect">
+            <a:avLst/>
+          </a:prstGeom>
+        </p:spPr>
+        <p:style>
+          <a:lnRef idx="2">
+            <a:schemeClr val="accent6">
+              <a:shade val="50000"/>
+            </a:schemeClr>
+          </a:lnRef>
+          <a:fillRef idx="1">
+            <a:schemeClr val="accent6"/>
+          </a:fillRef>
+          <a:effectRef idx="0">
+            <a:schemeClr val="accent6"/>
+          </a:effectRef>
+          <a:fontRef idx="minor">
+            <a:schemeClr val="lt1"/>
+          </a:fontRef>
+        </p:style>
+        <p:txBody>
+          <a:bodyPr rtlCol="0" anchor="ctr"/>
+          <a:lstStyle/>
+          <a:p>
+            <a:pPr algn="ctr"/>
+            <a:r>
+              <a:rPr lang="fr-FR" dirty="0"/>
+              <a:t>Certificat</a:t>
+            </a:r>
+          </a:p>
+        </p:txBody>
+      </p:sp>
+      <p:cxnSp>
+        <p:nvCxnSpPr>
+          <p:cNvPr id="10" name="Straight Arrow Connector 9">
+            <a:extLst>
+              <a:ext uri="{FF2B5EF4-FFF2-40B4-BE49-F238E27FC236}">
+                <a16:creationId xmlns:a16="http://schemas.microsoft.com/office/drawing/2014/main" id="{2A7DCE7B-8592-4018-83A3-2927ECE0F3A0}"/>
+              </a:ext>
+            </a:extLst>
+          </p:cNvPr>
+          <p:cNvCxnSpPr>
+            <a:cxnSpLocks/>
+          </p:cNvCxnSpPr>
+          <p:nvPr/>
+        </p:nvCxnSpPr>
+        <p:spPr>
+          <a:xfrm flipV="1">
+            <a:off x="3334871" y="2106706"/>
+            <a:ext cx="4533637" cy="555813"/>
+          </a:xfrm>
+          <a:prstGeom prst="straightConnector1">
+            <a:avLst/>
+          </a:prstGeom>
+          <a:ln w="76200">
+            <a:tailEnd type="triangle"/>
+          </a:ln>
+        </p:spPr>
+        <p:style>
+          <a:lnRef idx="1">
+            <a:schemeClr val="accent1"/>
+          </a:lnRef>
+          <a:fillRef idx="0">
+            <a:schemeClr val="accent1"/>
+          </a:fillRef>
+          <a:effectRef idx="0">
+            <a:schemeClr val="accent1"/>
+          </a:effectRef>
+          <a:fontRef idx="minor">
+            <a:schemeClr val="tx1"/>
+          </a:fontRef>
+        </p:style>
+      </p:cxnSp>
+      <p:sp>
+        <p:nvSpPr>
+          <p:cNvPr id="11" name="Rectangle 10">
+            <a:extLst>
+              <a:ext uri="{FF2B5EF4-FFF2-40B4-BE49-F238E27FC236}">
+                <a16:creationId xmlns:a16="http://schemas.microsoft.com/office/drawing/2014/main" id="{19795827-DAB5-4986-834A-17C557795A7F}"/>
+              </a:ext>
+            </a:extLst>
+          </p:cNvPr>
+          <p:cNvSpPr/>
+          <p:nvPr/>
+        </p:nvSpPr>
+        <p:spPr>
+          <a:xfrm>
+            <a:off x="7912342" y="1690688"/>
+            <a:ext cx="1595718" cy="1255059"/>
+          </a:xfrm>
+          <a:prstGeom prst="rect">
+            <a:avLst/>
+          </a:prstGeom>
+        </p:spPr>
+        <p:style>
+          <a:lnRef idx="2">
+            <a:schemeClr val="accent1">
+              <a:shade val="50000"/>
+            </a:schemeClr>
+          </a:lnRef>
+          <a:fillRef idx="1">
+            <a:schemeClr val="accent1"/>
+          </a:fillRef>
+          <a:effectRef idx="0">
+            <a:schemeClr val="accent1"/>
+          </a:effectRef>
+          <a:fontRef idx="minor">
+            <a:schemeClr val="lt1"/>
+          </a:fontRef>
+        </p:style>
+        <p:txBody>
+          <a:bodyPr rtlCol="0" anchor="ctr"/>
+          <a:lstStyle/>
+          <a:p>
+            <a:pPr algn="ctr"/>
+            <a:endParaRPr lang="fr-FR"/>
+          </a:p>
+        </p:txBody>
+      </p:sp>
+      <p:sp>
+        <p:nvSpPr>
+          <p:cNvPr id="12" name="TextBox 11">
+            <a:extLst>
+              <a:ext uri="{FF2B5EF4-FFF2-40B4-BE49-F238E27FC236}">
+                <a16:creationId xmlns:a16="http://schemas.microsoft.com/office/drawing/2014/main" id="{E2216CE7-3E4E-4D62-9F12-45D4585D1363}"/>
+              </a:ext>
+            </a:extLst>
+          </p:cNvPr>
+          <p:cNvSpPr txBox="1"/>
+          <p:nvPr/>
+        </p:nvSpPr>
+        <p:spPr>
+          <a:xfrm>
+            <a:off x="7839636" y="721659"/>
+            <a:ext cx="2191369" cy="369332"/>
+          </a:xfrm>
+          <a:prstGeom prst="rect">
+            <a:avLst/>
+          </a:prstGeom>
+          <a:noFill/>
+        </p:spPr>
+        <p:txBody>
+          <a:bodyPr wrap="none" rtlCol="0">
+            <a:spAutoFit/>
+          </a:bodyPr>
+          <a:lstStyle/>
+          <a:p>
+            <a:r>
+              <a:rPr lang="fr-FR" dirty="0"/>
+              <a:t>http://localhost:3000</a:t>
+            </a:r>
+          </a:p>
+        </p:txBody>
+      </p:sp>
+    </p:spTree>
+    <p:extLst>
+      <p:ext uri="{BB962C8B-B14F-4D97-AF65-F5344CB8AC3E}">
+        <p14:creationId xmlns:p14="http://schemas.microsoft.com/office/powerpoint/2010/main" val="3704467821"/>
       </p:ext>
     </p:extLst>
   </p:cSld>
@@ -4481,6 +9178,13 @@
             <a:endParaRPr lang="fr-FR" dirty="0"/>
           </a:p>
           <a:p>
+            <a:r>
+              <a:rPr lang="fr-FR" dirty="0" err="1"/>
+              <a:t>SonarLint</a:t>
+            </a:r>
+            <a:endParaRPr lang="fr-FR" dirty="0"/>
+          </a:p>
+          <a:p>
             <a:endParaRPr lang="fr-FR" dirty="0"/>
           </a:p>
         </p:txBody>
@@ -4489,6 +9193,116 @@
     <p:extLst>
       <p:ext uri="{BB962C8B-B14F-4D97-AF65-F5344CB8AC3E}">
         <p14:creationId xmlns:p14="http://schemas.microsoft.com/office/powerpoint/2010/main" val="2961836207"/>
+      </p:ext>
+    </p:extLst>
+  </p:cSld>
+  <p:clrMapOvr>
+    <a:masterClrMapping/>
+  </p:clrMapOvr>
+</p:sld>
+</file>
+
+<file path=ppt/slides/slide20.xml><?xml version="1.0" encoding="utf-8"?>
+<p:sld xmlns:a="http://schemas.openxmlformats.org/drawingml/2006/main" xmlns:r="http://schemas.openxmlformats.org/officeDocument/2006/relationships" xmlns:p="http://schemas.openxmlformats.org/presentationml/2006/main">
+  <p:cSld>
+    <p:spTree>
+      <p:nvGrpSpPr>
+        <p:cNvPr id="1" name=""/>
+        <p:cNvGrpSpPr/>
+        <p:nvPr/>
+      </p:nvGrpSpPr>
+      <p:grpSpPr>
+        <a:xfrm>
+          <a:off x="0" y="0"/>
+          <a:ext cx="0" cy="0"/>
+          <a:chOff x="0" y="0"/>
+          <a:chExt cx="0" cy="0"/>
+        </a:xfrm>
+      </p:grpSpPr>
+      <p:sp>
+        <p:nvSpPr>
+          <p:cNvPr id="2" name="Title 1">
+            <a:extLst>
+              <a:ext uri="{FF2B5EF4-FFF2-40B4-BE49-F238E27FC236}">
+                <a16:creationId xmlns:a16="http://schemas.microsoft.com/office/drawing/2014/main" id="{D5722810-EDEB-4B60-A2FE-B66982AC35B9}"/>
+              </a:ext>
+            </a:extLst>
+          </p:cNvPr>
+          <p:cNvSpPr>
+            <a:spLocks noGrp="1"/>
+          </p:cNvSpPr>
+          <p:nvPr>
+            <p:ph type="title"/>
+          </p:nvPr>
+        </p:nvSpPr>
+        <p:spPr/>
+        <p:txBody>
+          <a:bodyPr/>
+          <a:lstStyle/>
+          <a:p>
+            <a:r>
+              <a:rPr lang="fr-FR" dirty="0"/>
+              <a:t>Webographie</a:t>
+            </a:r>
+          </a:p>
+        </p:txBody>
+      </p:sp>
+      <p:sp>
+        <p:nvSpPr>
+          <p:cNvPr id="3" name="Content Placeholder 2">
+            <a:extLst>
+              <a:ext uri="{FF2B5EF4-FFF2-40B4-BE49-F238E27FC236}">
+                <a16:creationId xmlns:a16="http://schemas.microsoft.com/office/drawing/2014/main" id="{A6B059E0-1AD8-4064-BE39-D9ADAC9B97FA}"/>
+              </a:ext>
+            </a:extLst>
+          </p:cNvPr>
+          <p:cNvSpPr>
+            <a:spLocks noGrp="1"/>
+          </p:cNvSpPr>
+          <p:nvPr>
+            <p:ph idx="1"/>
+          </p:nvPr>
+        </p:nvSpPr>
+        <p:spPr/>
+        <p:txBody>
+          <a:bodyPr/>
+          <a:lstStyle/>
+          <a:p>
+            <a:r>
+              <a:rPr lang="fr-FR" dirty="0">
+                <a:hlinkClick r:id="rId2"/>
+              </a:rPr>
+              <a:t>https://refactoring.guru/</a:t>
+            </a:r>
+            <a:endParaRPr lang="fr-FR" dirty="0"/>
+          </a:p>
+          <a:p>
+            <a:r>
+              <a:rPr lang="fr-FR" dirty="0"/>
+              <a:t>Norme POSIX</a:t>
+            </a:r>
+          </a:p>
+          <a:p>
+            <a:r>
+              <a:rPr lang="fr-FR" dirty="0">
+                <a:hlinkClick r:id="rId3"/>
+              </a:rPr>
+              <a:t>https://caniuse.com/?search=fetch</a:t>
+            </a:r>
+            <a:endParaRPr lang="fr-FR" dirty="0"/>
+          </a:p>
+          <a:p>
+            <a:endParaRPr lang="fr-FR" dirty="0"/>
+          </a:p>
+          <a:p>
+            <a:endParaRPr lang="fr-FR" dirty="0"/>
+          </a:p>
+        </p:txBody>
+      </p:sp>
+    </p:spTree>
+    <p:extLst>
+      <p:ext uri="{BB962C8B-B14F-4D97-AF65-F5344CB8AC3E}">
+        <p14:creationId xmlns:p14="http://schemas.microsoft.com/office/powerpoint/2010/main" val="3640366517"/>
       </p:ext>
     </p:extLst>
   </p:cSld>

</xml_diff>